<commit_message>
Add different models in methodology
</commit_message>
<xml_diff>
--- a/docs/DBA-diagrams.pptx
+++ b/docs/DBA-diagrams.pptx
@@ -6,13 +6,14 @@
     <p:sldMasterId id="2147484308" r:id="rId2"/>
   </p:sldMasterIdLst>
   <p:notesMasterIdLst>
-    <p:notesMasterId r:id="rId7"/>
+    <p:notesMasterId r:id="rId8"/>
   </p:notesMasterIdLst>
   <p:sldIdLst>
     <p:sldId id="2666" r:id="rId3"/>
     <p:sldId id="2668" r:id="rId4"/>
-    <p:sldId id="2669" r:id="rId5"/>
-    <p:sldId id="2667" r:id="rId6"/>
+    <p:sldId id="2670" r:id="rId5"/>
+    <p:sldId id="2669" r:id="rId6"/>
+    <p:sldId id="2667" r:id="rId7"/>
   </p:sldIdLst>
   <p:sldSz cx="12192000" cy="6858000"/>
   <p:notesSz cx="7086600" cy="9372600"/>
@@ -275,7 +276,7 @@
               <a:pPr>
                 <a:defRPr/>
               </a:pPr>
-              <a:t>11/9/20</a:t>
+              <a:t>11/17/20</a:t>
             </a:fld>
             <a:endParaRPr lang="en-US"/>
           </a:p>
@@ -5570,7 +5571,7 @@
         <p:fade/>
       </p:transition>
     </mc:Choice>
-    <mc:Fallback xmlns:mv="urn:schemas-microsoft-com:mac:vml" xmlns="">
+    <mc:Fallback xmlns="" xmlns:mv="urn:schemas-microsoft-com:mac:vml">
       <mp:transition xmlns:mp="http://schemas.microsoft.com/office/mac/powerpoint/2008/main" spd="med"/>
     </mc:Fallback>
   </mc:AlternateContent>
@@ -7534,10 +7535,106 @@
       </p:grpSpPr>
       <p:sp>
         <p:nvSpPr>
-          <p:cNvPr id="2" name="Slide Number Placeholder 1">
+          <p:cNvPr id="19" name="Rounded Rectangle 18">
             <a:extLst>
               <a:ext uri="{FF2B5EF4-FFF2-40B4-BE49-F238E27FC236}">
-                <a16:creationId xmlns:a16="http://schemas.microsoft.com/office/drawing/2014/main" id="{B26EFD7A-54C0-2342-913C-772AA467A7CE}"/>
+                <a16:creationId xmlns:a16="http://schemas.microsoft.com/office/drawing/2014/main" id="{72C41C85-7D29-7743-9DAC-FB52A86A72C1}"/>
+              </a:ext>
+            </a:extLst>
+          </p:cNvPr>
+          <p:cNvSpPr/>
+          <p:nvPr/>
+        </p:nvSpPr>
+        <p:spPr>
+          <a:xfrm>
+            <a:off x="1685049" y="3167017"/>
+            <a:ext cx="3131649" cy="914400"/>
+          </a:xfrm>
+          <a:prstGeom prst="roundRect">
+            <a:avLst>
+              <a:gd name="adj" fmla="val 6808"/>
+            </a:avLst>
+          </a:prstGeom>
+          <a:solidFill>
+            <a:schemeClr val="tx2">
+              <a:lumMod val="75000"/>
+            </a:schemeClr>
+          </a:solidFill>
+          <a:ln>
+            <a:noFill/>
+          </a:ln>
+          <a:effectLst>
+            <a:outerShdw blurRad="50800" dist="38100" dir="5400000" algn="t" rotWithShape="0">
+              <a:prstClr val="black">
+                <a:alpha val="40000"/>
+              </a:prstClr>
+            </a:outerShdw>
+          </a:effectLst>
+        </p:spPr>
+        <p:style>
+          <a:lnRef idx="2">
+            <a:schemeClr val="accent1">
+              <a:shade val="50000"/>
+            </a:schemeClr>
+          </a:lnRef>
+          <a:fillRef idx="1">
+            <a:schemeClr val="accent1"/>
+          </a:fillRef>
+          <a:effectRef idx="0">
+            <a:schemeClr val="accent1"/>
+          </a:effectRef>
+          <a:fontRef idx="minor">
+            <a:schemeClr val="lt1"/>
+          </a:fontRef>
+        </p:style>
+        <p:txBody>
+          <a:bodyPr rtlCol="0" anchor="t"/>
+          <a:lstStyle/>
+          <a:p>
+            <a:pPr algn="ctr"/>
+            <a:r>
+              <a:rPr lang="en-US" sz="1100" dirty="0"/>
+              <a:t>Event Backbone</a:t>
+            </a:r>
+            <a:endParaRPr sz="1100" dirty="0"/>
+          </a:p>
+        </p:txBody>
+      </p:sp>
+      <p:sp>
+        <p:nvSpPr>
+          <p:cNvPr id="2" name="Title 1">
+            <a:extLst>
+              <a:ext uri="{FF2B5EF4-FFF2-40B4-BE49-F238E27FC236}">
+                <a16:creationId xmlns:a16="http://schemas.microsoft.com/office/drawing/2014/main" id="{E9E48EA8-A256-4443-8D3B-3516A14EB35C}"/>
+              </a:ext>
+            </a:extLst>
+          </p:cNvPr>
+          <p:cNvSpPr>
+            <a:spLocks noGrp="1"/>
+          </p:cNvSpPr>
+          <p:nvPr>
+            <p:ph type="title"/>
+          </p:nvPr>
+        </p:nvSpPr>
+        <p:spPr/>
+        <p:txBody>
+          <a:bodyPr/>
+          <a:lstStyle/>
+          <a:p>
+            <a:r>
+              <a:rPr lang="en-US" dirty="0"/>
+              <a:t>Different Data Models</a:t>
+            </a:r>
+            <a:endParaRPr dirty="0"/>
+          </a:p>
+        </p:txBody>
+      </p:sp>
+      <p:sp>
+        <p:nvSpPr>
+          <p:cNvPr id="4" name="Slide Number Placeholder 3">
+            <a:extLst>
+              <a:ext uri="{FF2B5EF4-FFF2-40B4-BE49-F238E27FC236}">
+                <a16:creationId xmlns:a16="http://schemas.microsoft.com/office/drawing/2014/main" id="{D21B103E-AA64-754B-A1B4-52560005CCB5}"/>
               </a:ext>
             </a:extLst>
           </p:cNvPr>
@@ -7572,61 +7669,2815 @@
       </p:sp>
       <p:sp>
         <p:nvSpPr>
-          <p:cNvPr id="3" name="Title 2">
+          <p:cNvPr id="5" name="Can 4">
             <a:extLst>
               <a:ext uri="{FF2B5EF4-FFF2-40B4-BE49-F238E27FC236}">
-                <a16:creationId xmlns:a16="http://schemas.microsoft.com/office/drawing/2014/main" id="{AB877B22-01CF-4E42-93A6-DFAB54B54A39}"/>
+                <a16:creationId xmlns:a16="http://schemas.microsoft.com/office/drawing/2014/main" id="{8C5E8A0B-745D-F14C-8480-C0F6E10D6E9D}"/>
               </a:ext>
             </a:extLst>
           </p:cNvPr>
-          <p:cNvSpPr>
-            <a:spLocks noGrp="1"/>
-          </p:cNvSpPr>
-          <p:nvPr>
-            <p:ph type="ctrTitle"/>
-          </p:nvPr>
-        </p:nvSpPr>
-        <p:spPr/>
-        <p:txBody>
-          <a:bodyPr/>
+          <p:cNvSpPr/>
+          <p:nvPr/>
+        </p:nvSpPr>
+        <p:spPr>
+          <a:xfrm>
+            <a:off x="9163317" y="1420587"/>
+            <a:ext cx="914400" cy="553791"/>
+          </a:xfrm>
+          <a:prstGeom prst="can">
+            <a:avLst/>
+          </a:prstGeom>
+          <a:solidFill>
+            <a:schemeClr val="tx2">
+              <a:lumMod val="75000"/>
+            </a:schemeClr>
+          </a:solidFill>
+          <a:ln>
+            <a:noFill/>
+          </a:ln>
+        </p:spPr>
+        <p:style>
+          <a:lnRef idx="2">
+            <a:schemeClr val="accent1">
+              <a:shade val="50000"/>
+            </a:schemeClr>
+          </a:lnRef>
+          <a:fillRef idx="1">
+            <a:schemeClr val="accent1"/>
+          </a:fillRef>
+          <a:effectRef idx="0">
+            <a:schemeClr val="accent1"/>
+          </a:effectRef>
+          <a:fontRef idx="minor">
+            <a:schemeClr val="lt1"/>
+          </a:fontRef>
+        </p:style>
+        <p:txBody>
+          <a:bodyPr rtlCol="0" anchor="ctr"/>
           <a:lstStyle/>
           <a:p>
-            <a:r>
-              <a:rPr lang="en-US" dirty="0"/>
-              <a:t>Older Versions</a:t>
-            </a:r>
-          </a:p>
-        </p:txBody>
-      </p:sp>
-      <p:sp>
-        <p:nvSpPr>
-          <p:cNvPr id="4" name="Subtitle 3">
+            <a:pPr algn="ctr"/>
+            <a:r>
+              <a:rPr lang="en-US" sz="1000" dirty="0"/>
+              <a:t>SQL Tables</a:t>
+            </a:r>
+            <a:endParaRPr sz="1000" dirty="0"/>
+          </a:p>
+        </p:txBody>
+      </p:sp>
+      <p:sp>
+        <p:nvSpPr>
+          <p:cNvPr id="6" name="Can 5">
             <a:extLst>
               <a:ext uri="{FF2B5EF4-FFF2-40B4-BE49-F238E27FC236}">
-                <a16:creationId xmlns:a16="http://schemas.microsoft.com/office/drawing/2014/main" id="{6ADCDA09-464A-A547-8B2D-6FAAD0C85EE3}"/>
+                <a16:creationId xmlns:a16="http://schemas.microsoft.com/office/drawing/2014/main" id="{8A5C4C75-EBDB-954A-AE82-0DF7B4434EC6}"/>
               </a:ext>
             </a:extLst>
           </p:cNvPr>
-          <p:cNvSpPr>
-            <a:spLocks noGrp="1"/>
-          </p:cNvSpPr>
-          <p:nvPr>
-            <p:ph type="subTitle" idx="1"/>
-          </p:nvPr>
-        </p:nvSpPr>
-        <p:spPr/>
-        <p:txBody>
-          <a:bodyPr/>
+          <p:cNvSpPr/>
+          <p:nvPr/>
+        </p:nvSpPr>
+        <p:spPr>
+          <a:xfrm>
+            <a:off x="9163317" y="2206166"/>
+            <a:ext cx="914400" cy="553791"/>
+          </a:xfrm>
+          <a:prstGeom prst="can">
+            <a:avLst/>
+          </a:prstGeom>
+          <a:solidFill>
+            <a:schemeClr val="tx2">
+              <a:lumMod val="75000"/>
+            </a:schemeClr>
+          </a:solidFill>
+          <a:ln>
+            <a:noFill/>
+          </a:ln>
+        </p:spPr>
+        <p:style>
+          <a:lnRef idx="2">
+            <a:schemeClr val="accent1">
+              <a:shade val="50000"/>
+            </a:schemeClr>
+          </a:lnRef>
+          <a:fillRef idx="1">
+            <a:schemeClr val="accent1"/>
+          </a:fillRef>
+          <a:effectRef idx="0">
+            <a:schemeClr val="accent1"/>
+          </a:effectRef>
+          <a:fontRef idx="minor">
+            <a:schemeClr val="lt1"/>
+          </a:fontRef>
+        </p:style>
+        <p:txBody>
+          <a:bodyPr rtlCol="0" anchor="ctr"/>
           <a:lstStyle/>
           <a:p>
-            <a:endParaRPr lang="en-US"/>
+            <a:pPr algn="ctr"/>
+            <a:r>
+              <a:rPr lang="en-US" sz="1000" dirty="0"/>
+              <a:t>JSON Documents </a:t>
+            </a:r>
+            <a:endParaRPr sz="1000" dirty="0"/>
+          </a:p>
+        </p:txBody>
+      </p:sp>
+      <p:sp>
+        <p:nvSpPr>
+          <p:cNvPr id="7" name="Rounded Rectangle 6">
+            <a:extLst>
+              <a:ext uri="{FF2B5EF4-FFF2-40B4-BE49-F238E27FC236}">
+                <a16:creationId xmlns:a16="http://schemas.microsoft.com/office/drawing/2014/main" id="{EE8B7B09-DAA3-DC4D-AF87-6B9F9BB19CF2}"/>
+              </a:ext>
+            </a:extLst>
+          </p:cNvPr>
+          <p:cNvSpPr/>
+          <p:nvPr/>
+        </p:nvSpPr>
+        <p:spPr>
+          <a:xfrm>
+            <a:off x="8403463" y="4732543"/>
+            <a:ext cx="1674254" cy="914400"/>
+          </a:xfrm>
+          <a:prstGeom prst="roundRect">
+            <a:avLst>
+              <a:gd name="adj" fmla="val 6808"/>
+            </a:avLst>
+          </a:prstGeom>
+          <a:solidFill>
+            <a:schemeClr val="accent1">
+              <a:lumMod val="75000"/>
+            </a:schemeClr>
+          </a:solidFill>
+          <a:ln>
+            <a:noFill/>
+          </a:ln>
+          <a:effectLst>
+            <a:outerShdw blurRad="50800" dist="38100" dir="5400000" algn="t" rotWithShape="0">
+              <a:prstClr val="black">
+                <a:alpha val="40000"/>
+              </a:prstClr>
+            </a:outerShdw>
+          </a:effectLst>
+        </p:spPr>
+        <p:style>
+          <a:lnRef idx="2">
+            <a:schemeClr val="accent1">
+              <a:shade val="50000"/>
+            </a:schemeClr>
+          </a:lnRef>
+          <a:fillRef idx="1">
+            <a:schemeClr val="accent1"/>
+          </a:fillRef>
+          <a:effectRef idx="0">
+            <a:schemeClr val="accent1"/>
+          </a:effectRef>
+          <a:fontRef idx="minor">
+            <a:schemeClr val="lt1"/>
+          </a:fontRef>
+        </p:style>
+        <p:txBody>
+          <a:bodyPr rtlCol="0" anchor="ctr"/>
+          <a:lstStyle/>
+          <a:p>
+            <a:pPr algn="ctr"/>
+            <a:r>
+              <a:rPr lang="en-US" sz="1100" dirty="0"/>
+              <a:t>External App CRM / ERP)</a:t>
+            </a:r>
+            <a:endParaRPr sz="1100" dirty="0"/>
+          </a:p>
+        </p:txBody>
+      </p:sp>
+      <p:sp>
+        <p:nvSpPr>
+          <p:cNvPr id="8" name="Rectangle 7">
+            <a:extLst>
+              <a:ext uri="{FF2B5EF4-FFF2-40B4-BE49-F238E27FC236}">
+                <a16:creationId xmlns:a16="http://schemas.microsoft.com/office/drawing/2014/main" id="{4212AC6B-32B5-8749-B5BA-C56BD0BBB96A}"/>
+              </a:ext>
+            </a:extLst>
+          </p:cNvPr>
+          <p:cNvSpPr/>
+          <p:nvPr/>
+        </p:nvSpPr>
+        <p:spPr>
+          <a:xfrm>
+            <a:off x="8105175" y="4712550"/>
+            <a:ext cx="298287" cy="914400"/>
+          </a:xfrm>
+          <a:prstGeom prst="rect">
+            <a:avLst/>
+          </a:prstGeom>
+          <a:solidFill>
+            <a:schemeClr val="tx2">
+              <a:lumMod val="20000"/>
+              <a:lumOff val="80000"/>
+            </a:schemeClr>
+          </a:solidFill>
+          <a:ln>
+            <a:noFill/>
+          </a:ln>
+        </p:spPr>
+        <p:style>
+          <a:lnRef idx="2">
+            <a:schemeClr val="accent1">
+              <a:shade val="50000"/>
+            </a:schemeClr>
+          </a:lnRef>
+          <a:fillRef idx="1">
+            <a:schemeClr val="accent1"/>
+          </a:fillRef>
+          <a:effectRef idx="0">
+            <a:schemeClr val="accent1"/>
+          </a:effectRef>
+          <a:fontRef idx="minor">
+            <a:schemeClr val="lt1"/>
+          </a:fontRef>
+        </p:style>
+        <p:txBody>
+          <a:bodyPr vert="vert" rtlCol="0" anchor="ctr"/>
+          <a:lstStyle/>
+          <a:p>
+            <a:pPr algn="ctr"/>
+            <a:r>
+              <a:rPr lang="en-US" sz="1100" dirty="0">
+                <a:solidFill>
+                  <a:schemeClr val="tx2">
+                    <a:lumMod val="75000"/>
+                  </a:schemeClr>
+                </a:solidFill>
+              </a:rPr>
+              <a:t>ASBO</a:t>
+            </a:r>
+            <a:endParaRPr sz="1100" dirty="0">
+              <a:solidFill>
+                <a:schemeClr val="tx2">
+                  <a:lumMod val="75000"/>
+                </a:schemeClr>
+              </a:solidFill>
+            </a:endParaRPr>
+          </a:p>
+        </p:txBody>
+      </p:sp>
+      <p:sp>
+        <p:nvSpPr>
+          <p:cNvPr id="9" name="Rounded Rectangle 8">
+            <a:extLst>
+              <a:ext uri="{FF2B5EF4-FFF2-40B4-BE49-F238E27FC236}">
+                <a16:creationId xmlns:a16="http://schemas.microsoft.com/office/drawing/2014/main" id="{6FD9BF22-5B6A-3B4F-BB30-8F818F4A0114}"/>
+              </a:ext>
+            </a:extLst>
+          </p:cNvPr>
+          <p:cNvSpPr/>
+          <p:nvPr/>
+        </p:nvSpPr>
+        <p:spPr>
+          <a:xfrm>
+            <a:off x="2666347" y="5114299"/>
+            <a:ext cx="1674254" cy="914400"/>
+          </a:xfrm>
+          <a:prstGeom prst="roundRect">
+            <a:avLst>
+              <a:gd name="adj" fmla="val 6808"/>
+            </a:avLst>
+          </a:prstGeom>
+          <a:solidFill>
+            <a:schemeClr val="tx2">
+              <a:lumMod val="75000"/>
+            </a:schemeClr>
+          </a:solidFill>
+          <a:ln>
+            <a:noFill/>
+          </a:ln>
+          <a:effectLst>
+            <a:outerShdw blurRad="50800" dist="38100" dir="5400000" algn="t" rotWithShape="0">
+              <a:prstClr val="black">
+                <a:alpha val="40000"/>
+              </a:prstClr>
+            </a:outerShdw>
+          </a:effectLst>
+        </p:spPr>
+        <p:style>
+          <a:lnRef idx="2">
+            <a:schemeClr val="accent1">
+              <a:shade val="50000"/>
+            </a:schemeClr>
+          </a:lnRef>
+          <a:fillRef idx="1">
+            <a:schemeClr val="accent1"/>
+          </a:fillRef>
+          <a:effectRef idx="0">
+            <a:schemeClr val="accent1"/>
+          </a:effectRef>
+          <a:fontRef idx="minor">
+            <a:schemeClr val="lt1"/>
+          </a:fontRef>
+        </p:style>
+        <p:txBody>
+          <a:bodyPr rtlCol="0" anchor="ctr"/>
+          <a:lstStyle/>
+          <a:p>
+            <a:pPr algn="ctr"/>
+            <a:r>
+              <a:rPr lang="en-US" sz="1100" dirty="0"/>
+              <a:t>Decision Service</a:t>
+            </a:r>
+            <a:endParaRPr sz="1100" dirty="0"/>
+          </a:p>
+        </p:txBody>
+      </p:sp>
+      <p:sp>
+        <p:nvSpPr>
+          <p:cNvPr id="11" name="Rectangle 10">
+            <a:extLst>
+              <a:ext uri="{FF2B5EF4-FFF2-40B4-BE49-F238E27FC236}">
+                <a16:creationId xmlns:a16="http://schemas.microsoft.com/office/drawing/2014/main" id="{F848AE25-6E27-C945-B595-84BFE684158B}"/>
+              </a:ext>
+            </a:extLst>
+          </p:cNvPr>
+          <p:cNvSpPr/>
+          <p:nvPr/>
+        </p:nvSpPr>
+        <p:spPr>
+          <a:xfrm>
+            <a:off x="2653696" y="4873668"/>
+            <a:ext cx="1686905" cy="339322"/>
+          </a:xfrm>
+          <a:prstGeom prst="rect">
+            <a:avLst/>
+          </a:prstGeom>
+          <a:solidFill>
+            <a:schemeClr val="tx2">
+              <a:lumMod val="20000"/>
+              <a:lumOff val="80000"/>
+            </a:schemeClr>
+          </a:solidFill>
+          <a:ln>
+            <a:noFill/>
+          </a:ln>
+        </p:spPr>
+        <p:style>
+          <a:lnRef idx="2">
+            <a:schemeClr val="accent1">
+              <a:shade val="50000"/>
+            </a:schemeClr>
+          </a:lnRef>
+          <a:fillRef idx="1">
+            <a:schemeClr val="accent1"/>
+          </a:fillRef>
+          <a:effectRef idx="0">
+            <a:schemeClr val="accent1"/>
+          </a:effectRef>
+          <a:fontRef idx="minor">
+            <a:schemeClr val="lt1"/>
+          </a:fontRef>
+        </p:style>
+        <p:txBody>
+          <a:bodyPr vert="horz" rtlCol="0" anchor="ctr"/>
+          <a:lstStyle/>
+          <a:p>
+            <a:pPr algn="ctr"/>
+            <a:r>
+              <a:rPr lang="en-US" sz="1100" dirty="0">
+                <a:solidFill>
+                  <a:schemeClr val="tx2">
+                    <a:lumMod val="75000"/>
+                  </a:schemeClr>
+                </a:solidFill>
+              </a:rPr>
+              <a:t>RBO</a:t>
+            </a:r>
+            <a:endParaRPr sz="1100" dirty="0">
+              <a:solidFill>
+                <a:schemeClr val="tx2">
+                  <a:lumMod val="75000"/>
+                </a:schemeClr>
+              </a:solidFill>
+            </a:endParaRPr>
+          </a:p>
+        </p:txBody>
+      </p:sp>
+      <p:grpSp>
+        <p:nvGrpSpPr>
+          <p:cNvPr id="29" name="Group 28">
+            <a:extLst>
+              <a:ext uri="{FF2B5EF4-FFF2-40B4-BE49-F238E27FC236}">
+                <a16:creationId xmlns:a16="http://schemas.microsoft.com/office/drawing/2014/main" id="{651F4BCA-4CBF-D142-88ED-2A1834782639}"/>
+              </a:ext>
+            </a:extLst>
+          </p:cNvPr>
+          <p:cNvGrpSpPr/>
+          <p:nvPr/>
+        </p:nvGrpSpPr>
+        <p:grpSpPr>
+          <a:xfrm>
+            <a:off x="4554075" y="1347516"/>
+            <a:ext cx="1836048" cy="1253722"/>
+            <a:chOff x="6351711" y="1422162"/>
+            <a:chExt cx="1836048" cy="1253722"/>
+          </a:xfrm>
+        </p:grpSpPr>
+        <p:sp>
+          <p:nvSpPr>
+            <p:cNvPr id="10" name="Rounded Rectangle 9">
+              <a:extLst>
+                <a:ext uri="{FF2B5EF4-FFF2-40B4-BE49-F238E27FC236}">
+                  <a16:creationId xmlns:a16="http://schemas.microsoft.com/office/drawing/2014/main" id="{F57D5F8B-B296-2A41-A579-E64791BBE494}"/>
+                </a:ext>
+              </a:extLst>
+            </p:cNvPr>
+            <p:cNvSpPr/>
+            <p:nvPr/>
+          </p:nvSpPr>
+          <p:spPr>
+            <a:xfrm>
+              <a:off x="6351711" y="1761484"/>
+              <a:ext cx="1674254" cy="914400"/>
+            </a:xfrm>
+            <a:prstGeom prst="roundRect">
+              <a:avLst>
+                <a:gd name="adj" fmla="val 6808"/>
+              </a:avLst>
+            </a:prstGeom>
+            <a:solidFill>
+              <a:schemeClr val="tx2">
+                <a:lumMod val="75000"/>
+              </a:schemeClr>
+            </a:solidFill>
+            <a:ln>
+              <a:noFill/>
+            </a:ln>
+            <a:effectLst>
+              <a:outerShdw blurRad="50800" dist="38100" dir="5400000" algn="t" rotWithShape="0">
+                <a:prstClr val="black">
+                  <a:alpha val="40000"/>
+                </a:prstClr>
+              </a:outerShdw>
+            </a:effectLst>
+          </p:spPr>
+          <p:style>
+            <a:lnRef idx="2">
+              <a:schemeClr val="accent1">
+                <a:shade val="50000"/>
+              </a:schemeClr>
+            </a:lnRef>
+            <a:fillRef idx="1">
+              <a:schemeClr val="accent1"/>
+            </a:fillRef>
+            <a:effectRef idx="0">
+              <a:schemeClr val="accent1"/>
+            </a:effectRef>
+            <a:fontRef idx="minor">
+              <a:schemeClr val="lt1"/>
+            </a:fontRef>
+          </p:style>
+          <p:txBody>
+            <a:bodyPr rtlCol="0" anchor="ctr"/>
+            <a:lstStyle/>
+            <a:p>
+              <a:pPr algn="ctr"/>
+              <a:r>
+                <a:rPr lang="en-US" sz="1100" dirty="0"/>
+                <a:t>µService</a:t>
+              </a:r>
+              <a:endParaRPr sz="1100" dirty="0"/>
+            </a:p>
+          </p:txBody>
+        </p:sp>
+        <p:sp>
+          <p:nvSpPr>
+            <p:cNvPr id="12" name="Rectangle 11">
+              <a:extLst>
+                <a:ext uri="{FF2B5EF4-FFF2-40B4-BE49-F238E27FC236}">
+                  <a16:creationId xmlns:a16="http://schemas.microsoft.com/office/drawing/2014/main" id="{67EC7BAC-8979-A149-B31E-14C106576152}"/>
+                </a:ext>
+              </a:extLst>
+            </p:cNvPr>
+            <p:cNvSpPr/>
+            <p:nvPr/>
+          </p:nvSpPr>
+          <p:spPr>
+            <a:xfrm>
+              <a:off x="6351711" y="1422162"/>
+              <a:ext cx="1686905" cy="339322"/>
+            </a:xfrm>
+            <a:prstGeom prst="rect">
+              <a:avLst/>
+            </a:prstGeom>
+            <a:solidFill>
+              <a:schemeClr val="tx2">
+                <a:lumMod val="20000"/>
+                <a:lumOff val="80000"/>
+              </a:schemeClr>
+            </a:solidFill>
+            <a:ln>
+              <a:noFill/>
+            </a:ln>
+          </p:spPr>
+          <p:style>
+            <a:lnRef idx="2">
+              <a:schemeClr val="accent1">
+                <a:shade val="50000"/>
+              </a:schemeClr>
+            </a:lnRef>
+            <a:fillRef idx="1">
+              <a:schemeClr val="accent1"/>
+            </a:fillRef>
+            <a:effectRef idx="0">
+              <a:schemeClr val="accent1"/>
+            </a:effectRef>
+            <a:fontRef idx="minor">
+              <a:schemeClr val="lt1"/>
+            </a:fontRef>
+          </p:style>
+          <p:txBody>
+            <a:bodyPr vert="horz" rtlCol="0" anchor="ctr"/>
+            <a:lstStyle/>
+            <a:p>
+              <a:pPr algn="ctr"/>
+              <a:r>
+                <a:rPr lang="en-US" sz="1100" dirty="0">
+                  <a:solidFill>
+                    <a:schemeClr val="tx2">
+                      <a:lumMod val="75000"/>
+                    </a:schemeClr>
+                  </a:solidFill>
+                </a:rPr>
+                <a:t>API / DTO</a:t>
+              </a:r>
+              <a:endParaRPr sz="1100" dirty="0">
+                <a:solidFill>
+                  <a:schemeClr val="tx2">
+                    <a:lumMod val="75000"/>
+                  </a:schemeClr>
+                </a:solidFill>
+              </a:endParaRPr>
+            </a:p>
+          </p:txBody>
+        </p:sp>
+        <p:sp>
+          <p:nvSpPr>
+            <p:cNvPr id="14" name="Rectangle 13">
+              <a:extLst>
+                <a:ext uri="{FF2B5EF4-FFF2-40B4-BE49-F238E27FC236}">
+                  <a16:creationId xmlns:a16="http://schemas.microsoft.com/office/drawing/2014/main" id="{01170951-269D-7241-83B1-884F809D5D7A}"/>
+                </a:ext>
+              </a:extLst>
+            </p:cNvPr>
+            <p:cNvSpPr/>
+            <p:nvPr/>
+          </p:nvSpPr>
+          <p:spPr>
+            <a:xfrm>
+              <a:off x="7889472" y="1748966"/>
+              <a:ext cx="298287" cy="914400"/>
+            </a:xfrm>
+            <a:prstGeom prst="rect">
+              <a:avLst/>
+            </a:prstGeom>
+            <a:solidFill>
+              <a:schemeClr val="tx2">
+                <a:lumMod val="20000"/>
+                <a:lumOff val="80000"/>
+              </a:schemeClr>
+            </a:solidFill>
+            <a:ln>
+              <a:noFill/>
+            </a:ln>
+          </p:spPr>
+          <p:style>
+            <a:lnRef idx="2">
+              <a:schemeClr val="accent1">
+                <a:shade val="50000"/>
+              </a:schemeClr>
+            </a:lnRef>
+            <a:fillRef idx="1">
+              <a:schemeClr val="accent1"/>
+            </a:fillRef>
+            <a:effectRef idx="0">
+              <a:schemeClr val="accent1"/>
+            </a:effectRef>
+            <a:fontRef idx="minor">
+              <a:schemeClr val="lt1"/>
+            </a:fontRef>
+          </p:style>
+          <p:txBody>
+            <a:bodyPr vert="vert" rtlCol="0" anchor="ctr"/>
+            <a:lstStyle/>
+            <a:p>
+              <a:pPr algn="ctr"/>
+              <a:r>
+                <a:rPr lang="en-US" sz="1100" dirty="0">
+                  <a:solidFill>
+                    <a:schemeClr val="tx2">
+                      <a:lumMod val="75000"/>
+                    </a:schemeClr>
+                  </a:solidFill>
+                </a:rPr>
+                <a:t>Entity</a:t>
+              </a:r>
+              <a:endParaRPr sz="1100" dirty="0">
+                <a:solidFill>
+                  <a:schemeClr val="tx2">
+                    <a:lumMod val="75000"/>
+                  </a:schemeClr>
+                </a:solidFill>
+              </a:endParaRPr>
+            </a:p>
+          </p:txBody>
+        </p:sp>
+      </p:grpSp>
+      <p:sp>
+        <p:nvSpPr>
+          <p:cNvPr id="15" name="Rectangle 14">
+            <a:extLst>
+              <a:ext uri="{FF2B5EF4-FFF2-40B4-BE49-F238E27FC236}">
+                <a16:creationId xmlns:a16="http://schemas.microsoft.com/office/drawing/2014/main" id="{8F44E3B5-08FE-734B-9503-8EFD1EB28C62}"/>
+              </a:ext>
+            </a:extLst>
+          </p:cNvPr>
+          <p:cNvSpPr/>
+          <p:nvPr/>
+        </p:nvSpPr>
+        <p:spPr>
+          <a:xfrm>
+            <a:off x="2286341" y="3548028"/>
+            <a:ext cx="1686905" cy="339322"/>
+          </a:xfrm>
+          <a:prstGeom prst="rect">
+            <a:avLst/>
+          </a:prstGeom>
+          <a:solidFill>
+            <a:schemeClr val="tx2">
+              <a:lumMod val="20000"/>
+              <a:lumOff val="80000"/>
+            </a:schemeClr>
+          </a:solidFill>
+          <a:ln>
+            <a:noFill/>
+          </a:ln>
+        </p:spPr>
+        <p:style>
+          <a:lnRef idx="2">
+            <a:schemeClr val="accent1">
+              <a:shade val="50000"/>
+            </a:schemeClr>
+          </a:lnRef>
+          <a:fillRef idx="1">
+            <a:schemeClr val="accent1"/>
+          </a:fillRef>
+          <a:effectRef idx="0">
+            <a:schemeClr val="accent1"/>
+          </a:effectRef>
+          <a:fontRef idx="minor">
+            <a:schemeClr val="lt1"/>
+          </a:fontRef>
+        </p:style>
+        <p:txBody>
+          <a:bodyPr vert="horz" rtlCol="0" anchor="ctr"/>
+          <a:lstStyle/>
+          <a:p>
+            <a:pPr algn="ctr"/>
+            <a:r>
+              <a:rPr lang="en-US" sz="1100" dirty="0">
+                <a:solidFill>
+                  <a:schemeClr val="tx2">
+                    <a:lumMod val="75000"/>
+                  </a:schemeClr>
+                </a:solidFill>
+              </a:rPr>
+              <a:t>Event Model</a:t>
+            </a:r>
+            <a:endParaRPr sz="1100" dirty="0">
+              <a:solidFill>
+                <a:schemeClr val="tx2">
+                  <a:lumMod val="75000"/>
+                </a:schemeClr>
+              </a:solidFill>
+            </a:endParaRPr>
+          </a:p>
+        </p:txBody>
+      </p:sp>
+      <p:sp>
+        <p:nvSpPr>
+          <p:cNvPr id="16" name="Rounded Rectangle 15">
+            <a:extLst>
+              <a:ext uri="{FF2B5EF4-FFF2-40B4-BE49-F238E27FC236}">
+                <a16:creationId xmlns:a16="http://schemas.microsoft.com/office/drawing/2014/main" id="{AD944324-F8BD-5C4E-97A7-A9DE9DAA1B09}"/>
+              </a:ext>
+            </a:extLst>
+          </p:cNvPr>
+          <p:cNvSpPr/>
+          <p:nvPr/>
+        </p:nvSpPr>
+        <p:spPr>
+          <a:xfrm>
+            <a:off x="5834194" y="3180235"/>
+            <a:ext cx="1674254" cy="914400"/>
+          </a:xfrm>
+          <a:prstGeom prst="roundRect">
+            <a:avLst>
+              <a:gd name="adj" fmla="val 6808"/>
+            </a:avLst>
+          </a:prstGeom>
+          <a:solidFill>
+            <a:schemeClr val="tx2">
+              <a:lumMod val="75000"/>
+            </a:schemeClr>
+          </a:solidFill>
+          <a:ln>
+            <a:noFill/>
+          </a:ln>
+          <a:effectLst>
+            <a:outerShdw blurRad="50800" dist="38100" dir="5400000" algn="t" rotWithShape="0">
+              <a:prstClr val="black">
+                <a:alpha val="40000"/>
+              </a:prstClr>
+            </a:outerShdw>
+          </a:effectLst>
+        </p:spPr>
+        <p:style>
+          <a:lnRef idx="2">
+            <a:schemeClr val="accent1">
+              <a:shade val="50000"/>
+            </a:schemeClr>
+          </a:lnRef>
+          <a:fillRef idx="1">
+            <a:schemeClr val="accent1"/>
+          </a:fillRef>
+          <a:effectRef idx="0">
+            <a:schemeClr val="accent1"/>
+          </a:effectRef>
+          <a:fontRef idx="minor">
+            <a:schemeClr val="lt1"/>
+          </a:fontRef>
+        </p:style>
+        <p:txBody>
+          <a:bodyPr rtlCol="0" anchor="t"/>
+          <a:lstStyle/>
+          <a:p>
+            <a:pPr algn="ctr"/>
+            <a:r>
+              <a:rPr lang="en-US" sz="1100" dirty="0"/>
+              <a:t>Enterprise Service Bus</a:t>
+            </a:r>
+            <a:endParaRPr sz="1100" dirty="0"/>
+          </a:p>
+        </p:txBody>
+      </p:sp>
+      <p:sp>
+        <p:nvSpPr>
+          <p:cNvPr id="13" name="Rectangle 12">
+            <a:extLst>
+              <a:ext uri="{FF2B5EF4-FFF2-40B4-BE49-F238E27FC236}">
+                <a16:creationId xmlns:a16="http://schemas.microsoft.com/office/drawing/2014/main" id="{824BD393-D39A-D74D-B642-54D0DD849E9F}"/>
+              </a:ext>
+            </a:extLst>
+          </p:cNvPr>
+          <p:cNvSpPr/>
+          <p:nvPr/>
+        </p:nvSpPr>
+        <p:spPr>
+          <a:xfrm>
+            <a:off x="6096000" y="3573972"/>
+            <a:ext cx="1270715" cy="332312"/>
+          </a:xfrm>
+          <a:prstGeom prst="rect">
+            <a:avLst/>
+          </a:prstGeom>
+          <a:solidFill>
+            <a:schemeClr val="tx2">
+              <a:lumMod val="20000"/>
+              <a:lumOff val="80000"/>
+            </a:schemeClr>
+          </a:solidFill>
+          <a:ln>
+            <a:noFill/>
+          </a:ln>
+        </p:spPr>
+        <p:style>
+          <a:lnRef idx="2">
+            <a:schemeClr val="accent1">
+              <a:shade val="50000"/>
+            </a:schemeClr>
+          </a:lnRef>
+          <a:fillRef idx="1">
+            <a:schemeClr val="accent1"/>
+          </a:fillRef>
+          <a:effectRef idx="0">
+            <a:schemeClr val="accent1"/>
+          </a:effectRef>
+          <a:fontRef idx="minor">
+            <a:schemeClr val="lt1"/>
+          </a:fontRef>
+        </p:style>
+        <p:txBody>
+          <a:bodyPr vert="horz" rtlCol="0" anchor="ctr"/>
+          <a:lstStyle/>
+          <a:p>
+            <a:pPr algn="ctr"/>
+            <a:r>
+              <a:rPr lang="en-US" sz="1100" dirty="0">
+                <a:solidFill>
+                  <a:schemeClr val="tx2">
+                    <a:lumMod val="75000"/>
+                  </a:schemeClr>
+                </a:solidFill>
+              </a:rPr>
+              <a:t>Message Model</a:t>
+            </a:r>
+            <a:endParaRPr sz="1100" dirty="0">
+              <a:solidFill>
+                <a:schemeClr val="tx2">
+                  <a:lumMod val="75000"/>
+                </a:schemeClr>
+              </a:solidFill>
+            </a:endParaRPr>
+          </a:p>
+        </p:txBody>
+      </p:sp>
+      <p:sp>
+        <p:nvSpPr>
+          <p:cNvPr id="17" name="Rounded Rectangle 16">
+            <a:extLst>
+              <a:ext uri="{FF2B5EF4-FFF2-40B4-BE49-F238E27FC236}">
+                <a16:creationId xmlns:a16="http://schemas.microsoft.com/office/drawing/2014/main" id="{9D929BF9-A7B9-A24F-9455-F9D62C0EDC1D}"/>
+              </a:ext>
+            </a:extLst>
+          </p:cNvPr>
+          <p:cNvSpPr/>
+          <p:nvPr/>
+        </p:nvSpPr>
+        <p:spPr>
+          <a:xfrm>
+            <a:off x="577823" y="1697482"/>
+            <a:ext cx="1752828" cy="914400"/>
+          </a:xfrm>
+          <a:prstGeom prst="roundRect">
+            <a:avLst>
+              <a:gd name="adj" fmla="val 6808"/>
+            </a:avLst>
+          </a:prstGeom>
+          <a:solidFill>
+            <a:schemeClr val="tx2">
+              <a:lumMod val="75000"/>
+            </a:schemeClr>
+          </a:solidFill>
+          <a:ln>
+            <a:noFill/>
+          </a:ln>
+          <a:effectLst>
+            <a:outerShdw blurRad="50800" dist="38100" dir="5400000" algn="t" rotWithShape="0">
+              <a:prstClr val="black">
+                <a:alpha val="40000"/>
+              </a:prstClr>
+            </a:outerShdw>
+          </a:effectLst>
+        </p:spPr>
+        <p:style>
+          <a:lnRef idx="2">
+            <a:schemeClr val="accent1">
+              <a:shade val="50000"/>
+            </a:schemeClr>
+          </a:lnRef>
+          <a:fillRef idx="1">
+            <a:schemeClr val="accent1"/>
+          </a:fillRef>
+          <a:effectRef idx="0">
+            <a:schemeClr val="accent1"/>
+          </a:effectRef>
+          <a:fontRef idx="minor">
+            <a:schemeClr val="lt1"/>
+          </a:fontRef>
+        </p:style>
+        <p:txBody>
+          <a:bodyPr rtlCol="0" anchor="t"/>
+          <a:lstStyle/>
+          <a:p>
+            <a:pPr algn="ctr"/>
+            <a:r>
+              <a:rPr lang="en-US" sz="1100" dirty="0"/>
+              <a:t>Single Page Application</a:t>
+            </a:r>
+            <a:endParaRPr sz="1100" dirty="0"/>
+          </a:p>
+        </p:txBody>
+      </p:sp>
+      <p:sp>
+        <p:nvSpPr>
+          <p:cNvPr id="18" name="Rectangle 17">
+            <a:extLst>
+              <a:ext uri="{FF2B5EF4-FFF2-40B4-BE49-F238E27FC236}">
+                <a16:creationId xmlns:a16="http://schemas.microsoft.com/office/drawing/2014/main" id="{EEE78779-6BA9-3841-8897-0102FB2FCA4A}"/>
+              </a:ext>
+            </a:extLst>
+          </p:cNvPr>
+          <p:cNvSpPr/>
+          <p:nvPr/>
+        </p:nvSpPr>
+        <p:spPr>
+          <a:xfrm>
+            <a:off x="610784" y="2206166"/>
+            <a:ext cx="1686905" cy="339322"/>
+          </a:xfrm>
+          <a:prstGeom prst="rect">
+            <a:avLst/>
+          </a:prstGeom>
+          <a:solidFill>
+            <a:schemeClr val="tx2">
+              <a:lumMod val="20000"/>
+              <a:lumOff val="80000"/>
+            </a:schemeClr>
+          </a:solidFill>
+          <a:ln>
+            <a:noFill/>
+          </a:ln>
+        </p:spPr>
+        <p:style>
+          <a:lnRef idx="2">
+            <a:schemeClr val="accent1">
+              <a:shade val="50000"/>
+            </a:schemeClr>
+          </a:lnRef>
+          <a:fillRef idx="1">
+            <a:schemeClr val="accent1"/>
+          </a:fillRef>
+          <a:effectRef idx="0">
+            <a:schemeClr val="accent1"/>
+          </a:effectRef>
+          <a:fontRef idx="minor">
+            <a:schemeClr val="lt1"/>
+          </a:fontRef>
+        </p:style>
+        <p:txBody>
+          <a:bodyPr vert="horz" rtlCol="0" anchor="ctr"/>
+          <a:lstStyle/>
+          <a:p>
+            <a:pPr algn="ctr"/>
+            <a:r>
+              <a:rPr lang="en-US" sz="1100" dirty="0">
+                <a:solidFill>
+                  <a:schemeClr val="tx2">
+                    <a:lumMod val="75000"/>
+                  </a:schemeClr>
+                </a:solidFill>
+              </a:rPr>
+              <a:t>User Interface Data model</a:t>
+            </a:r>
+            <a:endParaRPr sz="1100" dirty="0">
+              <a:solidFill>
+                <a:schemeClr val="tx2">
+                  <a:lumMod val="75000"/>
+                </a:schemeClr>
+              </a:solidFill>
+            </a:endParaRPr>
+          </a:p>
+        </p:txBody>
+      </p:sp>
+      <p:grpSp>
+        <p:nvGrpSpPr>
+          <p:cNvPr id="31" name="Group 30">
+            <a:extLst>
+              <a:ext uri="{FF2B5EF4-FFF2-40B4-BE49-F238E27FC236}">
+                <a16:creationId xmlns:a16="http://schemas.microsoft.com/office/drawing/2014/main" id="{8F82E2F2-E417-8B4D-84E9-87FE968E6384}"/>
+              </a:ext>
+            </a:extLst>
+          </p:cNvPr>
+          <p:cNvGrpSpPr/>
+          <p:nvPr/>
+        </p:nvGrpSpPr>
+        <p:grpSpPr>
+          <a:xfrm>
+            <a:off x="8304795" y="2840913"/>
+            <a:ext cx="1686905" cy="1253722"/>
+            <a:chOff x="8688526" y="4774977"/>
+            <a:chExt cx="1686905" cy="1253722"/>
+          </a:xfrm>
+        </p:grpSpPr>
+        <p:sp>
+          <p:nvSpPr>
+            <p:cNvPr id="20" name="Rounded Rectangle 19">
+              <a:extLst>
+                <a:ext uri="{FF2B5EF4-FFF2-40B4-BE49-F238E27FC236}">
+                  <a16:creationId xmlns:a16="http://schemas.microsoft.com/office/drawing/2014/main" id="{0BA07F0D-4EBD-DD4A-9195-A1F9E000BB08}"/>
+                </a:ext>
+              </a:extLst>
+            </p:cNvPr>
+            <p:cNvSpPr/>
+            <p:nvPr/>
+          </p:nvSpPr>
+          <p:spPr>
+            <a:xfrm>
+              <a:off x="8688526" y="5114299"/>
+              <a:ext cx="1674254" cy="914400"/>
+            </a:xfrm>
+            <a:prstGeom prst="roundRect">
+              <a:avLst>
+                <a:gd name="adj" fmla="val 6808"/>
+              </a:avLst>
+            </a:prstGeom>
+            <a:solidFill>
+              <a:schemeClr val="tx2">
+                <a:lumMod val="75000"/>
+              </a:schemeClr>
+            </a:solidFill>
+            <a:ln>
+              <a:noFill/>
+            </a:ln>
+            <a:effectLst>
+              <a:outerShdw blurRad="50800" dist="38100" dir="5400000" algn="t" rotWithShape="0">
+                <a:prstClr val="black">
+                  <a:alpha val="40000"/>
+                </a:prstClr>
+              </a:outerShdw>
+            </a:effectLst>
+          </p:spPr>
+          <p:style>
+            <a:lnRef idx="2">
+              <a:schemeClr val="accent1">
+                <a:shade val="50000"/>
+              </a:schemeClr>
+            </a:lnRef>
+            <a:fillRef idx="1">
+              <a:schemeClr val="accent1"/>
+            </a:fillRef>
+            <a:effectRef idx="0">
+              <a:schemeClr val="accent1"/>
+            </a:effectRef>
+            <a:fontRef idx="minor">
+              <a:schemeClr val="lt1"/>
+            </a:fontRef>
+          </p:style>
+          <p:txBody>
+            <a:bodyPr rtlCol="0" anchor="ctr"/>
+            <a:lstStyle/>
+            <a:p>
+              <a:pPr algn="ctr"/>
+              <a:r>
+                <a:rPr lang="en-US" sz="1100" dirty="0"/>
+                <a:t>Predictive Scoring Service</a:t>
+              </a:r>
+              <a:endParaRPr sz="1100" dirty="0"/>
+            </a:p>
+          </p:txBody>
+        </p:sp>
+        <p:sp>
+          <p:nvSpPr>
+            <p:cNvPr id="21" name="Rectangle 20">
+              <a:extLst>
+                <a:ext uri="{FF2B5EF4-FFF2-40B4-BE49-F238E27FC236}">
+                  <a16:creationId xmlns:a16="http://schemas.microsoft.com/office/drawing/2014/main" id="{AFF88A3D-EF22-7540-8033-178D8D2F3899}"/>
+                </a:ext>
+              </a:extLst>
+            </p:cNvPr>
+            <p:cNvSpPr/>
+            <p:nvPr/>
+          </p:nvSpPr>
+          <p:spPr>
+            <a:xfrm>
+              <a:off x="8688526" y="4774977"/>
+              <a:ext cx="1686905" cy="339322"/>
+            </a:xfrm>
+            <a:prstGeom prst="rect">
+              <a:avLst/>
+            </a:prstGeom>
+            <a:solidFill>
+              <a:schemeClr val="tx2">
+                <a:lumMod val="20000"/>
+                <a:lumOff val="80000"/>
+              </a:schemeClr>
+            </a:solidFill>
+            <a:ln>
+              <a:noFill/>
+            </a:ln>
+          </p:spPr>
+          <p:style>
+            <a:lnRef idx="2">
+              <a:schemeClr val="accent1">
+                <a:shade val="50000"/>
+              </a:schemeClr>
+            </a:lnRef>
+            <a:fillRef idx="1">
+              <a:schemeClr val="accent1"/>
+            </a:fillRef>
+            <a:effectRef idx="0">
+              <a:schemeClr val="accent1"/>
+            </a:effectRef>
+            <a:fontRef idx="minor">
+              <a:schemeClr val="lt1"/>
+            </a:fontRef>
+          </p:style>
+          <p:txBody>
+            <a:bodyPr vert="horz" rtlCol="0" anchor="ctr"/>
+            <a:lstStyle/>
+            <a:p>
+              <a:pPr algn="ctr"/>
+              <a:r>
+                <a:rPr lang="en-US" sz="1100" dirty="0">
+                  <a:solidFill>
+                    <a:schemeClr val="tx2">
+                      <a:lumMod val="75000"/>
+                    </a:schemeClr>
+                  </a:solidFill>
+                </a:rPr>
+                <a:t>tuples</a:t>
+              </a:r>
+              <a:endParaRPr sz="1100" dirty="0">
+                <a:solidFill>
+                  <a:schemeClr val="tx2">
+                    <a:lumMod val="75000"/>
+                  </a:schemeClr>
+                </a:solidFill>
+              </a:endParaRPr>
+            </a:p>
+          </p:txBody>
+        </p:sp>
+      </p:grpSp>
+      <p:sp>
+        <p:nvSpPr>
+          <p:cNvPr id="22" name="Rounded Rectangle 21">
+            <a:extLst>
+              <a:ext uri="{FF2B5EF4-FFF2-40B4-BE49-F238E27FC236}">
+                <a16:creationId xmlns:a16="http://schemas.microsoft.com/office/drawing/2014/main" id="{5AD4564D-CC78-D649-A0AD-B30BA7184908}"/>
+              </a:ext>
+            </a:extLst>
+          </p:cNvPr>
+          <p:cNvSpPr/>
+          <p:nvPr/>
+        </p:nvSpPr>
+        <p:spPr>
+          <a:xfrm>
+            <a:off x="757478" y="5089165"/>
+            <a:ext cx="1674254" cy="914400"/>
+          </a:xfrm>
+          <a:prstGeom prst="roundRect">
+            <a:avLst>
+              <a:gd name="adj" fmla="val 6808"/>
+            </a:avLst>
+          </a:prstGeom>
+          <a:solidFill>
+            <a:schemeClr val="tx2">
+              <a:lumMod val="75000"/>
+            </a:schemeClr>
+          </a:solidFill>
+          <a:ln>
+            <a:noFill/>
+          </a:ln>
+          <a:effectLst>
+            <a:outerShdw blurRad="50800" dist="38100" dir="5400000" algn="t" rotWithShape="0">
+              <a:prstClr val="black">
+                <a:alpha val="40000"/>
+              </a:prstClr>
+            </a:outerShdw>
+          </a:effectLst>
+        </p:spPr>
+        <p:style>
+          <a:lnRef idx="2">
+            <a:schemeClr val="accent1">
+              <a:shade val="50000"/>
+            </a:schemeClr>
+          </a:lnRef>
+          <a:fillRef idx="1">
+            <a:schemeClr val="accent1"/>
+          </a:fillRef>
+          <a:effectRef idx="0">
+            <a:schemeClr val="accent1"/>
+          </a:effectRef>
+          <a:fontRef idx="minor">
+            <a:schemeClr val="lt1"/>
+          </a:fontRef>
+        </p:style>
+        <p:txBody>
+          <a:bodyPr rtlCol="0" anchor="t"/>
+          <a:lstStyle/>
+          <a:p>
+            <a:pPr algn="ctr"/>
+            <a:r>
+              <a:rPr lang="en-US" sz="1100" dirty="0"/>
+              <a:t>Process Automation</a:t>
+            </a:r>
+            <a:endParaRPr sz="1100" dirty="0"/>
+          </a:p>
+        </p:txBody>
+      </p:sp>
+      <p:sp>
+        <p:nvSpPr>
+          <p:cNvPr id="23" name="Rectangle 22">
+            <a:extLst>
+              <a:ext uri="{FF2B5EF4-FFF2-40B4-BE49-F238E27FC236}">
+                <a16:creationId xmlns:a16="http://schemas.microsoft.com/office/drawing/2014/main" id="{0B7884F7-C429-7D4F-B06E-7629D6708781}"/>
+              </a:ext>
+            </a:extLst>
+          </p:cNvPr>
+          <p:cNvSpPr/>
+          <p:nvPr/>
+        </p:nvSpPr>
+        <p:spPr>
+          <a:xfrm>
+            <a:off x="841596" y="5507844"/>
+            <a:ext cx="1444745" cy="339322"/>
+          </a:xfrm>
+          <a:prstGeom prst="rect">
+            <a:avLst/>
+          </a:prstGeom>
+          <a:solidFill>
+            <a:schemeClr val="tx2">
+              <a:lumMod val="20000"/>
+              <a:lumOff val="80000"/>
+            </a:schemeClr>
+          </a:solidFill>
+          <a:ln>
+            <a:noFill/>
+          </a:ln>
+        </p:spPr>
+        <p:style>
+          <a:lnRef idx="2">
+            <a:schemeClr val="accent1">
+              <a:shade val="50000"/>
+            </a:schemeClr>
+          </a:lnRef>
+          <a:fillRef idx="1">
+            <a:schemeClr val="accent1"/>
+          </a:fillRef>
+          <a:effectRef idx="0">
+            <a:schemeClr val="accent1"/>
+          </a:effectRef>
+          <a:fontRef idx="minor">
+            <a:schemeClr val="lt1"/>
+          </a:fontRef>
+        </p:style>
+        <p:txBody>
+          <a:bodyPr vert="horz" rtlCol="0" anchor="ctr"/>
+          <a:lstStyle/>
+          <a:p>
+            <a:pPr algn="ctr"/>
+            <a:r>
+              <a:rPr lang="en-US" sz="1100" dirty="0">
+                <a:solidFill>
+                  <a:schemeClr val="tx2">
+                    <a:lumMod val="75000"/>
+                  </a:schemeClr>
+                </a:solidFill>
+              </a:rPr>
+              <a:t>Process App Data Model</a:t>
+            </a:r>
+            <a:endParaRPr sz="1100" dirty="0">
+              <a:solidFill>
+                <a:schemeClr val="tx2">
+                  <a:lumMod val="75000"/>
+                </a:schemeClr>
+              </a:solidFill>
+            </a:endParaRPr>
+          </a:p>
+        </p:txBody>
+      </p:sp>
+      <p:sp>
+        <p:nvSpPr>
+          <p:cNvPr id="24" name="Can 23">
+            <a:extLst>
+              <a:ext uri="{FF2B5EF4-FFF2-40B4-BE49-F238E27FC236}">
+                <a16:creationId xmlns:a16="http://schemas.microsoft.com/office/drawing/2014/main" id="{65834FE1-9178-7448-A05D-773A6B50BA35}"/>
+              </a:ext>
+            </a:extLst>
+          </p:cNvPr>
+          <p:cNvSpPr/>
+          <p:nvPr/>
+        </p:nvSpPr>
+        <p:spPr>
+          <a:xfrm>
+            <a:off x="10363201" y="1420586"/>
+            <a:ext cx="914400" cy="553791"/>
+          </a:xfrm>
+          <a:prstGeom prst="can">
+            <a:avLst/>
+          </a:prstGeom>
+          <a:solidFill>
+            <a:schemeClr val="tx2">
+              <a:lumMod val="75000"/>
+            </a:schemeClr>
+          </a:solidFill>
+          <a:ln>
+            <a:noFill/>
+          </a:ln>
+        </p:spPr>
+        <p:style>
+          <a:lnRef idx="2">
+            <a:schemeClr val="accent1">
+              <a:shade val="50000"/>
+            </a:schemeClr>
+          </a:lnRef>
+          <a:fillRef idx="1">
+            <a:schemeClr val="accent1"/>
+          </a:fillRef>
+          <a:effectRef idx="0">
+            <a:schemeClr val="accent1"/>
+          </a:effectRef>
+          <a:fontRef idx="minor">
+            <a:schemeClr val="lt1"/>
+          </a:fontRef>
+        </p:style>
+        <p:txBody>
+          <a:bodyPr rtlCol="0" anchor="ctr"/>
+          <a:lstStyle/>
+          <a:p>
+            <a:pPr algn="ctr"/>
+            <a:r>
+              <a:rPr lang="en-US" sz="1000" dirty="0"/>
+              <a:t>Documents </a:t>
+            </a:r>
+            <a:endParaRPr sz="1000" dirty="0"/>
+          </a:p>
+        </p:txBody>
+      </p:sp>
+      <p:sp>
+        <p:nvSpPr>
+          <p:cNvPr id="25" name="Rectangle 24">
+            <a:extLst>
+              <a:ext uri="{FF2B5EF4-FFF2-40B4-BE49-F238E27FC236}">
+                <a16:creationId xmlns:a16="http://schemas.microsoft.com/office/drawing/2014/main" id="{84D436DE-8F08-EA41-A933-7F0A80F7CFD1}"/>
+              </a:ext>
+            </a:extLst>
+          </p:cNvPr>
+          <p:cNvSpPr/>
+          <p:nvPr/>
+        </p:nvSpPr>
+        <p:spPr>
+          <a:xfrm>
+            <a:off x="757478" y="4766081"/>
+            <a:ext cx="1686905" cy="339322"/>
+          </a:xfrm>
+          <a:prstGeom prst="rect">
+            <a:avLst/>
+          </a:prstGeom>
+          <a:solidFill>
+            <a:schemeClr val="tx2">
+              <a:lumMod val="20000"/>
+              <a:lumOff val="80000"/>
+            </a:schemeClr>
+          </a:solidFill>
+          <a:ln>
+            <a:noFill/>
+          </a:ln>
+        </p:spPr>
+        <p:style>
+          <a:lnRef idx="2">
+            <a:schemeClr val="accent1">
+              <a:shade val="50000"/>
+            </a:schemeClr>
+          </a:lnRef>
+          <a:fillRef idx="1">
+            <a:schemeClr val="accent1"/>
+          </a:fillRef>
+          <a:effectRef idx="0">
+            <a:schemeClr val="accent1"/>
+          </a:effectRef>
+          <a:fontRef idx="minor">
+            <a:schemeClr val="lt1"/>
+          </a:fontRef>
+        </p:style>
+        <p:txBody>
+          <a:bodyPr vert="horz" rtlCol="0" anchor="ctr"/>
+          <a:lstStyle/>
+          <a:p>
+            <a:pPr algn="ctr"/>
+            <a:r>
+              <a:rPr lang="en-US" sz="1100" dirty="0">
+                <a:solidFill>
+                  <a:schemeClr val="tx2">
+                    <a:lumMod val="75000"/>
+                  </a:schemeClr>
+                </a:solidFill>
+              </a:rPr>
+              <a:t>API / DTO / Message</a:t>
+            </a:r>
+            <a:endParaRPr sz="1100" dirty="0">
+              <a:solidFill>
+                <a:schemeClr val="tx2">
+                  <a:lumMod val="75000"/>
+                </a:schemeClr>
+              </a:solidFill>
+            </a:endParaRPr>
+          </a:p>
+        </p:txBody>
+      </p:sp>
+      <p:sp>
+        <p:nvSpPr>
+          <p:cNvPr id="26" name="Rectangle 25">
+            <a:extLst>
+              <a:ext uri="{FF2B5EF4-FFF2-40B4-BE49-F238E27FC236}">
+                <a16:creationId xmlns:a16="http://schemas.microsoft.com/office/drawing/2014/main" id="{40D407AF-E392-FE44-80F9-C8AA706FDB5D}"/>
+              </a:ext>
+            </a:extLst>
+          </p:cNvPr>
+          <p:cNvSpPr/>
+          <p:nvPr/>
+        </p:nvSpPr>
+        <p:spPr>
+          <a:xfrm>
+            <a:off x="1487898" y="3063335"/>
+            <a:ext cx="6401574" cy="1182783"/>
+          </a:xfrm>
+          <a:custGeom>
+            <a:avLst/>
+            <a:gdLst>
+              <a:gd name="connsiteX0" fmla="*/ 0 w 6401574"/>
+              <a:gd name="connsiteY0" fmla="*/ 0 h 1182783"/>
+              <a:gd name="connsiteX1" fmla="*/ 517946 w 6401574"/>
+              <a:gd name="connsiteY1" fmla="*/ 0 h 1182783"/>
+              <a:gd name="connsiteX2" fmla="*/ 907860 w 6401574"/>
+              <a:gd name="connsiteY2" fmla="*/ 0 h 1182783"/>
+              <a:gd name="connsiteX3" fmla="*/ 1617852 w 6401574"/>
+              <a:gd name="connsiteY3" fmla="*/ 0 h 1182783"/>
+              <a:gd name="connsiteX4" fmla="*/ 2135798 w 6401574"/>
+              <a:gd name="connsiteY4" fmla="*/ 0 h 1182783"/>
+              <a:gd name="connsiteX5" fmla="*/ 2653743 w 6401574"/>
+              <a:gd name="connsiteY5" fmla="*/ 0 h 1182783"/>
+              <a:gd name="connsiteX6" fmla="*/ 3363736 w 6401574"/>
+              <a:gd name="connsiteY6" fmla="*/ 0 h 1182783"/>
+              <a:gd name="connsiteX7" fmla="*/ 3817666 w 6401574"/>
+              <a:gd name="connsiteY7" fmla="*/ 0 h 1182783"/>
+              <a:gd name="connsiteX8" fmla="*/ 4527659 w 6401574"/>
+              <a:gd name="connsiteY8" fmla="*/ 0 h 1182783"/>
+              <a:gd name="connsiteX9" fmla="*/ 5237651 w 6401574"/>
+              <a:gd name="connsiteY9" fmla="*/ 0 h 1182783"/>
+              <a:gd name="connsiteX10" fmla="*/ 5819613 w 6401574"/>
+              <a:gd name="connsiteY10" fmla="*/ 0 h 1182783"/>
+              <a:gd name="connsiteX11" fmla="*/ 6401574 w 6401574"/>
+              <a:gd name="connsiteY11" fmla="*/ 0 h 1182783"/>
+              <a:gd name="connsiteX12" fmla="*/ 6401574 w 6401574"/>
+              <a:gd name="connsiteY12" fmla="*/ 579564 h 1182783"/>
+              <a:gd name="connsiteX13" fmla="*/ 6401574 w 6401574"/>
+              <a:gd name="connsiteY13" fmla="*/ 1182783 h 1182783"/>
+              <a:gd name="connsiteX14" fmla="*/ 5819613 w 6401574"/>
+              <a:gd name="connsiteY14" fmla="*/ 1182783 h 1182783"/>
+              <a:gd name="connsiteX15" fmla="*/ 5365683 w 6401574"/>
+              <a:gd name="connsiteY15" fmla="*/ 1182783 h 1182783"/>
+              <a:gd name="connsiteX16" fmla="*/ 4783722 w 6401574"/>
+              <a:gd name="connsiteY16" fmla="*/ 1182783 h 1182783"/>
+              <a:gd name="connsiteX17" fmla="*/ 4073729 w 6401574"/>
+              <a:gd name="connsiteY17" fmla="*/ 1182783 h 1182783"/>
+              <a:gd name="connsiteX18" fmla="*/ 3491768 w 6401574"/>
+              <a:gd name="connsiteY18" fmla="*/ 1182783 h 1182783"/>
+              <a:gd name="connsiteX19" fmla="*/ 3101854 w 6401574"/>
+              <a:gd name="connsiteY19" fmla="*/ 1182783 h 1182783"/>
+              <a:gd name="connsiteX20" fmla="*/ 2647924 w 6401574"/>
+              <a:gd name="connsiteY20" fmla="*/ 1182783 h 1182783"/>
+              <a:gd name="connsiteX21" fmla="*/ 1937931 w 6401574"/>
+              <a:gd name="connsiteY21" fmla="*/ 1182783 h 1182783"/>
+              <a:gd name="connsiteX22" fmla="*/ 1355970 w 6401574"/>
+              <a:gd name="connsiteY22" fmla="*/ 1182783 h 1182783"/>
+              <a:gd name="connsiteX23" fmla="*/ 902040 w 6401574"/>
+              <a:gd name="connsiteY23" fmla="*/ 1182783 h 1182783"/>
+              <a:gd name="connsiteX24" fmla="*/ 0 w 6401574"/>
+              <a:gd name="connsiteY24" fmla="*/ 1182783 h 1182783"/>
+              <a:gd name="connsiteX25" fmla="*/ 0 w 6401574"/>
+              <a:gd name="connsiteY25" fmla="*/ 626875 h 1182783"/>
+              <a:gd name="connsiteX26" fmla="*/ 0 w 6401574"/>
+              <a:gd name="connsiteY26" fmla="*/ 0 h 1182783"/>
+            </a:gdLst>
+            <a:ahLst/>
+            <a:cxnLst>
+              <a:cxn ang="0">
+                <a:pos x="connsiteX0" y="connsiteY0"/>
+              </a:cxn>
+              <a:cxn ang="0">
+                <a:pos x="connsiteX1" y="connsiteY1"/>
+              </a:cxn>
+              <a:cxn ang="0">
+                <a:pos x="connsiteX2" y="connsiteY2"/>
+              </a:cxn>
+              <a:cxn ang="0">
+                <a:pos x="connsiteX3" y="connsiteY3"/>
+              </a:cxn>
+              <a:cxn ang="0">
+                <a:pos x="connsiteX4" y="connsiteY4"/>
+              </a:cxn>
+              <a:cxn ang="0">
+                <a:pos x="connsiteX5" y="connsiteY5"/>
+              </a:cxn>
+              <a:cxn ang="0">
+                <a:pos x="connsiteX6" y="connsiteY6"/>
+              </a:cxn>
+              <a:cxn ang="0">
+                <a:pos x="connsiteX7" y="connsiteY7"/>
+              </a:cxn>
+              <a:cxn ang="0">
+                <a:pos x="connsiteX8" y="connsiteY8"/>
+              </a:cxn>
+              <a:cxn ang="0">
+                <a:pos x="connsiteX9" y="connsiteY9"/>
+              </a:cxn>
+              <a:cxn ang="0">
+                <a:pos x="connsiteX10" y="connsiteY10"/>
+              </a:cxn>
+              <a:cxn ang="0">
+                <a:pos x="connsiteX11" y="connsiteY11"/>
+              </a:cxn>
+              <a:cxn ang="0">
+                <a:pos x="connsiteX12" y="connsiteY12"/>
+              </a:cxn>
+              <a:cxn ang="0">
+                <a:pos x="connsiteX13" y="connsiteY13"/>
+              </a:cxn>
+              <a:cxn ang="0">
+                <a:pos x="connsiteX14" y="connsiteY14"/>
+              </a:cxn>
+              <a:cxn ang="0">
+                <a:pos x="connsiteX15" y="connsiteY15"/>
+              </a:cxn>
+              <a:cxn ang="0">
+                <a:pos x="connsiteX16" y="connsiteY16"/>
+              </a:cxn>
+              <a:cxn ang="0">
+                <a:pos x="connsiteX17" y="connsiteY17"/>
+              </a:cxn>
+              <a:cxn ang="0">
+                <a:pos x="connsiteX18" y="connsiteY18"/>
+              </a:cxn>
+              <a:cxn ang="0">
+                <a:pos x="connsiteX19" y="connsiteY19"/>
+              </a:cxn>
+              <a:cxn ang="0">
+                <a:pos x="connsiteX20" y="connsiteY20"/>
+              </a:cxn>
+              <a:cxn ang="0">
+                <a:pos x="connsiteX21" y="connsiteY21"/>
+              </a:cxn>
+              <a:cxn ang="0">
+                <a:pos x="connsiteX22" y="connsiteY22"/>
+              </a:cxn>
+              <a:cxn ang="0">
+                <a:pos x="connsiteX23" y="connsiteY23"/>
+              </a:cxn>
+              <a:cxn ang="0">
+                <a:pos x="connsiteX24" y="connsiteY24"/>
+              </a:cxn>
+              <a:cxn ang="0">
+                <a:pos x="connsiteX25" y="connsiteY25"/>
+              </a:cxn>
+              <a:cxn ang="0">
+                <a:pos x="connsiteX26" y="connsiteY26"/>
+              </a:cxn>
+            </a:cxnLst>
+            <a:rect l="l" t="t" r="r" b="b"/>
+            <a:pathLst>
+              <a:path w="6401574" h="1182783" extrusionOk="0">
+                <a:moveTo>
+                  <a:pt x="0" y="0"/>
+                </a:moveTo>
+                <a:cubicBezTo>
+                  <a:pt x="112290" y="-11668"/>
+                  <a:pt x="272293" y="52424"/>
+                  <a:pt x="517946" y="0"/>
+                </a:cubicBezTo>
+                <a:cubicBezTo>
+                  <a:pt x="763599" y="-52424"/>
+                  <a:pt x="784048" y="4814"/>
+                  <a:pt x="907860" y="0"/>
+                </a:cubicBezTo>
+                <a:cubicBezTo>
+                  <a:pt x="1031672" y="-4814"/>
+                  <a:pt x="1370316" y="34274"/>
+                  <a:pt x="1617852" y="0"/>
+                </a:cubicBezTo>
+                <a:cubicBezTo>
+                  <a:pt x="1865388" y="-34274"/>
+                  <a:pt x="1959659" y="61561"/>
+                  <a:pt x="2135798" y="0"/>
+                </a:cubicBezTo>
+                <a:cubicBezTo>
+                  <a:pt x="2311937" y="-61561"/>
+                  <a:pt x="2429972" y="58170"/>
+                  <a:pt x="2653743" y="0"/>
+                </a:cubicBezTo>
+                <a:cubicBezTo>
+                  <a:pt x="2877514" y="-58170"/>
+                  <a:pt x="3206925" y="26854"/>
+                  <a:pt x="3363736" y="0"/>
+                </a:cubicBezTo>
+                <a:cubicBezTo>
+                  <a:pt x="3520547" y="-26854"/>
+                  <a:pt x="3612462" y="26498"/>
+                  <a:pt x="3817666" y="0"/>
+                </a:cubicBezTo>
+                <a:cubicBezTo>
+                  <a:pt x="4022870" y="-26498"/>
+                  <a:pt x="4384868" y="46198"/>
+                  <a:pt x="4527659" y="0"/>
+                </a:cubicBezTo>
+                <a:cubicBezTo>
+                  <a:pt x="4670450" y="-46198"/>
+                  <a:pt x="4948846" y="39889"/>
+                  <a:pt x="5237651" y="0"/>
+                </a:cubicBezTo>
+                <a:cubicBezTo>
+                  <a:pt x="5526456" y="-39889"/>
+                  <a:pt x="5614045" y="65071"/>
+                  <a:pt x="5819613" y="0"/>
+                </a:cubicBezTo>
+                <a:cubicBezTo>
+                  <a:pt x="6025181" y="-65071"/>
+                  <a:pt x="6269794" y="18036"/>
+                  <a:pt x="6401574" y="0"/>
+                </a:cubicBezTo>
+                <a:cubicBezTo>
+                  <a:pt x="6404566" y="280997"/>
+                  <a:pt x="6391317" y="448816"/>
+                  <a:pt x="6401574" y="579564"/>
+                </a:cubicBezTo>
+                <a:cubicBezTo>
+                  <a:pt x="6411831" y="710312"/>
+                  <a:pt x="6342894" y="942022"/>
+                  <a:pt x="6401574" y="1182783"/>
+                </a:cubicBezTo>
+                <a:cubicBezTo>
+                  <a:pt x="6121553" y="1237805"/>
+                  <a:pt x="6043146" y="1171489"/>
+                  <a:pt x="5819613" y="1182783"/>
+                </a:cubicBezTo>
+                <a:cubicBezTo>
+                  <a:pt x="5596080" y="1194077"/>
+                  <a:pt x="5508623" y="1180756"/>
+                  <a:pt x="5365683" y="1182783"/>
+                </a:cubicBezTo>
+                <a:cubicBezTo>
+                  <a:pt x="5222743" y="1184810"/>
+                  <a:pt x="5034078" y="1123118"/>
+                  <a:pt x="4783722" y="1182783"/>
+                </a:cubicBezTo>
+                <a:cubicBezTo>
+                  <a:pt x="4533366" y="1242448"/>
+                  <a:pt x="4332664" y="1163016"/>
+                  <a:pt x="4073729" y="1182783"/>
+                </a:cubicBezTo>
+                <a:cubicBezTo>
+                  <a:pt x="3814794" y="1202550"/>
+                  <a:pt x="3661982" y="1132935"/>
+                  <a:pt x="3491768" y="1182783"/>
+                </a:cubicBezTo>
+                <a:cubicBezTo>
+                  <a:pt x="3321554" y="1232631"/>
+                  <a:pt x="3286834" y="1170587"/>
+                  <a:pt x="3101854" y="1182783"/>
+                </a:cubicBezTo>
+                <a:cubicBezTo>
+                  <a:pt x="2916874" y="1194979"/>
+                  <a:pt x="2779360" y="1170750"/>
+                  <a:pt x="2647924" y="1182783"/>
+                </a:cubicBezTo>
+                <a:cubicBezTo>
+                  <a:pt x="2516488" y="1194816"/>
+                  <a:pt x="2101572" y="1100511"/>
+                  <a:pt x="1937931" y="1182783"/>
+                </a:cubicBezTo>
+                <a:cubicBezTo>
+                  <a:pt x="1774290" y="1265055"/>
+                  <a:pt x="1589044" y="1146976"/>
+                  <a:pt x="1355970" y="1182783"/>
+                </a:cubicBezTo>
+                <a:cubicBezTo>
+                  <a:pt x="1122896" y="1218590"/>
+                  <a:pt x="1085336" y="1146161"/>
+                  <a:pt x="902040" y="1182783"/>
+                </a:cubicBezTo>
+                <a:cubicBezTo>
+                  <a:pt x="718744" y="1219405"/>
+                  <a:pt x="227706" y="1126304"/>
+                  <a:pt x="0" y="1182783"/>
+                </a:cubicBezTo>
+                <a:cubicBezTo>
+                  <a:pt x="-13079" y="952744"/>
+                  <a:pt x="27311" y="814571"/>
+                  <a:pt x="0" y="626875"/>
+                </a:cubicBezTo>
+                <a:cubicBezTo>
+                  <a:pt x="-27311" y="439179"/>
+                  <a:pt x="42512" y="204728"/>
+                  <a:pt x="0" y="0"/>
+                </a:cubicBezTo>
+                <a:close/>
+              </a:path>
+            </a:pathLst>
+          </a:custGeom>
+          <a:noFill/>
+          <a:ln w="12700">
+            <a:solidFill>
+              <a:srgbClr val="7030A0"/>
+            </a:solidFill>
+            <a:extLst>
+              <a:ext uri="{C807C97D-BFC1-408E-A445-0C87EB9F89A2}">
+                <ask:lineSketchStyleProps xmlns:ask="http://schemas.microsoft.com/office/drawing/2018/sketchyshapes" sd="1219033472">
+                  <a:prstGeom prst="rect">
+                    <a:avLst/>
+                  </a:prstGeom>
+                  <ask:type>
+                    <ask:lineSketchScribble/>
+                  </ask:type>
+                </ask:lineSketchStyleProps>
+              </a:ext>
+            </a:extLst>
+          </a:ln>
+        </p:spPr>
+        <p:style>
+          <a:lnRef idx="2">
+            <a:schemeClr val="accent1">
+              <a:shade val="50000"/>
+            </a:schemeClr>
+          </a:lnRef>
+          <a:fillRef idx="1">
+            <a:schemeClr val="accent1"/>
+          </a:fillRef>
+          <a:effectRef idx="0">
+            <a:schemeClr val="accent1"/>
+          </a:effectRef>
+          <a:fontRef idx="minor">
+            <a:schemeClr val="lt1"/>
+          </a:fontRef>
+        </p:style>
+        <p:txBody>
+          <a:bodyPr rtlCol="0" anchor="ctr"/>
+          <a:lstStyle/>
+          <a:p>
+            <a:pPr algn="ctr"/>
+            <a:endParaRPr/>
+          </a:p>
+        </p:txBody>
+      </p:sp>
+      <p:sp>
+        <p:nvSpPr>
+          <p:cNvPr id="27" name="Rectangle 26">
+            <a:extLst>
+              <a:ext uri="{FF2B5EF4-FFF2-40B4-BE49-F238E27FC236}">
+                <a16:creationId xmlns:a16="http://schemas.microsoft.com/office/drawing/2014/main" id="{E7A6A194-B1FA-A745-A8AC-765B779E8844}"/>
+              </a:ext>
+            </a:extLst>
+          </p:cNvPr>
+          <p:cNvSpPr/>
+          <p:nvPr/>
+        </p:nvSpPr>
+        <p:spPr>
+          <a:xfrm>
+            <a:off x="610784" y="4766783"/>
+            <a:ext cx="5740927" cy="1468833"/>
+          </a:xfrm>
+          <a:custGeom>
+            <a:avLst/>
+            <a:gdLst>
+              <a:gd name="connsiteX0" fmla="*/ 0 w 5740927"/>
+              <a:gd name="connsiteY0" fmla="*/ 0 h 1468833"/>
+              <a:gd name="connsiteX1" fmla="*/ 516683 w 5740927"/>
+              <a:gd name="connsiteY1" fmla="*/ 0 h 1468833"/>
+              <a:gd name="connsiteX2" fmla="*/ 918548 w 5740927"/>
+              <a:gd name="connsiteY2" fmla="*/ 0 h 1468833"/>
+              <a:gd name="connsiteX3" fmla="*/ 1607460 w 5740927"/>
+              <a:gd name="connsiteY3" fmla="*/ 0 h 1468833"/>
+              <a:gd name="connsiteX4" fmla="*/ 2124143 w 5740927"/>
+              <a:gd name="connsiteY4" fmla="*/ 0 h 1468833"/>
+              <a:gd name="connsiteX5" fmla="*/ 2640826 w 5740927"/>
+              <a:gd name="connsiteY5" fmla="*/ 0 h 1468833"/>
+              <a:gd name="connsiteX6" fmla="*/ 3329738 w 5740927"/>
+              <a:gd name="connsiteY6" fmla="*/ 0 h 1468833"/>
+              <a:gd name="connsiteX7" fmla="*/ 3789012 w 5740927"/>
+              <a:gd name="connsiteY7" fmla="*/ 0 h 1468833"/>
+              <a:gd name="connsiteX8" fmla="*/ 4477923 w 5740927"/>
+              <a:gd name="connsiteY8" fmla="*/ 0 h 1468833"/>
+              <a:gd name="connsiteX9" fmla="*/ 5166834 w 5740927"/>
+              <a:gd name="connsiteY9" fmla="*/ 0 h 1468833"/>
+              <a:gd name="connsiteX10" fmla="*/ 5740927 w 5740927"/>
+              <a:gd name="connsiteY10" fmla="*/ 0 h 1468833"/>
+              <a:gd name="connsiteX11" fmla="*/ 5740927 w 5740927"/>
+              <a:gd name="connsiteY11" fmla="*/ 518988 h 1468833"/>
+              <a:gd name="connsiteX12" fmla="*/ 5740927 w 5740927"/>
+              <a:gd name="connsiteY12" fmla="*/ 1023287 h 1468833"/>
+              <a:gd name="connsiteX13" fmla="*/ 5740927 w 5740927"/>
+              <a:gd name="connsiteY13" fmla="*/ 1468833 h 1468833"/>
+              <a:gd name="connsiteX14" fmla="*/ 5166834 w 5740927"/>
+              <a:gd name="connsiteY14" fmla="*/ 1468833 h 1468833"/>
+              <a:gd name="connsiteX15" fmla="*/ 4707560 w 5740927"/>
+              <a:gd name="connsiteY15" fmla="*/ 1468833 h 1468833"/>
+              <a:gd name="connsiteX16" fmla="*/ 4133467 w 5740927"/>
+              <a:gd name="connsiteY16" fmla="*/ 1468833 h 1468833"/>
+              <a:gd name="connsiteX17" fmla="*/ 3444556 w 5740927"/>
+              <a:gd name="connsiteY17" fmla="*/ 1468833 h 1468833"/>
+              <a:gd name="connsiteX18" fmla="*/ 2870464 w 5740927"/>
+              <a:gd name="connsiteY18" fmla="*/ 1468833 h 1468833"/>
+              <a:gd name="connsiteX19" fmla="*/ 2468599 w 5740927"/>
+              <a:gd name="connsiteY19" fmla="*/ 1468833 h 1468833"/>
+              <a:gd name="connsiteX20" fmla="*/ 2009324 w 5740927"/>
+              <a:gd name="connsiteY20" fmla="*/ 1468833 h 1468833"/>
+              <a:gd name="connsiteX21" fmla="*/ 1320413 w 5740927"/>
+              <a:gd name="connsiteY21" fmla="*/ 1468833 h 1468833"/>
+              <a:gd name="connsiteX22" fmla="*/ 746321 w 5740927"/>
+              <a:gd name="connsiteY22" fmla="*/ 1468833 h 1468833"/>
+              <a:gd name="connsiteX23" fmla="*/ 0 w 5740927"/>
+              <a:gd name="connsiteY23" fmla="*/ 1468833 h 1468833"/>
+              <a:gd name="connsiteX24" fmla="*/ 0 w 5740927"/>
+              <a:gd name="connsiteY24" fmla="*/ 979222 h 1468833"/>
+              <a:gd name="connsiteX25" fmla="*/ 0 w 5740927"/>
+              <a:gd name="connsiteY25" fmla="*/ 533676 h 1468833"/>
+              <a:gd name="connsiteX26" fmla="*/ 0 w 5740927"/>
+              <a:gd name="connsiteY26" fmla="*/ 0 h 1468833"/>
+            </a:gdLst>
+            <a:ahLst/>
+            <a:cxnLst>
+              <a:cxn ang="0">
+                <a:pos x="connsiteX0" y="connsiteY0"/>
+              </a:cxn>
+              <a:cxn ang="0">
+                <a:pos x="connsiteX1" y="connsiteY1"/>
+              </a:cxn>
+              <a:cxn ang="0">
+                <a:pos x="connsiteX2" y="connsiteY2"/>
+              </a:cxn>
+              <a:cxn ang="0">
+                <a:pos x="connsiteX3" y="connsiteY3"/>
+              </a:cxn>
+              <a:cxn ang="0">
+                <a:pos x="connsiteX4" y="connsiteY4"/>
+              </a:cxn>
+              <a:cxn ang="0">
+                <a:pos x="connsiteX5" y="connsiteY5"/>
+              </a:cxn>
+              <a:cxn ang="0">
+                <a:pos x="connsiteX6" y="connsiteY6"/>
+              </a:cxn>
+              <a:cxn ang="0">
+                <a:pos x="connsiteX7" y="connsiteY7"/>
+              </a:cxn>
+              <a:cxn ang="0">
+                <a:pos x="connsiteX8" y="connsiteY8"/>
+              </a:cxn>
+              <a:cxn ang="0">
+                <a:pos x="connsiteX9" y="connsiteY9"/>
+              </a:cxn>
+              <a:cxn ang="0">
+                <a:pos x="connsiteX10" y="connsiteY10"/>
+              </a:cxn>
+              <a:cxn ang="0">
+                <a:pos x="connsiteX11" y="connsiteY11"/>
+              </a:cxn>
+              <a:cxn ang="0">
+                <a:pos x="connsiteX12" y="connsiteY12"/>
+              </a:cxn>
+              <a:cxn ang="0">
+                <a:pos x="connsiteX13" y="connsiteY13"/>
+              </a:cxn>
+              <a:cxn ang="0">
+                <a:pos x="connsiteX14" y="connsiteY14"/>
+              </a:cxn>
+              <a:cxn ang="0">
+                <a:pos x="connsiteX15" y="connsiteY15"/>
+              </a:cxn>
+              <a:cxn ang="0">
+                <a:pos x="connsiteX16" y="connsiteY16"/>
+              </a:cxn>
+              <a:cxn ang="0">
+                <a:pos x="connsiteX17" y="connsiteY17"/>
+              </a:cxn>
+              <a:cxn ang="0">
+                <a:pos x="connsiteX18" y="connsiteY18"/>
+              </a:cxn>
+              <a:cxn ang="0">
+                <a:pos x="connsiteX19" y="connsiteY19"/>
+              </a:cxn>
+              <a:cxn ang="0">
+                <a:pos x="connsiteX20" y="connsiteY20"/>
+              </a:cxn>
+              <a:cxn ang="0">
+                <a:pos x="connsiteX21" y="connsiteY21"/>
+              </a:cxn>
+              <a:cxn ang="0">
+                <a:pos x="connsiteX22" y="connsiteY22"/>
+              </a:cxn>
+              <a:cxn ang="0">
+                <a:pos x="connsiteX23" y="connsiteY23"/>
+              </a:cxn>
+              <a:cxn ang="0">
+                <a:pos x="connsiteX24" y="connsiteY24"/>
+              </a:cxn>
+              <a:cxn ang="0">
+                <a:pos x="connsiteX25" y="connsiteY25"/>
+              </a:cxn>
+              <a:cxn ang="0">
+                <a:pos x="connsiteX26" y="connsiteY26"/>
+              </a:cxn>
+            </a:cxnLst>
+            <a:rect l="l" t="t" r="r" b="b"/>
+            <a:pathLst>
+              <a:path w="5740927" h="1468833" extrusionOk="0">
+                <a:moveTo>
+                  <a:pt x="0" y="0"/>
+                </a:moveTo>
+                <a:cubicBezTo>
+                  <a:pt x="209493" y="-1563"/>
+                  <a:pt x="342758" y="45203"/>
+                  <a:pt x="516683" y="0"/>
+                </a:cubicBezTo>
+                <a:cubicBezTo>
+                  <a:pt x="690608" y="-45203"/>
+                  <a:pt x="820444" y="2413"/>
+                  <a:pt x="918548" y="0"/>
+                </a:cubicBezTo>
+                <a:cubicBezTo>
+                  <a:pt x="1016652" y="-2413"/>
+                  <a:pt x="1346316" y="57198"/>
+                  <a:pt x="1607460" y="0"/>
+                </a:cubicBezTo>
+                <a:cubicBezTo>
+                  <a:pt x="1868604" y="-57198"/>
+                  <a:pt x="1884157" y="25476"/>
+                  <a:pt x="2124143" y="0"/>
+                </a:cubicBezTo>
+                <a:cubicBezTo>
+                  <a:pt x="2364129" y="-25476"/>
+                  <a:pt x="2426129" y="5215"/>
+                  <a:pt x="2640826" y="0"/>
+                </a:cubicBezTo>
+                <a:cubicBezTo>
+                  <a:pt x="2855523" y="-5215"/>
+                  <a:pt x="3104953" y="64982"/>
+                  <a:pt x="3329738" y="0"/>
+                </a:cubicBezTo>
+                <a:cubicBezTo>
+                  <a:pt x="3554523" y="-64982"/>
+                  <a:pt x="3610307" y="21538"/>
+                  <a:pt x="3789012" y="0"/>
+                </a:cubicBezTo>
+                <a:cubicBezTo>
+                  <a:pt x="3967717" y="-21538"/>
+                  <a:pt x="4177686" y="77037"/>
+                  <a:pt x="4477923" y="0"/>
+                </a:cubicBezTo>
+                <a:cubicBezTo>
+                  <a:pt x="4778160" y="-77037"/>
+                  <a:pt x="4886004" y="14455"/>
+                  <a:pt x="5166834" y="0"/>
+                </a:cubicBezTo>
+                <a:cubicBezTo>
+                  <a:pt x="5447664" y="-14455"/>
+                  <a:pt x="5502770" y="30282"/>
+                  <a:pt x="5740927" y="0"/>
+                </a:cubicBezTo>
+                <a:cubicBezTo>
+                  <a:pt x="5745181" y="242988"/>
+                  <a:pt x="5717021" y="348245"/>
+                  <a:pt x="5740927" y="518988"/>
+                </a:cubicBezTo>
+                <a:cubicBezTo>
+                  <a:pt x="5764833" y="689731"/>
+                  <a:pt x="5710383" y="821898"/>
+                  <a:pt x="5740927" y="1023287"/>
+                </a:cubicBezTo>
+                <a:cubicBezTo>
+                  <a:pt x="5771471" y="1224676"/>
+                  <a:pt x="5710086" y="1312164"/>
+                  <a:pt x="5740927" y="1468833"/>
+                </a:cubicBezTo>
+                <a:cubicBezTo>
+                  <a:pt x="5525583" y="1508018"/>
+                  <a:pt x="5405584" y="1403823"/>
+                  <a:pt x="5166834" y="1468833"/>
+                </a:cubicBezTo>
+                <a:cubicBezTo>
+                  <a:pt x="4928084" y="1533843"/>
+                  <a:pt x="4850073" y="1434094"/>
+                  <a:pt x="4707560" y="1468833"/>
+                </a:cubicBezTo>
+                <a:cubicBezTo>
+                  <a:pt x="4565047" y="1503572"/>
+                  <a:pt x="4408450" y="1451325"/>
+                  <a:pt x="4133467" y="1468833"/>
+                </a:cubicBezTo>
+                <a:cubicBezTo>
+                  <a:pt x="3858484" y="1486341"/>
+                  <a:pt x="3652193" y="1459354"/>
+                  <a:pt x="3444556" y="1468833"/>
+                </a:cubicBezTo>
+                <a:cubicBezTo>
+                  <a:pt x="3236919" y="1478312"/>
+                  <a:pt x="3093429" y="1400683"/>
+                  <a:pt x="2870464" y="1468833"/>
+                </a:cubicBezTo>
+                <a:cubicBezTo>
+                  <a:pt x="2647499" y="1536983"/>
+                  <a:pt x="2608416" y="1465977"/>
+                  <a:pt x="2468599" y="1468833"/>
+                </a:cubicBezTo>
+                <a:cubicBezTo>
+                  <a:pt x="2328783" y="1471689"/>
+                  <a:pt x="2126354" y="1430141"/>
+                  <a:pt x="2009324" y="1468833"/>
+                </a:cubicBezTo>
+                <a:cubicBezTo>
+                  <a:pt x="1892294" y="1507525"/>
+                  <a:pt x="1518318" y="1444120"/>
+                  <a:pt x="1320413" y="1468833"/>
+                </a:cubicBezTo>
+                <a:cubicBezTo>
+                  <a:pt x="1122508" y="1493546"/>
+                  <a:pt x="890991" y="1407954"/>
+                  <a:pt x="746321" y="1468833"/>
+                </a:cubicBezTo>
+                <a:cubicBezTo>
+                  <a:pt x="601651" y="1529712"/>
+                  <a:pt x="251639" y="1436166"/>
+                  <a:pt x="0" y="1468833"/>
+                </a:cubicBezTo>
+                <a:cubicBezTo>
+                  <a:pt x="-36984" y="1234924"/>
+                  <a:pt x="24349" y="1214866"/>
+                  <a:pt x="0" y="979222"/>
+                </a:cubicBezTo>
+                <a:cubicBezTo>
+                  <a:pt x="-24349" y="743578"/>
+                  <a:pt x="23422" y="711645"/>
+                  <a:pt x="0" y="533676"/>
+                </a:cubicBezTo>
+                <a:cubicBezTo>
+                  <a:pt x="-23422" y="355707"/>
+                  <a:pt x="13794" y="215746"/>
+                  <a:pt x="0" y="0"/>
+                </a:cubicBezTo>
+                <a:close/>
+              </a:path>
+            </a:pathLst>
+          </a:custGeom>
+          <a:noFill/>
+          <a:ln w="12700">
+            <a:solidFill>
+              <a:srgbClr val="7030A0"/>
+            </a:solidFill>
+            <a:extLst>
+              <a:ext uri="{C807C97D-BFC1-408E-A445-0C87EB9F89A2}">
+                <ask:lineSketchStyleProps xmlns:ask="http://schemas.microsoft.com/office/drawing/2018/sketchyshapes" sd="1219033472">
+                  <a:prstGeom prst="rect">
+                    <a:avLst/>
+                  </a:prstGeom>
+                  <ask:type>
+                    <ask:lineSketchScribble/>
+                  </ask:type>
+                </ask:lineSketchStyleProps>
+              </a:ext>
+            </a:extLst>
+          </a:ln>
+        </p:spPr>
+        <p:style>
+          <a:lnRef idx="2">
+            <a:schemeClr val="accent1">
+              <a:shade val="50000"/>
+            </a:schemeClr>
+          </a:lnRef>
+          <a:fillRef idx="1">
+            <a:schemeClr val="accent1"/>
+          </a:fillRef>
+          <a:effectRef idx="0">
+            <a:schemeClr val="accent1"/>
+          </a:effectRef>
+          <a:fontRef idx="minor">
+            <a:schemeClr val="lt1"/>
+          </a:fontRef>
+        </p:style>
+        <p:txBody>
+          <a:bodyPr rtlCol="0" anchor="ctr"/>
+          <a:lstStyle/>
+          <a:p>
+            <a:pPr algn="ctr"/>
+            <a:endParaRPr/>
+          </a:p>
+        </p:txBody>
+      </p:sp>
+      <p:sp>
+        <p:nvSpPr>
+          <p:cNvPr id="28" name="Rectangle 27">
+            <a:extLst>
+              <a:ext uri="{FF2B5EF4-FFF2-40B4-BE49-F238E27FC236}">
+                <a16:creationId xmlns:a16="http://schemas.microsoft.com/office/drawing/2014/main" id="{94B810CD-EE9D-FF4D-ACB8-8E54F886D9C5}"/>
+              </a:ext>
+            </a:extLst>
+          </p:cNvPr>
+          <p:cNvSpPr/>
+          <p:nvPr/>
+        </p:nvSpPr>
+        <p:spPr>
+          <a:xfrm>
+            <a:off x="514947" y="1169502"/>
+            <a:ext cx="6993501" cy="1588761"/>
+          </a:xfrm>
+          <a:custGeom>
+            <a:avLst/>
+            <a:gdLst>
+              <a:gd name="connsiteX0" fmla="*/ 0 w 6993501"/>
+              <a:gd name="connsiteY0" fmla="*/ 0 h 1588761"/>
+              <a:gd name="connsiteX1" fmla="*/ 512857 w 6993501"/>
+              <a:gd name="connsiteY1" fmla="*/ 0 h 1588761"/>
+              <a:gd name="connsiteX2" fmla="*/ 885843 w 6993501"/>
+              <a:gd name="connsiteY2" fmla="*/ 0 h 1588761"/>
+              <a:gd name="connsiteX3" fmla="*/ 1608505 w 6993501"/>
+              <a:gd name="connsiteY3" fmla="*/ 0 h 1588761"/>
+              <a:gd name="connsiteX4" fmla="*/ 2121362 w 6993501"/>
+              <a:gd name="connsiteY4" fmla="*/ 0 h 1588761"/>
+              <a:gd name="connsiteX5" fmla="*/ 2634219 w 6993501"/>
+              <a:gd name="connsiteY5" fmla="*/ 0 h 1588761"/>
+              <a:gd name="connsiteX6" fmla="*/ 3356880 w 6993501"/>
+              <a:gd name="connsiteY6" fmla="*/ 0 h 1588761"/>
+              <a:gd name="connsiteX7" fmla="*/ 3799802 w 6993501"/>
+              <a:gd name="connsiteY7" fmla="*/ 0 h 1588761"/>
+              <a:gd name="connsiteX8" fmla="*/ 4522464 w 6993501"/>
+              <a:gd name="connsiteY8" fmla="*/ 0 h 1588761"/>
+              <a:gd name="connsiteX9" fmla="*/ 5245126 w 6993501"/>
+              <a:gd name="connsiteY9" fmla="*/ 0 h 1588761"/>
+              <a:gd name="connsiteX10" fmla="*/ 5827918 w 6993501"/>
+              <a:gd name="connsiteY10" fmla="*/ 0 h 1588761"/>
+              <a:gd name="connsiteX11" fmla="*/ 6993501 w 6993501"/>
+              <a:gd name="connsiteY11" fmla="*/ 0 h 1588761"/>
+              <a:gd name="connsiteX12" fmla="*/ 6993501 w 6993501"/>
+              <a:gd name="connsiteY12" fmla="*/ 513699 h 1588761"/>
+              <a:gd name="connsiteX13" fmla="*/ 6993501 w 6993501"/>
+              <a:gd name="connsiteY13" fmla="*/ 995624 h 1588761"/>
+              <a:gd name="connsiteX14" fmla="*/ 6993501 w 6993501"/>
+              <a:gd name="connsiteY14" fmla="*/ 1588761 h 1588761"/>
+              <a:gd name="connsiteX15" fmla="*/ 6410709 w 6993501"/>
+              <a:gd name="connsiteY15" fmla="*/ 1588761 h 1588761"/>
+              <a:gd name="connsiteX16" fmla="*/ 5827918 w 6993501"/>
+              <a:gd name="connsiteY16" fmla="*/ 1588761 h 1588761"/>
+              <a:gd name="connsiteX17" fmla="*/ 5105256 w 6993501"/>
+              <a:gd name="connsiteY17" fmla="*/ 1588761 h 1588761"/>
+              <a:gd name="connsiteX18" fmla="*/ 4522464 w 6993501"/>
+              <a:gd name="connsiteY18" fmla="*/ 1588761 h 1588761"/>
+              <a:gd name="connsiteX19" fmla="*/ 4149477 w 6993501"/>
+              <a:gd name="connsiteY19" fmla="*/ 1588761 h 1588761"/>
+              <a:gd name="connsiteX20" fmla="*/ 3706556 w 6993501"/>
+              <a:gd name="connsiteY20" fmla="*/ 1588761 h 1588761"/>
+              <a:gd name="connsiteX21" fmla="*/ 2983894 w 6993501"/>
+              <a:gd name="connsiteY21" fmla="*/ 1588761 h 1588761"/>
+              <a:gd name="connsiteX22" fmla="*/ 2401102 w 6993501"/>
+              <a:gd name="connsiteY22" fmla="*/ 1588761 h 1588761"/>
+              <a:gd name="connsiteX23" fmla="*/ 1958180 w 6993501"/>
+              <a:gd name="connsiteY23" fmla="*/ 1588761 h 1588761"/>
+              <a:gd name="connsiteX24" fmla="*/ 1375389 w 6993501"/>
+              <a:gd name="connsiteY24" fmla="*/ 1588761 h 1588761"/>
+              <a:gd name="connsiteX25" fmla="*/ 1002402 w 6993501"/>
+              <a:gd name="connsiteY25" fmla="*/ 1588761 h 1588761"/>
+              <a:gd name="connsiteX26" fmla="*/ 629415 w 6993501"/>
+              <a:gd name="connsiteY26" fmla="*/ 1588761 h 1588761"/>
+              <a:gd name="connsiteX27" fmla="*/ 0 w 6993501"/>
+              <a:gd name="connsiteY27" fmla="*/ 1588761 h 1588761"/>
+              <a:gd name="connsiteX28" fmla="*/ 0 w 6993501"/>
+              <a:gd name="connsiteY28" fmla="*/ 1090949 h 1588761"/>
+              <a:gd name="connsiteX29" fmla="*/ 0 w 6993501"/>
+              <a:gd name="connsiteY29" fmla="*/ 529587 h 1588761"/>
+              <a:gd name="connsiteX30" fmla="*/ 0 w 6993501"/>
+              <a:gd name="connsiteY30" fmla="*/ 0 h 1588761"/>
+            </a:gdLst>
+            <a:ahLst/>
+            <a:cxnLst>
+              <a:cxn ang="0">
+                <a:pos x="connsiteX0" y="connsiteY0"/>
+              </a:cxn>
+              <a:cxn ang="0">
+                <a:pos x="connsiteX1" y="connsiteY1"/>
+              </a:cxn>
+              <a:cxn ang="0">
+                <a:pos x="connsiteX2" y="connsiteY2"/>
+              </a:cxn>
+              <a:cxn ang="0">
+                <a:pos x="connsiteX3" y="connsiteY3"/>
+              </a:cxn>
+              <a:cxn ang="0">
+                <a:pos x="connsiteX4" y="connsiteY4"/>
+              </a:cxn>
+              <a:cxn ang="0">
+                <a:pos x="connsiteX5" y="connsiteY5"/>
+              </a:cxn>
+              <a:cxn ang="0">
+                <a:pos x="connsiteX6" y="connsiteY6"/>
+              </a:cxn>
+              <a:cxn ang="0">
+                <a:pos x="connsiteX7" y="connsiteY7"/>
+              </a:cxn>
+              <a:cxn ang="0">
+                <a:pos x="connsiteX8" y="connsiteY8"/>
+              </a:cxn>
+              <a:cxn ang="0">
+                <a:pos x="connsiteX9" y="connsiteY9"/>
+              </a:cxn>
+              <a:cxn ang="0">
+                <a:pos x="connsiteX10" y="connsiteY10"/>
+              </a:cxn>
+              <a:cxn ang="0">
+                <a:pos x="connsiteX11" y="connsiteY11"/>
+              </a:cxn>
+              <a:cxn ang="0">
+                <a:pos x="connsiteX12" y="connsiteY12"/>
+              </a:cxn>
+              <a:cxn ang="0">
+                <a:pos x="connsiteX13" y="connsiteY13"/>
+              </a:cxn>
+              <a:cxn ang="0">
+                <a:pos x="connsiteX14" y="connsiteY14"/>
+              </a:cxn>
+              <a:cxn ang="0">
+                <a:pos x="connsiteX15" y="connsiteY15"/>
+              </a:cxn>
+              <a:cxn ang="0">
+                <a:pos x="connsiteX16" y="connsiteY16"/>
+              </a:cxn>
+              <a:cxn ang="0">
+                <a:pos x="connsiteX17" y="connsiteY17"/>
+              </a:cxn>
+              <a:cxn ang="0">
+                <a:pos x="connsiteX18" y="connsiteY18"/>
+              </a:cxn>
+              <a:cxn ang="0">
+                <a:pos x="connsiteX19" y="connsiteY19"/>
+              </a:cxn>
+              <a:cxn ang="0">
+                <a:pos x="connsiteX20" y="connsiteY20"/>
+              </a:cxn>
+              <a:cxn ang="0">
+                <a:pos x="connsiteX21" y="connsiteY21"/>
+              </a:cxn>
+              <a:cxn ang="0">
+                <a:pos x="connsiteX22" y="connsiteY22"/>
+              </a:cxn>
+              <a:cxn ang="0">
+                <a:pos x="connsiteX23" y="connsiteY23"/>
+              </a:cxn>
+              <a:cxn ang="0">
+                <a:pos x="connsiteX24" y="connsiteY24"/>
+              </a:cxn>
+              <a:cxn ang="0">
+                <a:pos x="connsiteX25" y="connsiteY25"/>
+              </a:cxn>
+              <a:cxn ang="0">
+                <a:pos x="connsiteX26" y="connsiteY26"/>
+              </a:cxn>
+              <a:cxn ang="0">
+                <a:pos x="connsiteX27" y="connsiteY27"/>
+              </a:cxn>
+              <a:cxn ang="0">
+                <a:pos x="connsiteX28" y="connsiteY28"/>
+              </a:cxn>
+              <a:cxn ang="0">
+                <a:pos x="connsiteX29" y="connsiteY29"/>
+              </a:cxn>
+              <a:cxn ang="0">
+                <a:pos x="connsiteX30" y="connsiteY30"/>
+              </a:cxn>
+            </a:cxnLst>
+            <a:rect l="l" t="t" r="r" b="b"/>
+            <a:pathLst>
+              <a:path w="6993501" h="1588761" extrusionOk="0">
+                <a:moveTo>
+                  <a:pt x="0" y="0"/>
+                </a:moveTo>
+                <a:cubicBezTo>
+                  <a:pt x="215884" y="-5258"/>
+                  <a:pt x="322945" y="37621"/>
+                  <a:pt x="512857" y="0"/>
+                </a:cubicBezTo>
+                <a:cubicBezTo>
+                  <a:pt x="702769" y="-37621"/>
+                  <a:pt x="754929" y="41606"/>
+                  <a:pt x="885843" y="0"/>
+                </a:cubicBezTo>
+                <a:cubicBezTo>
+                  <a:pt x="1016757" y="-41606"/>
+                  <a:pt x="1357398" y="67784"/>
+                  <a:pt x="1608505" y="0"/>
+                </a:cubicBezTo>
+                <a:cubicBezTo>
+                  <a:pt x="1859612" y="-67784"/>
+                  <a:pt x="1898003" y="42902"/>
+                  <a:pt x="2121362" y="0"/>
+                </a:cubicBezTo>
+                <a:cubicBezTo>
+                  <a:pt x="2344721" y="-42902"/>
+                  <a:pt x="2445243" y="59217"/>
+                  <a:pt x="2634219" y="0"/>
+                </a:cubicBezTo>
+                <a:cubicBezTo>
+                  <a:pt x="2823195" y="-59217"/>
+                  <a:pt x="3093527" y="84386"/>
+                  <a:pt x="3356880" y="0"/>
+                </a:cubicBezTo>
+                <a:cubicBezTo>
+                  <a:pt x="3620233" y="-84386"/>
+                  <a:pt x="3604606" y="11504"/>
+                  <a:pt x="3799802" y="0"/>
+                </a:cubicBezTo>
+                <a:cubicBezTo>
+                  <a:pt x="3994998" y="-11504"/>
+                  <a:pt x="4315531" y="75591"/>
+                  <a:pt x="4522464" y="0"/>
+                </a:cubicBezTo>
+                <a:cubicBezTo>
+                  <a:pt x="4729397" y="-75591"/>
+                  <a:pt x="4889367" y="3850"/>
+                  <a:pt x="5245126" y="0"/>
+                </a:cubicBezTo>
+                <a:cubicBezTo>
+                  <a:pt x="5600885" y="-3850"/>
+                  <a:pt x="5543814" y="47539"/>
+                  <a:pt x="5827918" y="0"/>
+                </a:cubicBezTo>
+                <a:cubicBezTo>
+                  <a:pt x="6112022" y="-47539"/>
+                  <a:pt x="6758703" y="95370"/>
+                  <a:pt x="6993501" y="0"/>
+                </a:cubicBezTo>
+                <a:cubicBezTo>
+                  <a:pt x="7045830" y="221409"/>
+                  <a:pt x="6963337" y="364687"/>
+                  <a:pt x="6993501" y="513699"/>
+                </a:cubicBezTo>
+                <a:cubicBezTo>
+                  <a:pt x="7023665" y="662711"/>
+                  <a:pt x="6965887" y="799434"/>
+                  <a:pt x="6993501" y="995624"/>
+                </a:cubicBezTo>
+                <a:cubicBezTo>
+                  <a:pt x="7021115" y="1191814"/>
+                  <a:pt x="6967289" y="1370398"/>
+                  <a:pt x="6993501" y="1588761"/>
+                </a:cubicBezTo>
+                <a:cubicBezTo>
+                  <a:pt x="6857619" y="1613475"/>
+                  <a:pt x="6620415" y="1583814"/>
+                  <a:pt x="6410709" y="1588761"/>
+                </a:cubicBezTo>
+                <a:cubicBezTo>
+                  <a:pt x="6201003" y="1593708"/>
+                  <a:pt x="6117569" y="1559327"/>
+                  <a:pt x="5827918" y="1588761"/>
+                </a:cubicBezTo>
+                <a:cubicBezTo>
+                  <a:pt x="5538267" y="1618195"/>
+                  <a:pt x="5355034" y="1537474"/>
+                  <a:pt x="5105256" y="1588761"/>
+                </a:cubicBezTo>
+                <a:cubicBezTo>
+                  <a:pt x="4855478" y="1640048"/>
+                  <a:pt x="4780428" y="1559165"/>
+                  <a:pt x="4522464" y="1588761"/>
+                </a:cubicBezTo>
+                <a:cubicBezTo>
+                  <a:pt x="4264500" y="1618357"/>
+                  <a:pt x="4278294" y="1579176"/>
+                  <a:pt x="4149477" y="1588761"/>
+                </a:cubicBezTo>
+                <a:cubicBezTo>
+                  <a:pt x="4020660" y="1598346"/>
+                  <a:pt x="3879839" y="1577273"/>
+                  <a:pt x="3706556" y="1588761"/>
+                </a:cubicBezTo>
+                <a:cubicBezTo>
+                  <a:pt x="3533273" y="1600249"/>
+                  <a:pt x="3229084" y="1538602"/>
+                  <a:pt x="2983894" y="1588761"/>
+                </a:cubicBezTo>
+                <a:cubicBezTo>
+                  <a:pt x="2738704" y="1638920"/>
+                  <a:pt x="2621220" y="1585411"/>
+                  <a:pt x="2401102" y="1588761"/>
+                </a:cubicBezTo>
+                <a:cubicBezTo>
+                  <a:pt x="2180984" y="1592111"/>
+                  <a:pt x="2092165" y="1583481"/>
+                  <a:pt x="1958180" y="1588761"/>
+                </a:cubicBezTo>
+                <a:cubicBezTo>
+                  <a:pt x="1824195" y="1594041"/>
+                  <a:pt x="1598455" y="1587102"/>
+                  <a:pt x="1375389" y="1588761"/>
+                </a:cubicBezTo>
+                <a:cubicBezTo>
+                  <a:pt x="1152323" y="1590420"/>
+                  <a:pt x="1107812" y="1582060"/>
+                  <a:pt x="1002402" y="1588761"/>
+                </a:cubicBezTo>
+                <a:cubicBezTo>
+                  <a:pt x="896992" y="1595462"/>
+                  <a:pt x="777301" y="1552937"/>
+                  <a:pt x="629415" y="1588761"/>
+                </a:cubicBezTo>
+                <a:cubicBezTo>
+                  <a:pt x="481529" y="1624585"/>
+                  <a:pt x="182171" y="1575387"/>
+                  <a:pt x="0" y="1588761"/>
+                </a:cubicBezTo>
+                <a:cubicBezTo>
+                  <a:pt x="-47468" y="1346096"/>
+                  <a:pt x="21766" y="1324814"/>
+                  <a:pt x="0" y="1090949"/>
+                </a:cubicBezTo>
+                <a:cubicBezTo>
+                  <a:pt x="-21766" y="857084"/>
+                  <a:pt x="27976" y="699037"/>
+                  <a:pt x="0" y="529587"/>
+                </a:cubicBezTo>
+                <a:cubicBezTo>
+                  <a:pt x="-27976" y="360137"/>
+                  <a:pt x="40522" y="229059"/>
+                  <a:pt x="0" y="0"/>
+                </a:cubicBezTo>
+                <a:close/>
+              </a:path>
+            </a:pathLst>
+          </a:custGeom>
+          <a:noFill/>
+          <a:ln w="12700">
+            <a:solidFill>
+              <a:srgbClr val="7030A0"/>
+            </a:solidFill>
+            <a:extLst>
+              <a:ext uri="{C807C97D-BFC1-408E-A445-0C87EB9F89A2}">
+                <ask:lineSketchStyleProps xmlns:ask="http://schemas.microsoft.com/office/drawing/2018/sketchyshapes" sd="1219033472">
+                  <a:prstGeom prst="rect">
+                    <a:avLst/>
+                  </a:prstGeom>
+                  <ask:type>
+                    <ask:lineSketchScribble/>
+                  </ask:type>
+                </ask:lineSketchStyleProps>
+              </a:ext>
+            </a:extLst>
+          </a:ln>
+        </p:spPr>
+        <p:style>
+          <a:lnRef idx="2">
+            <a:schemeClr val="accent1">
+              <a:shade val="50000"/>
+            </a:schemeClr>
+          </a:lnRef>
+          <a:fillRef idx="1">
+            <a:schemeClr val="accent1"/>
+          </a:fillRef>
+          <a:effectRef idx="0">
+            <a:schemeClr val="accent1"/>
+          </a:effectRef>
+          <a:fontRef idx="minor">
+            <a:schemeClr val="lt1"/>
+          </a:fontRef>
+        </p:style>
+        <p:txBody>
+          <a:bodyPr rtlCol="0" anchor="ctr"/>
+          <a:lstStyle/>
+          <a:p>
+            <a:pPr algn="ctr"/>
+            <a:endParaRPr/>
+          </a:p>
+        </p:txBody>
+      </p:sp>
+      <p:sp>
+        <p:nvSpPr>
+          <p:cNvPr id="32" name="Rectangle 31">
+            <a:extLst>
+              <a:ext uri="{FF2B5EF4-FFF2-40B4-BE49-F238E27FC236}">
+                <a16:creationId xmlns:a16="http://schemas.microsoft.com/office/drawing/2014/main" id="{6F8D8EFE-BD3D-E941-A7B7-3A5425EDEF70}"/>
+              </a:ext>
+            </a:extLst>
+          </p:cNvPr>
+          <p:cNvSpPr/>
+          <p:nvPr/>
+        </p:nvSpPr>
+        <p:spPr>
+          <a:xfrm>
+            <a:off x="8105175" y="1211057"/>
+            <a:ext cx="3627883" cy="3052416"/>
+          </a:xfrm>
+          <a:custGeom>
+            <a:avLst/>
+            <a:gdLst>
+              <a:gd name="connsiteX0" fmla="*/ 0 w 3627883"/>
+              <a:gd name="connsiteY0" fmla="*/ 0 h 3052416"/>
+              <a:gd name="connsiteX1" fmla="*/ 481990 w 3627883"/>
+              <a:gd name="connsiteY1" fmla="*/ 0 h 3052416"/>
+              <a:gd name="connsiteX2" fmla="*/ 891423 w 3627883"/>
+              <a:gd name="connsiteY2" fmla="*/ 0 h 3052416"/>
+              <a:gd name="connsiteX3" fmla="*/ 1482249 w 3627883"/>
+              <a:gd name="connsiteY3" fmla="*/ 0 h 3052416"/>
+              <a:gd name="connsiteX4" fmla="*/ 1964240 w 3627883"/>
+              <a:gd name="connsiteY4" fmla="*/ 0 h 3052416"/>
+              <a:gd name="connsiteX5" fmla="*/ 2446230 w 3627883"/>
+              <a:gd name="connsiteY5" fmla="*/ 0 h 3052416"/>
+              <a:gd name="connsiteX6" fmla="*/ 3037056 w 3627883"/>
+              <a:gd name="connsiteY6" fmla="*/ 0 h 3052416"/>
+              <a:gd name="connsiteX7" fmla="*/ 3627883 w 3627883"/>
+              <a:gd name="connsiteY7" fmla="*/ 0 h 3052416"/>
+              <a:gd name="connsiteX8" fmla="*/ 3627883 w 3627883"/>
+              <a:gd name="connsiteY8" fmla="*/ 569784 h 3052416"/>
+              <a:gd name="connsiteX9" fmla="*/ 3627883 w 3627883"/>
+              <a:gd name="connsiteY9" fmla="*/ 1017472 h 3052416"/>
+              <a:gd name="connsiteX10" fmla="*/ 3627883 w 3627883"/>
+              <a:gd name="connsiteY10" fmla="*/ 1465160 h 3052416"/>
+              <a:gd name="connsiteX11" fmla="*/ 3627883 w 3627883"/>
+              <a:gd name="connsiteY11" fmla="*/ 1973896 h 3052416"/>
+              <a:gd name="connsiteX12" fmla="*/ 3627883 w 3627883"/>
+              <a:gd name="connsiteY12" fmla="*/ 2513156 h 3052416"/>
+              <a:gd name="connsiteX13" fmla="*/ 3627883 w 3627883"/>
+              <a:gd name="connsiteY13" fmla="*/ 3052416 h 3052416"/>
+              <a:gd name="connsiteX14" fmla="*/ 3109614 w 3627883"/>
+              <a:gd name="connsiteY14" fmla="*/ 3052416 h 3052416"/>
+              <a:gd name="connsiteX15" fmla="*/ 2663903 w 3627883"/>
+              <a:gd name="connsiteY15" fmla="*/ 3052416 h 3052416"/>
+              <a:gd name="connsiteX16" fmla="*/ 2145634 w 3627883"/>
+              <a:gd name="connsiteY16" fmla="*/ 3052416 h 3052416"/>
+              <a:gd name="connsiteX17" fmla="*/ 1554807 w 3627883"/>
+              <a:gd name="connsiteY17" fmla="*/ 3052416 h 3052416"/>
+              <a:gd name="connsiteX18" fmla="*/ 1036538 w 3627883"/>
+              <a:gd name="connsiteY18" fmla="*/ 3052416 h 3052416"/>
+              <a:gd name="connsiteX19" fmla="*/ 627105 w 3627883"/>
+              <a:gd name="connsiteY19" fmla="*/ 3052416 h 3052416"/>
+              <a:gd name="connsiteX20" fmla="*/ 0 w 3627883"/>
+              <a:gd name="connsiteY20" fmla="*/ 3052416 h 3052416"/>
+              <a:gd name="connsiteX21" fmla="*/ 0 w 3627883"/>
+              <a:gd name="connsiteY21" fmla="*/ 2482632 h 3052416"/>
+              <a:gd name="connsiteX22" fmla="*/ 0 w 3627883"/>
+              <a:gd name="connsiteY22" fmla="*/ 1912847 h 3052416"/>
+              <a:gd name="connsiteX23" fmla="*/ 0 w 3627883"/>
+              <a:gd name="connsiteY23" fmla="*/ 1404111 h 3052416"/>
+              <a:gd name="connsiteX24" fmla="*/ 0 w 3627883"/>
+              <a:gd name="connsiteY24" fmla="*/ 925900 h 3052416"/>
+              <a:gd name="connsiteX25" fmla="*/ 0 w 3627883"/>
+              <a:gd name="connsiteY25" fmla="*/ 508736 h 3052416"/>
+              <a:gd name="connsiteX26" fmla="*/ 0 w 3627883"/>
+              <a:gd name="connsiteY26" fmla="*/ 0 h 3052416"/>
+            </a:gdLst>
+            <a:ahLst/>
+            <a:cxnLst>
+              <a:cxn ang="0">
+                <a:pos x="connsiteX0" y="connsiteY0"/>
+              </a:cxn>
+              <a:cxn ang="0">
+                <a:pos x="connsiteX1" y="connsiteY1"/>
+              </a:cxn>
+              <a:cxn ang="0">
+                <a:pos x="connsiteX2" y="connsiteY2"/>
+              </a:cxn>
+              <a:cxn ang="0">
+                <a:pos x="connsiteX3" y="connsiteY3"/>
+              </a:cxn>
+              <a:cxn ang="0">
+                <a:pos x="connsiteX4" y="connsiteY4"/>
+              </a:cxn>
+              <a:cxn ang="0">
+                <a:pos x="connsiteX5" y="connsiteY5"/>
+              </a:cxn>
+              <a:cxn ang="0">
+                <a:pos x="connsiteX6" y="connsiteY6"/>
+              </a:cxn>
+              <a:cxn ang="0">
+                <a:pos x="connsiteX7" y="connsiteY7"/>
+              </a:cxn>
+              <a:cxn ang="0">
+                <a:pos x="connsiteX8" y="connsiteY8"/>
+              </a:cxn>
+              <a:cxn ang="0">
+                <a:pos x="connsiteX9" y="connsiteY9"/>
+              </a:cxn>
+              <a:cxn ang="0">
+                <a:pos x="connsiteX10" y="connsiteY10"/>
+              </a:cxn>
+              <a:cxn ang="0">
+                <a:pos x="connsiteX11" y="connsiteY11"/>
+              </a:cxn>
+              <a:cxn ang="0">
+                <a:pos x="connsiteX12" y="connsiteY12"/>
+              </a:cxn>
+              <a:cxn ang="0">
+                <a:pos x="connsiteX13" y="connsiteY13"/>
+              </a:cxn>
+              <a:cxn ang="0">
+                <a:pos x="connsiteX14" y="connsiteY14"/>
+              </a:cxn>
+              <a:cxn ang="0">
+                <a:pos x="connsiteX15" y="connsiteY15"/>
+              </a:cxn>
+              <a:cxn ang="0">
+                <a:pos x="connsiteX16" y="connsiteY16"/>
+              </a:cxn>
+              <a:cxn ang="0">
+                <a:pos x="connsiteX17" y="connsiteY17"/>
+              </a:cxn>
+              <a:cxn ang="0">
+                <a:pos x="connsiteX18" y="connsiteY18"/>
+              </a:cxn>
+              <a:cxn ang="0">
+                <a:pos x="connsiteX19" y="connsiteY19"/>
+              </a:cxn>
+              <a:cxn ang="0">
+                <a:pos x="connsiteX20" y="connsiteY20"/>
+              </a:cxn>
+              <a:cxn ang="0">
+                <a:pos x="connsiteX21" y="connsiteY21"/>
+              </a:cxn>
+              <a:cxn ang="0">
+                <a:pos x="connsiteX22" y="connsiteY22"/>
+              </a:cxn>
+              <a:cxn ang="0">
+                <a:pos x="connsiteX23" y="connsiteY23"/>
+              </a:cxn>
+              <a:cxn ang="0">
+                <a:pos x="connsiteX24" y="connsiteY24"/>
+              </a:cxn>
+              <a:cxn ang="0">
+                <a:pos x="connsiteX25" y="connsiteY25"/>
+              </a:cxn>
+              <a:cxn ang="0">
+                <a:pos x="connsiteX26" y="connsiteY26"/>
+              </a:cxn>
+            </a:cxnLst>
+            <a:rect l="l" t="t" r="r" b="b"/>
+            <a:pathLst>
+              <a:path w="3627883" h="3052416" extrusionOk="0">
+                <a:moveTo>
+                  <a:pt x="0" y="0"/>
+                </a:moveTo>
+                <a:cubicBezTo>
+                  <a:pt x="108901" y="-11090"/>
+                  <a:pt x="246191" y="42117"/>
+                  <a:pt x="481990" y="0"/>
+                </a:cubicBezTo>
+                <a:cubicBezTo>
+                  <a:pt x="717789" y="-42117"/>
+                  <a:pt x="699826" y="7879"/>
+                  <a:pt x="891423" y="0"/>
+                </a:cubicBezTo>
+                <a:cubicBezTo>
+                  <a:pt x="1083020" y="-7879"/>
+                  <a:pt x="1358848" y="26959"/>
+                  <a:pt x="1482249" y="0"/>
+                </a:cubicBezTo>
+                <a:cubicBezTo>
+                  <a:pt x="1605650" y="-26959"/>
+                  <a:pt x="1834323" y="47452"/>
+                  <a:pt x="1964240" y="0"/>
+                </a:cubicBezTo>
+                <a:cubicBezTo>
+                  <a:pt x="2094157" y="-47452"/>
+                  <a:pt x="2287081" y="43177"/>
+                  <a:pt x="2446230" y="0"/>
+                </a:cubicBezTo>
+                <a:cubicBezTo>
+                  <a:pt x="2605379" y="-43177"/>
+                  <a:pt x="2751396" y="59627"/>
+                  <a:pt x="3037056" y="0"/>
+                </a:cubicBezTo>
+                <a:cubicBezTo>
+                  <a:pt x="3322716" y="-59627"/>
+                  <a:pt x="3359400" y="46278"/>
+                  <a:pt x="3627883" y="0"/>
+                </a:cubicBezTo>
+                <a:cubicBezTo>
+                  <a:pt x="3681900" y="196394"/>
+                  <a:pt x="3599637" y="286892"/>
+                  <a:pt x="3627883" y="569784"/>
+                </a:cubicBezTo>
+                <a:cubicBezTo>
+                  <a:pt x="3656129" y="852676"/>
+                  <a:pt x="3600510" y="838599"/>
+                  <a:pt x="3627883" y="1017472"/>
+                </a:cubicBezTo>
+                <a:cubicBezTo>
+                  <a:pt x="3655256" y="1196345"/>
+                  <a:pt x="3574506" y="1354236"/>
+                  <a:pt x="3627883" y="1465160"/>
+                </a:cubicBezTo>
+                <a:cubicBezTo>
+                  <a:pt x="3681260" y="1576084"/>
+                  <a:pt x="3594534" y="1805908"/>
+                  <a:pt x="3627883" y="1973896"/>
+                </a:cubicBezTo>
+                <a:cubicBezTo>
+                  <a:pt x="3661232" y="2141884"/>
+                  <a:pt x="3583169" y="2276718"/>
+                  <a:pt x="3627883" y="2513156"/>
+                </a:cubicBezTo>
+                <a:cubicBezTo>
+                  <a:pt x="3672597" y="2749594"/>
+                  <a:pt x="3596340" y="2903201"/>
+                  <a:pt x="3627883" y="3052416"/>
+                </a:cubicBezTo>
+                <a:cubicBezTo>
+                  <a:pt x="3431066" y="3107795"/>
+                  <a:pt x="3232325" y="3024729"/>
+                  <a:pt x="3109614" y="3052416"/>
+                </a:cubicBezTo>
+                <a:cubicBezTo>
+                  <a:pt x="2986903" y="3080103"/>
+                  <a:pt x="2754500" y="3031612"/>
+                  <a:pt x="2663903" y="3052416"/>
+                </a:cubicBezTo>
+                <a:cubicBezTo>
+                  <a:pt x="2573306" y="3073220"/>
+                  <a:pt x="2378038" y="3037917"/>
+                  <a:pt x="2145634" y="3052416"/>
+                </a:cubicBezTo>
+                <a:cubicBezTo>
+                  <a:pt x="1913230" y="3066915"/>
+                  <a:pt x="1726261" y="2982277"/>
+                  <a:pt x="1554807" y="3052416"/>
+                </a:cubicBezTo>
+                <a:cubicBezTo>
+                  <a:pt x="1383353" y="3122555"/>
+                  <a:pt x="1178103" y="2997937"/>
+                  <a:pt x="1036538" y="3052416"/>
+                </a:cubicBezTo>
+                <a:cubicBezTo>
+                  <a:pt x="894973" y="3106895"/>
+                  <a:pt x="798690" y="3011897"/>
+                  <a:pt x="627105" y="3052416"/>
+                </a:cubicBezTo>
+                <a:cubicBezTo>
+                  <a:pt x="455520" y="3092935"/>
+                  <a:pt x="263486" y="2997584"/>
+                  <a:pt x="0" y="3052416"/>
+                </a:cubicBezTo>
+                <a:cubicBezTo>
+                  <a:pt x="-56928" y="2792825"/>
+                  <a:pt x="30166" y="2741891"/>
+                  <a:pt x="0" y="2482632"/>
+                </a:cubicBezTo>
+                <a:cubicBezTo>
+                  <a:pt x="-30166" y="2223373"/>
+                  <a:pt x="65810" y="2149690"/>
+                  <a:pt x="0" y="1912847"/>
+                </a:cubicBezTo>
+                <a:cubicBezTo>
+                  <a:pt x="-65810" y="1676005"/>
+                  <a:pt x="21712" y="1534802"/>
+                  <a:pt x="0" y="1404111"/>
+                </a:cubicBezTo>
+                <a:cubicBezTo>
+                  <a:pt x="-21712" y="1273420"/>
+                  <a:pt x="35328" y="1150180"/>
+                  <a:pt x="0" y="925900"/>
+                </a:cubicBezTo>
+                <a:cubicBezTo>
+                  <a:pt x="-35328" y="701620"/>
+                  <a:pt x="4975" y="650418"/>
+                  <a:pt x="0" y="508736"/>
+                </a:cubicBezTo>
+                <a:cubicBezTo>
+                  <a:pt x="-4975" y="367054"/>
+                  <a:pt x="42184" y="230324"/>
+                  <a:pt x="0" y="0"/>
+                </a:cubicBezTo>
+                <a:close/>
+              </a:path>
+            </a:pathLst>
+          </a:custGeom>
+          <a:noFill/>
+          <a:ln w="12700">
+            <a:solidFill>
+              <a:srgbClr val="7030A0"/>
+            </a:solidFill>
+            <a:extLst>
+              <a:ext uri="{C807C97D-BFC1-408E-A445-0C87EB9F89A2}">
+                <ask:lineSketchStyleProps xmlns:ask="http://schemas.microsoft.com/office/drawing/2018/sketchyshapes" sd="1219033472">
+                  <a:prstGeom prst="rect">
+                    <a:avLst/>
+                  </a:prstGeom>
+                  <ask:type>
+                    <ask:lineSketchScribble/>
+                  </ask:type>
+                </ask:lineSketchStyleProps>
+              </a:ext>
+            </a:extLst>
+          </a:ln>
+        </p:spPr>
+        <p:style>
+          <a:lnRef idx="2">
+            <a:schemeClr val="accent1">
+              <a:shade val="50000"/>
+            </a:schemeClr>
+          </a:lnRef>
+          <a:fillRef idx="1">
+            <a:schemeClr val="accent1"/>
+          </a:fillRef>
+          <a:effectRef idx="0">
+            <a:schemeClr val="accent1"/>
+          </a:effectRef>
+          <a:fontRef idx="minor">
+            <a:schemeClr val="lt1"/>
+          </a:fontRef>
+        </p:style>
+        <p:txBody>
+          <a:bodyPr rtlCol="0" anchor="ctr"/>
+          <a:lstStyle/>
+          <a:p>
+            <a:pPr algn="ctr"/>
+            <a:endParaRPr/>
           </a:p>
         </p:txBody>
       </p:sp>
     </p:spTree>
     <p:extLst>
       <p:ext uri="{BB962C8B-B14F-4D97-AF65-F5344CB8AC3E}">
-        <p14:creationId xmlns:p14="http://schemas.microsoft.com/office/powerpoint/2010/main" val="3485633649"/>
+        <p14:creationId xmlns:p14="http://schemas.microsoft.com/office/powerpoint/2010/main" val="2069147485"/>
       </p:ext>
     </p:extLst>
   </p:cSld>
@@ -7655,6 +10506,127 @@
       </p:grpSpPr>
       <p:sp>
         <p:nvSpPr>
+          <p:cNvPr id="2" name="Slide Number Placeholder 1">
+            <a:extLst>
+              <a:ext uri="{FF2B5EF4-FFF2-40B4-BE49-F238E27FC236}">
+                <a16:creationId xmlns:a16="http://schemas.microsoft.com/office/drawing/2014/main" id="{B26EFD7A-54C0-2342-913C-772AA467A7CE}"/>
+              </a:ext>
+            </a:extLst>
+          </p:cNvPr>
+          <p:cNvSpPr>
+            <a:spLocks noGrp="1"/>
+          </p:cNvSpPr>
+          <p:nvPr>
+            <p:ph type="sldNum" sz="quarter" idx="12"/>
+          </p:nvPr>
+        </p:nvSpPr>
+        <p:spPr/>
+        <p:txBody>
+          <a:bodyPr/>
+          <a:lstStyle/>
+          <a:p>
+            <a:fld id="{E9549862-13E2-C34D-815E-8545BD36FC59}" type="slidenum">
+              <a:rPr lang="en-US" smtClean="0">
+                <a:solidFill>
+                  <a:srgbClr val="6D7777"/>
+                </a:solidFill>
+              </a:rPr>
+              <a:pPr/>
+              <a:t>4</a:t>
+            </a:fld>
+            <a:endParaRPr lang="en-US">
+              <a:solidFill>
+                <a:srgbClr val="6D7777"/>
+              </a:solidFill>
+            </a:endParaRPr>
+          </a:p>
+        </p:txBody>
+      </p:sp>
+      <p:sp>
+        <p:nvSpPr>
+          <p:cNvPr id="3" name="Title 2">
+            <a:extLst>
+              <a:ext uri="{FF2B5EF4-FFF2-40B4-BE49-F238E27FC236}">
+                <a16:creationId xmlns:a16="http://schemas.microsoft.com/office/drawing/2014/main" id="{AB877B22-01CF-4E42-93A6-DFAB54B54A39}"/>
+              </a:ext>
+            </a:extLst>
+          </p:cNvPr>
+          <p:cNvSpPr>
+            <a:spLocks noGrp="1"/>
+          </p:cNvSpPr>
+          <p:nvPr>
+            <p:ph type="ctrTitle"/>
+          </p:nvPr>
+        </p:nvSpPr>
+        <p:spPr/>
+        <p:txBody>
+          <a:bodyPr/>
+          <a:lstStyle/>
+          <a:p>
+            <a:r>
+              <a:rPr lang="en-US" dirty="0"/>
+              <a:t>Older Versions</a:t>
+            </a:r>
+          </a:p>
+        </p:txBody>
+      </p:sp>
+      <p:sp>
+        <p:nvSpPr>
+          <p:cNvPr id="4" name="Subtitle 3">
+            <a:extLst>
+              <a:ext uri="{FF2B5EF4-FFF2-40B4-BE49-F238E27FC236}">
+                <a16:creationId xmlns:a16="http://schemas.microsoft.com/office/drawing/2014/main" id="{6ADCDA09-464A-A547-8B2D-6FAAD0C85EE3}"/>
+              </a:ext>
+            </a:extLst>
+          </p:cNvPr>
+          <p:cNvSpPr>
+            <a:spLocks noGrp="1"/>
+          </p:cNvSpPr>
+          <p:nvPr>
+            <p:ph type="subTitle" idx="1"/>
+          </p:nvPr>
+        </p:nvSpPr>
+        <p:spPr/>
+        <p:txBody>
+          <a:bodyPr/>
+          <a:lstStyle/>
+          <a:p>
+            <a:endParaRPr lang="en-US"/>
+          </a:p>
+        </p:txBody>
+      </p:sp>
+    </p:spTree>
+    <p:extLst>
+      <p:ext uri="{BB962C8B-B14F-4D97-AF65-F5344CB8AC3E}">
+        <p14:creationId xmlns:p14="http://schemas.microsoft.com/office/powerpoint/2010/main" val="3485633649"/>
+      </p:ext>
+    </p:extLst>
+  </p:cSld>
+  <p:clrMapOvr>
+    <a:masterClrMapping/>
+  </p:clrMapOvr>
+</p:sld>
+</file>
+
+<file path=ppt/slides/slide5.xml><?xml version="1.0" encoding="utf-8"?>
+<p:sld xmlns:a="http://schemas.openxmlformats.org/drawingml/2006/main" xmlns:r="http://schemas.openxmlformats.org/officeDocument/2006/relationships" xmlns:p="http://schemas.openxmlformats.org/presentationml/2006/main">
+  <p:cSld>
+    <p:spTree>
+      <p:nvGrpSpPr>
+        <p:cNvPr id="1" name=""/>
+        <p:cNvGrpSpPr/>
+        <p:nvPr/>
+      </p:nvGrpSpPr>
+      <p:grpSpPr>
+        <a:xfrm>
+          <a:off x="0" y="0"/>
+          <a:ext cx="0" cy="0"/>
+          <a:chOff x="0" y="0"/>
+          <a:chExt cx="0" cy="0"/>
+        </a:xfrm>
+      </p:grpSpPr>
+      <p:sp>
+        <p:nvSpPr>
           <p:cNvPr id="2" name="Title 1">
             <a:extLst>
               <a:ext uri="{FF2B5EF4-FFF2-40B4-BE49-F238E27FC236}">
@@ -7710,7 +10682,7 @@
                 </a:solidFill>
               </a:rPr>
               <a:pPr/>
-              <a:t>4</a:t>
+              <a:t>5</a:t>
             </a:fld>
             <a:endParaRPr lang="en-US">
               <a:solidFill>

</xml_diff>

<commit_message>
minor edits and diagram update
minor edits to accounts payable, refund request, and update diagrams and nav
</commit_message>
<xml_diff>
--- a/docs/DBA-diagrams.pptx
+++ b/docs/DBA-diagrams.pptx
@@ -6,15 +6,16 @@
     <p:sldMasterId id="2147484308" r:id="rId2"/>
   </p:sldMasterIdLst>
   <p:notesMasterIdLst>
-    <p:notesMasterId r:id="rId9"/>
+    <p:notesMasterId r:id="rId10"/>
   </p:notesMasterIdLst>
   <p:sldIdLst>
     <p:sldId id="2666" r:id="rId3"/>
     <p:sldId id="2668" r:id="rId4"/>
-    <p:sldId id="2670" r:id="rId5"/>
-    <p:sldId id="2671" r:id="rId6"/>
-    <p:sldId id="2669" r:id="rId7"/>
-    <p:sldId id="2667" r:id="rId8"/>
+    <p:sldId id="2672" r:id="rId5"/>
+    <p:sldId id="2670" r:id="rId6"/>
+    <p:sldId id="2671" r:id="rId7"/>
+    <p:sldId id="2669" r:id="rId8"/>
+    <p:sldId id="2667" r:id="rId9"/>
   </p:sldIdLst>
   <p:sldSz cx="12192000" cy="6858000"/>
   <p:notesSz cx="7086600" cy="9372600"/>
@@ -277,7 +278,7 @@
               <a:pPr>
                 <a:defRPr/>
               </a:pPr>
-              <a:t>11/18/20</a:t>
+              <a:t>2/9/21</a:t>
             </a:fld>
             <a:endParaRPr lang="en-US"/>
           </a:p>
@@ -5572,7 +5573,7 @@
         <p:fade/>
       </p:transition>
     </mc:Choice>
-    <mc:Fallback xmlns:mv="urn:schemas-microsoft-com:mac:vml" xmlns="">
+    <mc:Fallback xmlns="" xmlns:mv="urn:schemas-microsoft-com:mac:vml">
       <mp:transition xmlns:mp="http://schemas.microsoft.com/office/mac/powerpoint/2008/main" spd="med"/>
     </mc:Fallback>
   </mc:AlternateContent>
@@ -5619,7 +5620,7 @@
           <a:p>
             <a:r>
               <a:rPr lang="en-US" dirty="0"/>
-              <a:t>refund request scenario (2020)</a:t>
+              <a:t>Refund Request use case</a:t>
             </a:r>
             <a:endParaRPr dirty="0"/>
           </a:p>
@@ -7536,6 +7537,1952 @@
       </p:grpSpPr>
       <p:sp>
         <p:nvSpPr>
+          <p:cNvPr id="2" name="Title 1">
+            <a:extLst>
+              <a:ext uri="{FF2B5EF4-FFF2-40B4-BE49-F238E27FC236}">
+                <a16:creationId xmlns:a16="http://schemas.microsoft.com/office/drawing/2014/main" id="{FDBCBD4C-6130-8A4D-A20A-D3DACE4FED88}"/>
+              </a:ext>
+            </a:extLst>
+          </p:cNvPr>
+          <p:cNvSpPr>
+            <a:spLocks noGrp="1"/>
+          </p:cNvSpPr>
+          <p:nvPr>
+            <p:ph type="title"/>
+          </p:nvPr>
+        </p:nvSpPr>
+        <p:spPr/>
+        <p:txBody>
+          <a:bodyPr/>
+          <a:lstStyle/>
+          <a:p>
+            <a:r>
+              <a:rPr lang="en-US" dirty="0"/>
+              <a:t>Accounts Payable use case</a:t>
+            </a:r>
+            <a:endParaRPr dirty="0"/>
+          </a:p>
+        </p:txBody>
+      </p:sp>
+      <p:sp>
+        <p:nvSpPr>
+          <p:cNvPr id="4" name="Slide Number Placeholder 3">
+            <a:extLst>
+              <a:ext uri="{FF2B5EF4-FFF2-40B4-BE49-F238E27FC236}">
+                <a16:creationId xmlns:a16="http://schemas.microsoft.com/office/drawing/2014/main" id="{FAA30688-F00F-9F40-888A-A703869BEDDC}"/>
+              </a:ext>
+            </a:extLst>
+          </p:cNvPr>
+          <p:cNvSpPr>
+            <a:spLocks noGrp="1"/>
+          </p:cNvSpPr>
+          <p:nvPr>
+            <p:ph type="sldNum" sz="quarter" idx="12"/>
+          </p:nvPr>
+        </p:nvSpPr>
+        <p:spPr/>
+        <p:txBody>
+          <a:bodyPr/>
+          <a:lstStyle/>
+          <a:p>
+            <a:fld id="{E9549862-13E2-C34D-815E-8545BD36FC59}" type="slidenum">
+              <a:rPr lang="en-US" smtClean="0">
+                <a:solidFill>
+                  <a:srgbClr val="6D7777"/>
+                </a:solidFill>
+              </a:rPr>
+              <a:pPr/>
+              <a:t>3</a:t>
+            </a:fld>
+            <a:endParaRPr lang="en-US">
+              <a:solidFill>
+                <a:srgbClr val="6D7777"/>
+              </a:solidFill>
+            </a:endParaRPr>
+          </a:p>
+        </p:txBody>
+      </p:sp>
+      <p:sp>
+        <p:nvSpPr>
+          <p:cNvPr id="5" name="AutoShape 4">
+            <a:extLst>
+              <a:ext uri="{FF2B5EF4-FFF2-40B4-BE49-F238E27FC236}">
+                <a16:creationId xmlns:a16="http://schemas.microsoft.com/office/drawing/2014/main" id="{2FB15809-788F-3843-94BF-D56578181163}"/>
+              </a:ext>
+            </a:extLst>
+          </p:cNvPr>
+          <p:cNvSpPr>
+            <a:spLocks noChangeArrowheads="1"/>
+          </p:cNvSpPr>
+          <p:nvPr/>
+        </p:nvSpPr>
+        <p:spPr bwMode="auto">
+          <a:xfrm>
+            <a:off x="891007" y="1866508"/>
+            <a:ext cx="6020711" cy="3519110"/>
+          </a:xfrm>
+          <a:prstGeom prst="roundRect">
+            <a:avLst>
+              <a:gd name="adj" fmla="val 2714"/>
+            </a:avLst>
+          </a:prstGeom>
+          <a:noFill/>
+          <a:ln w="19050">
+            <a:solidFill>
+              <a:srgbClr val="FF0000"/>
+            </a:solidFill>
+            <a:prstDash val="solid"/>
+            <a:round/>
+            <a:headEnd/>
+            <a:tailEnd/>
+          </a:ln>
+        </p:spPr>
+        <p:txBody>
+          <a:bodyPr lIns="0" tIns="0" rIns="0" bIns="0" anchor="b" anchorCtr="1"/>
+          <a:lstStyle/>
+          <a:p>
+            <a:pPr algn="ctr" defTabSz="914377" eaLnBrk="1" fontAlgn="auto" hangingPunct="1">
+              <a:spcBef>
+                <a:spcPts val="0"/>
+              </a:spcBef>
+              <a:spcAft>
+                <a:spcPts val="0"/>
+              </a:spcAft>
+              <a:defRPr/>
+            </a:pPr>
+            <a:r>
+              <a:rPr lang="en-US" sz="1200" dirty="0">
+                <a:solidFill>
+                  <a:prstClr val="black"/>
+                </a:solidFill>
+                <a:latin typeface="Arial"/>
+              </a:rPr>
+              <a:t>OpenShift Container Platform</a:t>
+            </a:r>
+            <a:endParaRPr lang="en-US" sz="1200" dirty="0">
+              <a:solidFill>
+                <a:prstClr val="black"/>
+              </a:solidFill>
+              <a:latin typeface="Arial"/>
+              <a:cs typeface="+mn-cs"/>
+            </a:endParaRPr>
+          </a:p>
+        </p:txBody>
+      </p:sp>
+      <p:sp>
+        <p:nvSpPr>
+          <p:cNvPr id="6" name="AutoShape 4">
+            <a:extLst>
+              <a:ext uri="{FF2B5EF4-FFF2-40B4-BE49-F238E27FC236}">
+                <a16:creationId xmlns:a16="http://schemas.microsoft.com/office/drawing/2014/main" id="{2B9DFC2C-F306-0E4A-A4BD-C81788E28E3F}"/>
+              </a:ext>
+            </a:extLst>
+          </p:cNvPr>
+          <p:cNvSpPr>
+            <a:spLocks noChangeArrowheads="1"/>
+          </p:cNvSpPr>
+          <p:nvPr/>
+        </p:nvSpPr>
+        <p:spPr bwMode="auto">
+          <a:xfrm>
+            <a:off x="891007" y="5432860"/>
+            <a:ext cx="10215639" cy="347646"/>
+          </a:xfrm>
+          <a:prstGeom prst="roundRect">
+            <a:avLst>
+              <a:gd name="adj" fmla="val 7117"/>
+            </a:avLst>
+          </a:prstGeom>
+          <a:noFill/>
+          <a:ln w="12700">
+            <a:solidFill>
+              <a:schemeClr val="bg1">
+                <a:lumMod val="10000"/>
+              </a:schemeClr>
+            </a:solidFill>
+            <a:prstDash val="solid"/>
+            <a:round/>
+            <a:headEnd/>
+            <a:tailEnd/>
+          </a:ln>
+        </p:spPr>
+        <p:txBody>
+          <a:bodyPr lIns="0" tIns="0" rIns="0" bIns="0" anchor="b" anchorCtr="1"/>
+          <a:lstStyle/>
+          <a:p>
+            <a:pPr algn="ctr" defTabSz="914377" eaLnBrk="1" fontAlgn="auto" hangingPunct="1">
+              <a:spcBef>
+                <a:spcPts val="0"/>
+              </a:spcBef>
+              <a:spcAft>
+                <a:spcPts val="0"/>
+              </a:spcAft>
+              <a:defRPr/>
+            </a:pPr>
+            <a:r>
+              <a:rPr lang="en-US" sz="1200" dirty="0">
+                <a:solidFill>
+                  <a:prstClr val="black"/>
+                </a:solidFill>
+                <a:latin typeface="Arial"/>
+              </a:rPr>
+              <a:t>On-premise or Cloud Providers (IBM, AWS, GCP, Azure...)</a:t>
+            </a:r>
+            <a:endParaRPr lang="en-US" sz="1200" dirty="0">
+              <a:solidFill>
+                <a:prstClr val="black"/>
+              </a:solidFill>
+              <a:latin typeface="Arial"/>
+              <a:cs typeface="+mn-cs"/>
+            </a:endParaRPr>
+          </a:p>
+        </p:txBody>
+      </p:sp>
+      <p:sp>
+        <p:nvSpPr>
+          <p:cNvPr id="9" name="Rounded Rectangle 8">
+            <a:extLst>
+              <a:ext uri="{FF2B5EF4-FFF2-40B4-BE49-F238E27FC236}">
+                <a16:creationId xmlns:a16="http://schemas.microsoft.com/office/drawing/2014/main" id="{D6AEE529-3EDC-D24A-895D-1A327D19E6CC}"/>
+              </a:ext>
+            </a:extLst>
+          </p:cNvPr>
+          <p:cNvSpPr/>
+          <p:nvPr/>
+        </p:nvSpPr>
+        <p:spPr>
+          <a:xfrm>
+            <a:off x="7391403" y="2076151"/>
+            <a:ext cx="1161059" cy="660401"/>
+          </a:xfrm>
+          <a:prstGeom prst="roundRect">
+            <a:avLst>
+              <a:gd name="adj" fmla="val 7576"/>
+            </a:avLst>
+          </a:prstGeom>
+          <a:solidFill>
+            <a:srgbClr val="92D050"/>
+          </a:solidFill>
+          <a:ln>
+            <a:noFill/>
+          </a:ln>
+          <a:effectLst>
+            <a:outerShdw blurRad="50800" dist="38100" dir="5400000" algn="t" rotWithShape="0">
+              <a:prstClr val="black">
+                <a:alpha val="40000"/>
+              </a:prstClr>
+            </a:outerShdw>
+          </a:effectLst>
+        </p:spPr>
+        <p:style>
+          <a:lnRef idx="2">
+            <a:schemeClr val="accent1">
+              <a:shade val="50000"/>
+            </a:schemeClr>
+          </a:lnRef>
+          <a:fillRef idx="1">
+            <a:schemeClr val="accent1"/>
+          </a:fillRef>
+          <a:effectRef idx="0">
+            <a:schemeClr val="accent1"/>
+          </a:effectRef>
+          <a:fontRef idx="minor">
+            <a:schemeClr val="lt1"/>
+          </a:fontRef>
+        </p:style>
+        <p:txBody>
+          <a:bodyPr rtlCol="0" anchor="ctr"/>
+          <a:lstStyle/>
+          <a:p>
+            <a:pPr algn="ctr" defTabSz="914377" eaLnBrk="1" fontAlgn="auto" hangingPunct="1">
+              <a:spcBef>
+                <a:spcPts val="0"/>
+              </a:spcBef>
+              <a:spcAft>
+                <a:spcPts val="0"/>
+              </a:spcAft>
+            </a:pPr>
+            <a:r>
+              <a:rPr lang="en-US" sz="900" b="1" dirty="0">
+                <a:solidFill>
+                  <a:srgbClr val="244311"/>
+                </a:solidFill>
+                <a:latin typeface="Arial"/>
+              </a:rPr>
+              <a:t>Accounts Payable Process App</a:t>
+            </a:r>
+          </a:p>
+        </p:txBody>
+      </p:sp>
+      <p:sp>
+        <p:nvSpPr>
+          <p:cNvPr id="10" name="AutoShape 4">
+            <a:extLst>
+              <a:ext uri="{FF2B5EF4-FFF2-40B4-BE49-F238E27FC236}">
+                <a16:creationId xmlns:a16="http://schemas.microsoft.com/office/drawing/2014/main" id="{90F82829-A4B7-A640-91D2-3467C63CA3D7}"/>
+              </a:ext>
+            </a:extLst>
+          </p:cNvPr>
+          <p:cNvSpPr>
+            <a:spLocks noChangeArrowheads="1"/>
+          </p:cNvSpPr>
+          <p:nvPr/>
+        </p:nvSpPr>
+        <p:spPr bwMode="auto">
+          <a:xfrm>
+            <a:off x="4588655" y="2205817"/>
+            <a:ext cx="2255520" cy="2497556"/>
+          </a:xfrm>
+          <a:prstGeom prst="roundRect">
+            <a:avLst>
+              <a:gd name="adj" fmla="val 7117"/>
+            </a:avLst>
+          </a:prstGeom>
+          <a:noFill/>
+          <a:ln w="12700">
+            <a:solidFill>
+              <a:schemeClr val="tx2">
+                <a:lumMod val="50000"/>
+              </a:schemeClr>
+            </a:solidFill>
+            <a:prstDash val="dash"/>
+            <a:round/>
+            <a:headEnd/>
+            <a:tailEnd/>
+          </a:ln>
+        </p:spPr>
+        <p:txBody>
+          <a:bodyPr lIns="0" tIns="0" rIns="0" bIns="0" anchor="b" anchorCtr="1"/>
+          <a:lstStyle/>
+          <a:p>
+            <a:pPr algn="ctr" defTabSz="914377" eaLnBrk="1" fontAlgn="auto" hangingPunct="1">
+              <a:spcBef>
+                <a:spcPts val="0"/>
+              </a:spcBef>
+              <a:spcAft>
+                <a:spcPts val="0"/>
+              </a:spcAft>
+              <a:defRPr/>
+            </a:pPr>
+            <a:r>
+              <a:rPr lang="en-US" sz="1200" dirty="0">
+                <a:solidFill>
+                  <a:prstClr val="black"/>
+                </a:solidFill>
+                <a:latin typeface="Arial"/>
+                <a:cs typeface="+mn-cs"/>
+              </a:rPr>
+              <a:t>Business Automation Insight</a:t>
+            </a:r>
+          </a:p>
+        </p:txBody>
+      </p:sp>
+      <p:sp>
+        <p:nvSpPr>
+          <p:cNvPr id="11" name="AutoShape 4">
+            <a:extLst>
+              <a:ext uri="{FF2B5EF4-FFF2-40B4-BE49-F238E27FC236}">
+                <a16:creationId xmlns:a16="http://schemas.microsoft.com/office/drawing/2014/main" id="{CC1AD571-B5DB-A746-9798-81C794C0603C}"/>
+              </a:ext>
+            </a:extLst>
+          </p:cNvPr>
+          <p:cNvSpPr>
+            <a:spLocks noChangeArrowheads="1"/>
+          </p:cNvSpPr>
+          <p:nvPr/>
+        </p:nvSpPr>
+        <p:spPr bwMode="auto">
+          <a:xfrm>
+            <a:off x="940042" y="3498901"/>
+            <a:ext cx="3482795" cy="1204471"/>
+          </a:xfrm>
+          <a:prstGeom prst="roundRect">
+            <a:avLst>
+              <a:gd name="adj" fmla="val 7117"/>
+            </a:avLst>
+          </a:prstGeom>
+          <a:noFill/>
+          <a:ln w="12700">
+            <a:solidFill>
+              <a:schemeClr val="tx2">
+                <a:lumMod val="50000"/>
+              </a:schemeClr>
+            </a:solidFill>
+            <a:prstDash val="dash"/>
+            <a:round/>
+            <a:headEnd/>
+            <a:tailEnd/>
+          </a:ln>
+        </p:spPr>
+        <p:txBody>
+          <a:bodyPr lIns="0" tIns="0" rIns="0" bIns="0" anchor="b" anchorCtr="1"/>
+          <a:lstStyle/>
+          <a:p>
+            <a:pPr algn="ctr" defTabSz="914377" eaLnBrk="1" fontAlgn="auto" hangingPunct="1">
+              <a:spcBef>
+                <a:spcPts val="0"/>
+              </a:spcBef>
+              <a:spcAft>
+                <a:spcPts val="0"/>
+              </a:spcAft>
+              <a:defRPr/>
+            </a:pPr>
+            <a:r>
+              <a:rPr lang="en-US" sz="1200" dirty="0">
+                <a:solidFill>
+                  <a:prstClr val="black"/>
+                </a:solidFill>
+                <a:latin typeface="Arial"/>
+                <a:cs typeface="+mn-cs"/>
+              </a:rPr>
+              <a:t>Operational Decision Manager - Dev</a:t>
+            </a:r>
+          </a:p>
+        </p:txBody>
+      </p:sp>
+      <p:sp>
+        <p:nvSpPr>
+          <p:cNvPr id="12" name="AutoShape 4">
+            <a:extLst>
+              <a:ext uri="{FF2B5EF4-FFF2-40B4-BE49-F238E27FC236}">
+                <a16:creationId xmlns:a16="http://schemas.microsoft.com/office/drawing/2014/main" id="{2846B9AC-58A8-7945-9399-1FB1814F7808}"/>
+              </a:ext>
+            </a:extLst>
+          </p:cNvPr>
+          <p:cNvSpPr>
+            <a:spLocks noChangeArrowheads="1"/>
+          </p:cNvSpPr>
+          <p:nvPr/>
+        </p:nvSpPr>
+        <p:spPr bwMode="auto">
+          <a:xfrm>
+            <a:off x="6960753" y="1866508"/>
+            <a:ext cx="4145893" cy="3519109"/>
+          </a:xfrm>
+          <a:prstGeom prst="roundRect">
+            <a:avLst>
+              <a:gd name="adj" fmla="val 2714"/>
+            </a:avLst>
+          </a:prstGeom>
+          <a:noFill/>
+          <a:ln w="19050">
+            <a:solidFill>
+              <a:srgbClr val="1B44A7"/>
+            </a:solidFill>
+            <a:prstDash val="solid"/>
+            <a:round/>
+            <a:headEnd/>
+            <a:tailEnd/>
+          </a:ln>
+        </p:spPr>
+        <p:txBody>
+          <a:bodyPr lIns="0" tIns="0" rIns="0" bIns="0" anchor="b" anchorCtr="1"/>
+          <a:lstStyle/>
+          <a:p>
+            <a:pPr algn="ctr" defTabSz="914377" eaLnBrk="1" fontAlgn="auto" hangingPunct="1">
+              <a:spcBef>
+                <a:spcPts val="0"/>
+              </a:spcBef>
+              <a:spcAft>
+                <a:spcPts val="0"/>
+              </a:spcAft>
+              <a:defRPr/>
+            </a:pPr>
+            <a:r>
+              <a:rPr lang="en-US" sz="1200" dirty="0">
+                <a:solidFill>
+                  <a:prstClr val="black"/>
+                </a:solidFill>
+                <a:latin typeface="Arial"/>
+              </a:rPr>
+              <a:t>VM</a:t>
+            </a:r>
+            <a:endParaRPr lang="en-US" sz="1200" dirty="0">
+              <a:solidFill>
+                <a:prstClr val="black"/>
+              </a:solidFill>
+              <a:latin typeface="Arial"/>
+              <a:cs typeface="+mn-cs"/>
+            </a:endParaRPr>
+          </a:p>
+        </p:txBody>
+      </p:sp>
+      <p:sp>
+        <p:nvSpPr>
+          <p:cNvPr id="13" name="AutoShape 4">
+            <a:extLst>
+              <a:ext uri="{FF2B5EF4-FFF2-40B4-BE49-F238E27FC236}">
+                <a16:creationId xmlns:a16="http://schemas.microsoft.com/office/drawing/2014/main" id="{2D290673-5AFB-3149-BBB9-FAD6AD0EA6E9}"/>
+              </a:ext>
+            </a:extLst>
+          </p:cNvPr>
+          <p:cNvSpPr>
+            <a:spLocks noChangeArrowheads="1"/>
+          </p:cNvSpPr>
+          <p:nvPr/>
+        </p:nvSpPr>
+        <p:spPr bwMode="auto">
+          <a:xfrm>
+            <a:off x="9122378" y="1952964"/>
+            <a:ext cx="1899893" cy="2750408"/>
+          </a:xfrm>
+          <a:prstGeom prst="roundRect">
+            <a:avLst>
+              <a:gd name="adj" fmla="val 7117"/>
+            </a:avLst>
+          </a:prstGeom>
+          <a:noFill/>
+          <a:ln w="12700">
+            <a:solidFill>
+              <a:schemeClr val="tx2">
+                <a:lumMod val="50000"/>
+              </a:schemeClr>
+            </a:solidFill>
+            <a:prstDash val="dash"/>
+            <a:round/>
+            <a:headEnd/>
+            <a:tailEnd/>
+          </a:ln>
+        </p:spPr>
+        <p:txBody>
+          <a:bodyPr lIns="0" tIns="0" rIns="0" bIns="0" anchor="b" anchorCtr="1"/>
+          <a:lstStyle/>
+          <a:p>
+            <a:pPr algn="ctr" defTabSz="914377" eaLnBrk="1" fontAlgn="auto" hangingPunct="1">
+              <a:spcBef>
+                <a:spcPts val="0"/>
+              </a:spcBef>
+              <a:spcAft>
+                <a:spcPts val="0"/>
+              </a:spcAft>
+              <a:defRPr/>
+            </a:pPr>
+            <a:r>
+              <a:rPr lang="en-US" sz="1200" dirty="0">
+                <a:solidFill>
+                  <a:prstClr val="black"/>
+                </a:solidFill>
+                <a:latin typeface="Arial"/>
+                <a:cs typeface="+mn-cs"/>
+              </a:rPr>
+              <a:t>Business Automation Workflow - Prod</a:t>
+            </a:r>
+          </a:p>
+        </p:txBody>
+      </p:sp>
+      <p:sp>
+        <p:nvSpPr>
+          <p:cNvPr id="15" name="Rounded Rectangle 14">
+            <a:extLst>
+              <a:ext uri="{FF2B5EF4-FFF2-40B4-BE49-F238E27FC236}">
+                <a16:creationId xmlns:a16="http://schemas.microsoft.com/office/drawing/2014/main" id="{6B007D79-16AB-164F-A735-FB42570A5B70}"/>
+              </a:ext>
+            </a:extLst>
+          </p:cNvPr>
+          <p:cNvSpPr/>
+          <p:nvPr/>
+        </p:nvSpPr>
+        <p:spPr>
+          <a:xfrm>
+            <a:off x="9165238" y="3855768"/>
+            <a:ext cx="1814171" cy="385810"/>
+          </a:xfrm>
+          <a:prstGeom prst="roundRect">
+            <a:avLst>
+              <a:gd name="adj" fmla="val 7576"/>
+            </a:avLst>
+          </a:prstGeom>
+          <a:solidFill>
+            <a:schemeClr val="tx2">
+              <a:lumMod val="75000"/>
+            </a:schemeClr>
+          </a:solidFill>
+          <a:ln>
+            <a:noFill/>
+          </a:ln>
+          <a:effectLst>
+            <a:outerShdw blurRad="50800" dist="38100" dir="5400000" algn="t" rotWithShape="0">
+              <a:prstClr val="black">
+                <a:alpha val="40000"/>
+              </a:prstClr>
+            </a:outerShdw>
+          </a:effectLst>
+        </p:spPr>
+        <p:style>
+          <a:lnRef idx="2">
+            <a:schemeClr val="accent1">
+              <a:shade val="50000"/>
+            </a:schemeClr>
+          </a:lnRef>
+          <a:fillRef idx="1">
+            <a:schemeClr val="accent1"/>
+          </a:fillRef>
+          <a:effectRef idx="0">
+            <a:schemeClr val="accent1"/>
+          </a:effectRef>
+          <a:fontRef idx="minor">
+            <a:schemeClr val="lt1"/>
+          </a:fontRef>
+        </p:style>
+        <p:txBody>
+          <a:bodyPr rtlCol="0" anchor="ctr"/>
+          <a:lstStyle/>
+          <a:p>
+            <a:pPr algn="ctr" defTabSz="914377" eaLnBrk="1" fontAlgn="auto" hangingPunct="1">
+              <a:spcBef>
+                <a:spcPts val="0"/>
+              </a:spcBef>
+              <a:spcAft>
+                <a:spcPts val="0"/>
+              </a:spcAft>
+            </a:pPr>
+            <a:r>
+              <a:rPr lang="en-US" sz="900" b="1" dirty="0">
+                <a:solidFill>
+                  <a:prstClr val="white"/>
+                </a:solidFill>
+                <a:latin typeface="Arial"/>
+              </a:rPr>
+              <a:t>Workflow Server</a:t>
+            </a:r>
+          </a:p>
+        </p:txBody>
+      </p:sp>
+      <p:sp>
+        <p:nvSpPr>
+          <p:cNvPr id="17" name="Rounded Rectangle 16">
+            <a:extLst>
+              <a:ext uri="{FF2B5EF4-FFF2-40B4-BE49-F238E27FC236}">
+                <a16:creationId xmlns:a16="http://schemas.microsoft.com/office/drawing/2014/main" id="{01038804-C1A1-F547-9999-EB2368EEF20D}"/>
+              </a:ext>
+            </a:extLst>
+          </p:cNvPr>
+          <p:cNvSpPr/>
+          <p:nvPr/>
+        </p:nvSpPr>
+        <p:spPr>
+          <a:xfrm>
+            <a:off x="7064848" y="2856275"/>
+            <a:ext cx="1814171" cy="385810"/>
+          </a:xfrm>
+          <a:prstGeom prst="roundRect">
+            <a:avLst>
+              <a:gd name="adj" fmla="val 7576"/>
+            </a:avLst>
+          </a:prstGeom>
+          <a:solidFill>
+            <a:schemeClr val="tx2">
+              <a:lumMod val="75000"/>
+            </a:schemeClr>
+          </a:solidFill>
+          <a:ln>
+            <a:noFill/>
+          </a:ln>
+          <a:effectLst>
+            <a:outerShdw blurRad="50800" dist="38100" dir="5400000" algn="t" rotWithShape="0">
+              <a:prstClr val="black">
+                <a:alpha val="40000"/>
+              </a:prstClr>
+            </a:outerShdw>
+          </a:effectLst>
+        </p:spPr>
+        <p:style>
+          <a:lnRef idx="2">
+            <a:schemeClr val="accent1">
+              <a:shade val="50000"/>
+            </a:schemeClr>
+          </a:lnRef>
+          <a:fillRef idx="1">
+            <a:schemeClr val="accent1"/>
+          </a:fillRef>
+          <a:effectRef idx="0">
+            <a:schemeClr val="accent1"/>
+          </a:effectRef>
+          <a:fontRef idx="minor">
+            <a:schemeClr val="lt1"/>
+          </a:fontRef>
+        </p:style>
+        <p:txBody>
+          <a:bodyPr rtlCol="0" anchor="ctr"/>
+          <a:lstStyle/>
+          <a:p>
+            <a:pPr algn="ctr" defTabSz="914377" eaLnBrk="1" fontAlgn="auto" hangingPunct="1">
+              <a:spcBef>
+                <a:spcPts val="0"/>
+              </a:spcBef>
+              <a:spcAft>
+                <a:spcPts val="0"/>
+              </a:spcAft>
+            </a:pPr>
+            <a:r>
+              <a:rPr lang="en-US" sz="900" b="1" dirty="0">
+                <a:solidFill>
+                  <a:prstClr val="white"/>
+                </a:solidFill>
+                <a:latin typeface="Arial"/>
+              </a:rPr>
+              <a:t>Process Portal</a:t>
+            </a:r>
+          </a:p>
+        </p:txBody>
+      </p:sp>
+      <p:sp>
+        <p:nvSpPr>
+          <p:cNvPr id="20" name="Rounded Rectangle 19">
+            <a:extLst>
+              <a:ext uri="{FF2B5EF4-FFF2-40B4-BE49-F238E27FC236}">
+                <a16:creationId xmlns:a16="http://schemas.microsoft.com/office/drawing/2014/main" id="{2B94C62F-77D1-674C-9EC1-A56B83638F9B}"/>
+              </a:ext>
+            </a:extLst>
+          </p:cNvPr>
+          <p:cNvSpPr/>
+          <p:nvPr/>
+        </p:nvSpPr>
+        <p:spPr>
+          <a:xfrm>
+            <a:off x="4809328" y="3855768"/>
+            <a:ext cx="1814171" cy="385810"/>
+          </a:xfrm>
+          <a:prstGeom prst="roundRect">
+            <a:avLst>
+              <a:gd name="adj" fmla="val 7576"/>
+            </a:avLst>
+          </a:prstGeom>
+          <a:solidFill>
+            <a:schemeClr val="tx2">
+              <a:lumMod val="75000"/>
+            </a:schemeClr>
+          </a:solidFill>
+          <a:ln>
+            <a:noFill/>
+          </a:ln>
+          <a:effectLst>
+            <a:outerShdw blurRad="50800" dist="38100" dir="5400000" algn="t" rotWithShape="0">
+              <a:prstClr val="black">
+                <a:alpha val="40000"/>
+              </a:prstClr>
+            </a:outerShdw>
+          </a:effectLst>
+        </p:spPr>
+        <p:style>
+          <a:lnRef idx="2">
+            <a:schemeClr val="accent1">
+              <a:shade val="50000"/>
+            </a:schemeClr>
+          </a:lnRef>
+          <a:fillRef idx="1">
+            <a:schemeClr val="accent1"/>
+          </a:fillRef>
+          <a:effectRef idx="0">
+            <a:schemeClr val="accent1"/>
+          </a:effectRef>
+          <a:fontRef idx="minor">
+            <a:schemeClr val="lt1"/>
+          </a:fontRef>
+        </p:style>
+        <p:txBody>
+          <a:bodyPr rtlCol="0" anchor="ctr"/>
+          <a:lstStyle/>
+          <a:p>
+            <a:pPr algn="ctr" defTabSz="914377" eaLnBrk="1" fontAlgn="auto" hangingPunct="1">
+              <a:spcBef>
+                <a:spcPts val="0"/>
+              </a:spcBef>
+              <a:spcAft>
+                <a:spcPts val="0"/>
+              </a:spcAft>
+            </a:pPr>
+            <a:r>
+              <a:rPr lang="en-US" sz="900" b="1" dirty="0">
+                <a:solidFill>
+                  <a:prstClr val="white"/>
+                </a:solidFill>
+                <a:latin typeface="Arial"/>
+              </a:rPr>
+              <a:t>Kafka Brokers</a:t>
+            </a:r>
+          </a:p>
+        </p:txBody>
+      </p:sp>
+      <p:sp>
+        <p:nvSpPr>
+          <p:cNvPr id="21" name="Rounded Rectangle 20">
+            <a:extLst>
+              <a:ext uri="{FF2B5EF4-FFF2-40B4-BE49-F238E27FC236}">
+                <a16:creationId xmlns:a16="http://schemas.microsoft.com/office/drawing/2014/main" id="{20CA7BE2-AC06-9B43-816E-6496BFD55CF4}"/>
+              </a:ext>
+            </a:extLst>
+          </p:cNvPr>
+          <p:cNvSpPr/>
+          <p:nvPr/>
+        </p:nvSpPr>
+        <p:spPr>
+          <a:xfrm>
+            <a:off x="4809328" y="3355280"/>
+            <a:ext cx="1814171" cy="385810"/>
+          </a:xfrm>
+          <a:prstGeom prst="roundRect">
+            <a:avLst>
+              <a:gd name="adj" fmla="val 7576"/>
+            </a:avLst>
+          </a:prstGeom>
+          <a:solidFill>
+            <a:schemeClr val="tx2">
+              <a:lumMod val="75000"/>
+            </a:schemeClr>
+          </a:solidFill>
+          <a:ln>
+            <a:noFill/>
+          </a:ln>
+          <a:effectLst>
+            <a:outerShdw blurRad="50800" dist="38100" dir="5400000" algn="t" rotWithShape="0">
+              <a:prstClr val="black">
+                <a:alpha val="40000"/>
+              </a:prstClr>
+            </a:outerShdw>
+          </a:effectLst>
+        </p:spPr>
+        <p:style>
+          <a:lnRef idx="2">
+            <a:schemeClr val="accent1">
+              <a:shade val="50000"/>
+            </a:schemeClr>
+          </a:lnRef>
+          <a:fillRef idx="1">
+            <a:schemeClr val="accent1"/>
+          </a:fillRef>
+          <a:effectRef idx="0">
+            <a:schemeClr val="accent1"/>
+          </a:effectRef>
+          <a:fontRef idx="minor">
+            <a:schemeClr val="lt1"/>
+          </a:fontRef>
+        </p:style>
+        <p:txBody>
+          <a:bodyPr rtlCol="0" anchor="ctr"/>
+          <a:lstStyle/>
+          <a:p>
+            <a:pPr algn="ctr" defTabSz="914377" eaLnBrk="1" fontAlgn="auto" hangingPunct="1">
+              <a:spcBef>
+                <a:spcPts val="0"/>
+              </a:spcBef>
+              <a:spcAft>
+                <a:spcPts val="0"/>
+              </a:spcAft>
+            </a:pPr>
+            <a:r>
+              <a:rPr lang="en-US" sz="900" b="1" dirty="0">
+                <a:solidFill>
+                  <a:prstClr val="white"/>
+                </a:solidFill>
+                <a:latin typeface="Arial"/>
+              </a:rPr>
+              <a:t>Data Ingestion Processing</a:t>
+            </a:r>
+          </a:p>
+        </p:txBody>
+      </p:sp>
+      <p:sp>
+        <p:nvSpPr>
+          <p:cNvPr id="22" name="Rounded Rectangle 21">
+            <a:extLst>
+              <a:ext uri="{FF2B5EF4-FFF2-40B4-BE49-F238E27FC236}">
+                <a16:creationId xmlns:a16="http://schemas.microsoft.com/office/drawing/2014/main" id="{617B0DDB-4F6E-2144-86D9-045B5610C8C6}"/>
+              </a:ext>
+            </a:extLst>
+          </p:cNvPr>
+          <p:cNvSpPr/>
+          <p:nvPr/>
+        </p:nvSpPr>
+        <p:spPr>
+          <a:xfrm>
+            <a:off x="4809328" y="2852630"/>
+            <a:ext cx="1814171" cy="385810"/>
+          </a:xfrm>
+          <a:prstGeom prst="roundRect">
+            <a:avLst>
+              <a:gd name="adj" fmla="val 7576"/>
+            </a:avLst>
+          </a:prstGeom>
+          <a:solidFill>
+            <a:schemeClr val="tx2">
+              <a:lumMod val="75000"/>
+            </a:schemeClr>
+          </a:solidFill>
+          <a:ln>
+            <a:noFill/>
+          </a:ln>
+          <a:effectLst>
+            <a:outerShdw blurRad="50800" dist="38100" dir="5400000" algn="t" rotWithShape="0">
+              <a:prstClr val="black">
+                <a:alpha val="40000"/>
+              </a:prstClr>
+            </a:outerShdw>
+          </a:effectLst>
+        </p:spPr>
+        <p:style>
+          <a:lnRef idx="2">
+            <a:schemeClr val="accent1">
+              <a:shade val="50000"/>
+            </a:schemeClr>
+          </a:lnRef>
+          <a:fillRef idx="1">
+            <a:schemeClr val="accent1"/>
+          </a:fillRef>
+          <a:effectRef idx="0">
+            <a:schemeClr val="accent1"/>
+          </a:effectRef>
+          <a:fontRef idx="minor">
+            <a:schemeClr val="lt1"/>
+          </a:fontRef>
+        </p:style>
+        <p:txBody>
+          <a:bodyPr rtlCol="0" anchor="ctr"/>
+          <a:lstStyle/>
+          <a:p>
+            <a:pPr algn="ctr" defTabSz="914377" eaLnBrk="1" fontAlgn="auto" hangingPunct="1">
+              <a:spcBef>
+                <a:spcPts val="0"/>
+              </a:spcBef>
+              <a:spcAft>
+                <a:spcPts val="0"/>
+              </a:spcAft>
+            </a:pPr>
+            <a:r>
+              <a:rPr lang="en-US" sz="900" b="1" dirty="0">
+                <a:solidFill>
+                  <a:prstClr val="white"/>
+                </a:solidFill>
+                <a:latin typeface="Arial"/>
+              </a:rPr>
+              <a:t>Query &amp; Search</a:t>
+            </a:r>
+          </a:p>
+        </p:txBody>
+      </p:sp>
+      <p:sp>
+        <p:nvSpPr>
+          <p:cNvPr id="23" name="Rounded Rectangle 22">
+            <a:extLst>
+              <a:ext uri="{FF2B5EF4-FFF2-40B4-BE49-F238E27FC236}">
+                <a16:creationId xmlns:a16="http://schemas.microsoft.com/office/drawing/2014/main" id="{16D2E09D-8190-4C4C-9C25-E454341A7505}"/>
+              </a:ext>
+            </a:extLst>
+          </p:cNvPr>
+          <p:cNvSpPr/>
+          <p:nvPr/>
+        </p:nvSpPr>
+        <p:spPr>
+          <a:xfrm>
+            <a:off x="4809328" y="2355744"/>
+            <a:ext cx="1814171" cy="385810"/>
+          </a:xfrm>
+          <a:prstGeom prst="roundRect">
+            <a:avLst>
+              <a:gd name="adj" fmla="val 7576"/>
+            </a:avLst>
+          </a:prstGeom>
+          <a:solidFill>
+            <a:schemeClr val="tx2">
+              <a:lumMod val="75000"/>
+            </a:schemeClr>
+          </a:solidFill>
+          <a:ln>
+            <a:noFill/>
+          </a:ln>
+          <a:effectLst>
+            <a:outerShdw blurRad="50800" dist="38100" dir="5400000" algn="t" rotWithShape="0">
+              <a:prstClr val="black">
+                <a:alpha val="40000"/>
+              </a:prstClr>
+            </a:outerShdw>
+          </a:effectLst>
+        </p:spPr>
+        <p:style>
+          <a:lnRef idx="2">
+            <a:schemeClr val="accent1">
+              <a:shade val="50000"/>
+            </a:schemeClr>
+          </a:lnRef>
+          <a:fillRef idx="1">
+            <a:schemeClr val="accent1"/>
+          </a:fillRef>
+          <a:effectRef idx="0">
+            <a:schemeClr val="accent1"/>
+          </a:effectRef>
+          <a:fontRef idx="minor">
+            <a:schemeClr val="lt1"/>
+          </a:fontRef>
+        </p:style>
+        <p:txBody>
+          <a:bodyPr rtlCol="0" anchor="ctr"/>
+          <a:lstStyle/>
+          <a:p>
+            <a:pPr algn="ctr" defTabSz="914377" eaLnBrk="1" fontAlgn="auto" hangingPunct="1">
+              <a:spcBef>
+                <a:spcPts val="0"/>
+              </a:spcBef>
+              <a:spcAft>
+                <a:spcPts val="0"/>
+              </a:spcAft>
+            </a:pPr>
+            <a:r>
+              <a:rPr lang="en-US" sz="900" b="1" dirty="0">
+                <a:solidFill>
+                  <a:prstClr val="white"/>
+                </a:solidFill>
+                <a:latin typeface="Arial"/>
+              </a:rPr>
+              <a:t>Dashboard</a:t>
+            </a:r>
+          </a:p>
+        </p:txBody>
+      </p:sp>
+      <p:sp>
+        <p:nvSpPr>
+          <p:cNvPr id="24" name="Rounded Rectangle 23">
+            <a:extLst>
+              <a:ext uri="{FF2B5EF4-FFF2-40B4-BE49-F238E27FC236}">
+                <a16:creationId xmlns:a16="http://schemas.microsoft.com/office/drawing/2014/main" id="{B2FD7BDC-91B3-C14F-B20F-60269FFCECD5}"/>
+              </a:ext>
+            </a:extLst>
+          </p:cNvPr>
+          <p:cNvSpPr/>
+          <p:nvPr/>
+        </p:nvSpPr>
+        <p:spPr>
+          <a:xfrm>
+            <a:off x="2512077" y="4024854"/>
+            <a:ext cx="1814171" cy="385810"/>
+          </a:xfrm>
+          <a:prstGeom prst="roundRect">
+            <a:avLst>
+              <a:gd name="adj" fmla="val 7576"/>
+            </a:avLst>
+          </a:prstGeom>
+          <a:solidFill>
+            <a:schemeClr val="tx2">
+              <a:lumMod val="75000"/>
+            </a:schemeClr>
+          </a:solidFill>
+          <a:ln>
+            <a:noFill/>
+          </a:ln>
+          <a:effectLst>
+            <a:outerShdw blurRad="50800" dist="38100" dir="5400000" algn="t" rotWithShape="0">
+              <a:prstClr val="black">
+                <a:alpha val="40000"/>
+              </a:prstClr>
+            </a:outerShdw>
+          </a:effectLst>
+        </p:spPr>
+        <p:style>
+          <a:lnRef idx="2">
+            <a:schemeClr val="accent1">
+              <a:shade val="50000"/>
+            </a:schemeClr>
+          </a:lnRef>
+          <a:fillRef idx="1">
+            <a:schemeClr val="accent1"/>
+          </a:fillRef>
+          <a:effectRef idx="0">
+            <a:schemeClr val="accent1"/>
+          </a:effectRef>
+          <a:fontRef idx="minor">
+            <a:schemeClr val="lt1"/>
+          </a:fontRef>
+        </p:style>
+        <p:txBody>
+          <a:bodyPr rtlCol="0" anchor="ctr"/>
+          <a:lstStyle/>
+          <a:p>
+            <a:pPr algn="ctr" defTabSz="914377" eaLnBrk="1" fontAlgn="auto" hangingPunct="1">
+              <a:spcBef>
+                <a:spcPts val="0"/>
+              </a:spcBef>
+              <a:spcAft>
+                <a:spcPts val="0"/>
+              </a:spcAft>
+            </a:pPr>
+            <a:r>
+              <a:rPr lang="en-US" sz="900" b="1" dirty="0">
+                <a:solidFill>
+                  <a:prstClr val="white"/>
+                </a:solidFill>
+                <a:latin typeface="Arial"/>
+              </a:rPr>
+              <a:t>Decision Server</a:t>
+            </a:r>
+          </a:p>
+        </p:txBody>
+      </p:sp>
+      <p:sp>
+        <p:nvSpPr>
+          <p:cNvPr id="25" name="Rounded Rectangle 24">
+            <a:extLst>
+              <a:ext uri="{FF2B5EF4-FFF2-40B4-BE49-F238E27FC236}">
+                <a16:creationId xmlns:a16="http://schemas.microsoft.com/office/drawing/2014/main" id="{E86B680B-0D7C-314E-86C5-22F8255EE24D}"/>
+              </a:ext>
+            </a:extLst>
+          </p:cNvPr>
+          <p:cNvSpPr/>
+          <p:nvPr/>
+        </p:nvSpPr>
+        <p:spPr>
+          <a:xfrm>
+            <a:off x="2512077" y="3581171"/>
+            <a:ext cx="1814171" cy="385810"/>
+          </a:xfrm>
+          <a:prstGeom prst="roundRect">
+            <a:avLst>
+              <a:gd name="adj" fmla="val 7576"/>
+            </a:avLst>
+          </a:prstGeom>
+          <a:solidFill>
+            <a:schemeClr val="tx2">
+              <a:lumMod val="75000"/>
+            </a:schemeClr>
+          </a:solidFill>
+          <a:ln>
+            <a:noFill/>
+          </a:ln>
+          <a:effectLst>
+            <a:outerShdw blurRad="50800" dist="38100" dir="5400000" algn="t" rotWithShape="0">
+              <a:prstClr val="black">
+                <a:alpha val="40000"/>
+              </a:prstClr>
+            </a:outerShdw>
+          </a:effectLst>
+        </p:spPr>
+        <p:style>
+          <a:lnRef idx="2">
+            <a:schemeClr val="accent1">
+              <a:shade val="50000"/>
+            </a:schemeClr>
+          </a:lnRef>
+          <a:fillRef idx="1">
+            <a:schemeClr val="accent1"/>
+          </a:fillRef>
+          <a:effectRef idx="0">
+            <a:schemeClr val="accent1"/>
+          </a:effectRef>
+          <a:fontRef idx="minor">
+            <a:schemeClr val="lt1"/>
+          </a:fontRef>
+        </p:style>
+        <p:txBody>
+          <a:bodyPr rtlCol="0" anchor="ctr"/>
+          <a:lstStyle/>
+          <a:p>
+            <a:pPr algn="ctr" defTabSz="914377" eaLnBrk="1" fontAlgn="auto" hangingPunct="1">
+              <a:spcBef>
+                <a:spcPts val="0"/>
+              </a:spcBef>
+              <a:spcAft>
+                <a:spcPts val="0"/>
+              </a:spcAft>
+            </a:pPr>
+            <a:r>
+              <a:rPr lang="en-US" sz="900" b="1" dirty="0">
+                <a:solidFill>
+                  <a:prstClr val="white"/>
+                </a:solidFill>
+                <a:latin typeface="Arial"/>
+              </a:rPr>
+              <a:t>Decision Center</a:t>
+            </a:r>
+          </a:p>
+        </p:txBody>
+      </p:sp>
+      <p:sp>
+        <p:nvSpPr>
+          <p:cNvPr id="26" name="Rounded Rectangle 25">
+            <a:extLst>
+              <a:ext uri="{FF2B5EF4-FFF2-40B4-BE49-F238E27FC236}">
+                <a16:creationId xmlns:a16="http://schemas.microsoft.com/office/drawing/2014/main" id="{4AFD2967-3142-5C43-BF86-9F28F59D8F99}"/>
+              </a:ext>
+            </a:extLst>
+          </p:cNvPr>
+          <p:cNvSpPr/>
+          <p:nvPr/>
+        </p:nvSpPr>
+        <p:spPr>
+          <a:xfrm>
+            <a:off x="1130343" y="3585504"/>
+            <a:ext cx="1161059" cy="660401"/>
+          </a:xfrm>
+          <a:prstGeom prst="roundRect">
+            <a:avLst>
+              <a:gd name="adj" fmla="val 7576"/>
+            </a:avLst>
+          </a:prstGeom>
+          <a:solidFill>
+            <a:srgbClr val="92D050"/>
+          </a:solidFill>
+          <a:ln>
+            <a:noFill/>
+          </a:ln>
+          <a:effectLst>
+            <a:outerShdw blurRad="50800" dist="38100" dir="5400000" algn="t" rotWithShape="0">
+              <a:prstClr val="black">
+                <a:alpha val="40000"/>
+              </a:prstClr>
+            </a:outerShdw>
+          </a:effectLst>
+        </p:spPr>
+        <p:style>
+          <a:lnRef idx="2">
+            <a:schemeClr val="accent1">
+              <a:shade val="50000"/>
+            </a:schemeClr>
+          </a:lnRef>
+          <a:fillRef idx="1">
+            <a:schemeClr val="accent1"/>
+          </a:fillRef>
+          <a:effectRef idx="0">
+            <a:schemeClr val="accent1"/>
+          </a:effectRef>
+          <a:fontRef idx="minor">
+            <a:schemeClr val="lt1"/>
+          </a:fontRef>
+        </p:style>
+        <p:txBody>
+          <a:bodyPr rtlCol="0" anchor="ctr"/>
+          <a:lstStyle/>
+          <a:p>
+            <a:pPr algn="ctr" defTabSz="914377" eaLnBrk="1" fontAlgn="auto" hangingPunct="1">
+              <a:spcBef>
+                <a:spcPts val="0"/>
+              </a:spcBef>
+              <a:spcAft>
+                <a:spcPts val="0"/>
+              </a:spcAft>
+            </a:pPr>
+            <a:r>
+              <a:rPr lang="en-US" sz="900" b="1" dirty="0">
+                <a:solidFill>
+                  <a:srgbClr val="244311"/>
+                </a:solidFill>
+                <a:latin typeface="Arial"/>
+              </a:rPr>
+              <a:t>Validate Invoice Project</a:t>
+            </a:r>
+          </a:p>
+        </p:txBody>
+      </p:sp>
+      <p:sp>
+        <p:nvSpPr>
+          <p:cNvPr id="27" name="AutoShape 4">
+            <a:extLst>
+              <a:ext uri="{FF2B5EF4-FFF2-40B4-BE49-F238E27FC236}">
+                <a16:creationId xmlns:a16="http://schemas.microsoft.com/office/drawing/2014/main" id="{F74E4F81-9735-4142-B0D6-CBE3A7B2EC59}"/>
+              </a:ext>
+            </a:extLst>
+          </p:cNvPr>
+          <p:cNvSpPr>
+            <a:spLocks noChangeArrowheads="1"/>
+          </p:cNvSpPr>
+          <p:nvPr/>
+        </p:nvSpPr>
+        <p:spPr bwMode="auto">
+          <a:xfrm>
+            <a:off x="940042" y="2207832"/>
+            <a:ext cx="3482795" cy="1204471"/>
+          </a:xfrm>
+          <a:prstGeom prst="roundRect">
+            <a:avLst>
+              <a:gd name="adj" fmla="val 7117"/>
+            </a:avLst>
+          </a:prstGeom>
+          <a:noFill/>
+          <a:ln w="12700">
+            <a:solidFill>
+              <a:schemeClr val="tx2">
+                <a:lumMod val="50000"/>
+              </a:schemeClr>
+            </a:solidFill>
+            <a:prstDash val="dash"/>
+            <a:round/>
+            <a:headEnd/>
+            <a:tailEnd/>
+          </a:ln>
+        </p:spPr>
+        <p:txBody>
+          <a:bodyPr lIns="0" tIns="0" rIns="0" bIns="0" anchor="b" anchorCtr="1"/>
+          <a:lstStyle/>
+          <a:p>
+            <a:pPr algn="ctr" defTabSz="914377" eaLnBrk="1" fontAlgn="auto" hangingPunct="1">
+              <a:spcBef>
+                <a:spcPts val="0"/>
+              </a:spcBef>
+              <a:spcAft>
+                <a:spcPts val="0"/>
+              </a:spcAft>
+              <a:defRPr/>
+            </a:pPr>
+            <a:r>
+              <a:rPr lang="en-US" sz="1200" dirty="0">
+                <a:solidFill>
+                  <a:prstClr val="black"/>
+                </a:solidFill>
+                <a:latin typeface="Arial"/>
+                <a:cs typeface="+mn-cs"/>
+              </a:rPr>
+              <a:t>Operational Decision Manager - Prod</a:t>
+            </a:r>
+          </a:p>
+        </p:txBody>
+      </p:sp>
+      <p:sp>
+        <p:nvSpPr>
+          <p:cNvPr id="28" name="Rounded Rectangle 27">
+            <a:extLst>
+              <a:ext uri="{FF2B5EF4-FFF2-40B4-BE49-F238E27FC236}">
+                <a16:creationId xmlns:a16="http://schemas.microsoft.com/office/drawing/2014/main" id="{E64BC727-8975-3743-B1AC-52F8347A3FA1}"/>
+              </a:ext>
+            </a:extLst>
+          </p:cNvPr>
+          <p:cNvSpPr/>
+          <p:nvPr/>
+        </p:nvSpPr>
+        <p:spPr>
+          <a:xfrm>
+            <a:off x="2512077" y="2431730"/>
+            <a:ext cx="1814171" cy="385810"/>
+          </a:xfrm>
+          <a:prstGeom prst="roundRect">
+            <a:avLst>
+              <a:gd name="adj" fmla="val 7576"/>
+            </a:avLst>
+          </a:prstGeom>
+          <a:solidFill>
+            <a:schemeClr val="tx2">
+              <a:lumMod val="75000"/>
+            </a:schemeClr>
+          </a:solidFill>
+          <a:ln>
+            <a:noFill/>
+          </a:ln>
+          <a:effectLst>
+            <a:outerShdw blurRad="50800" dist="38100" dir="5400000" algn="t" rotWithShape="0">
+              <a:prstClr val="black">
+                <a:alpha val="40000"/>
+              </a:prstClr>
+            </a:outerShdw>
+          </a:effectLst>
+        </p:spPr>
+        <p:style>
+          <a:lnRef idx="2">
+            <a:schemeClr val="accent1">
+              <a:shade val="50000"/>
+            </a:schemeClr>
+          </a:lnRef>
+          <a:fillRef idx="1">
+            <a:schemeClr val="accent1"/>
+          </a:fillRef>
+          <a:effectRef idx="0">
+            <a:schemeClr val="accent1"/>
+          </a:effectRef>
+          <a:fontRef idx="minor">
+            <a:schemeClr val="lt1"/>
+          </a:fontRef>
+        </p:style>
+        <p:txBody>
+          <a:bodyPr rtlCol="0" anchor="ctr"/>
+          <a:lstStyle/>
+          <a:p>
+            <a:pPr algn="ctr" defTabSz="914377" eaLnBrk="1" fontAlgn="auto" hangingPunct="1">
+              <a:spcBef>
+                <a:spcPts val="0"/>
+              </a:spcBef>
+              <a:spcAft>
+                <a:spcPts val="0"/>
+              </a:spcAft>
+            </a:pPr>
+            <a:r>
+              <a:rPr lang="en-US" sz="900" b="1" dirty="0">
+                <a:solidFill>
+                  <a:prstClr val="white"/>
+                </a:solidFill>
+                <a:latin typeface="Arial"/>
+              </a:rPr>
+              <a:t>Decision Server</a:t>
+            </a:r>
+          </a:p>
+        </p:txBody>
+      </p:sp>
+      <p:sp>
+        <p:nvSpPr>
+          <p:cNvPr id="30" name="Rounded Rectangle 29">
+            <a:extLst>
+              <a:ext uri="{FF2B5EF4-FFF2-40B4-BE49-F238E27FC236}">
+                <a16:creationId xmlns:a16="http://schemas.microsoft.com/office/drawing/2014/main" id="{47C9DEA0-7E0B-5749-BAD8-3601D571C7A7}"/>
+              </a:ext>
+            </a:extLst>
+          </p:cNvPr>
+          <p:cNvSpPr/>
+          <p:nvPr/>
+        </p:nvSpPr>
+        <p:spPr>
+          <a:xfrm>
+            <a:off x="1130343" y="2294435"/>
+            <a:ext cx="1161059" cy="660401"/>
+          </a:xfrm>
+          <a:prstGeom prst="roundRect">
+            <a:avLst>
+              <a:gd name="adj" fmla="val 7576"/>
+            </a:avLst>
+          </a:prstGeom>
+          <a:solidFill>
+            <a:srgbClr val="92D050"/>
+          </a:solidFill>
+          <a:ln>
+            <a:noFill/>
+          </a:ln>
+          <a:effectLst>
+            <a:outerShdw blurRad="50800" dist="38100" dir="5400000" algn="t" rotWithShape="0">
+              <a:prstClr val="black">
+                <a:alpha val="40000"/>
+              </a:prstClr>
+            </a:outerShdw>
+          </a:effectLst>
+        </p:spPr>
+        <p:style>
+          <a:lnRef idx="2">
+            <a:schemeClr val="accent1">
+              <a:shade val="50000"/>
+            </a:schemeClr>
+          </a:lnRef>
+          <a:fillRef idx="1">
+            <a:schemeClr val="accent1"/>
+          </a:fillRef>
+          <a:effectRef idx="0">
+            <a:schemeClr val="accent1"/>
+          </a:effectRef>
+          <a:fontRef idx="minor">
+            <a:schemeClr val="lt1"/>
+          </a:fontRef>
+        </p:style>
+        <p:txBody>
+          <a:bodyPr rtlCol="0" anchor="ctr"/>
+          <a:lstStyle/>
+          <a:p>
+            <a:pPr algn="ctr" defTabSz="914377" eaLnBrk="1" fontAlgn="auto" hangingPunct="1">
+              <a:spcBef>
+                <a:spcPts val="0"/>
+              </a:spcBef>
+              <a:spcAft>
+                <a:spcPts val="0"/>
+              </a:spcAft>
+            </a:pPr>
+            <a:r>
+              <a:rPr lang="en-US" sz="900" b="1" dirty="0">
+                <a:solidFill>
+                  <a:srgbClr val="244311"/>
+                </a:solidFill>
+                <a:latin typeface="Arial"/>
+              </a:rPr>
+              <a:t>Validate Invoice Decision Service</a:t>
+            </a:r>
+          </a:p>
+        </p:txBody>
+      </p:sp>
+      <p:sp>
+        <p:nvSpPr>
+          <p:cNvPr id="8" name="AutoShape 4">
+            <a:extLst>
+              <a:ext uri="{FF2B5EF4-FFF2-40B4-BE49-F238E27FC236}">
+                <a16:creationId xmlns:a16="http://schemas.microsoft.com/office/drawing/2014/main" id="{59890A0C-8D27-7C44-9F8E-3AA14483DD17}"/>
+              </a:ext>
+            </a:extLst>
+          </p:cNvPr>
+          <p:cNvSpPr>
+            <a:spLocks noChangeArrowheads="1"/>
+          </p:cNvSpPr>
+          <p:nvPr/>
+        </p:nvSpPr>
+        <p:spPr bwMode="auto">
+          <a:xfrm>
+            <a:off x="940042" y="4754208"/>
+            <a:ext cx="10082229" cy="347646"/>
+          </a:xfrm>
+          <a:prstGeom prst="roundRect">
+            <a:avLst>
+              <a:gd name="adj" fmla="val 7117"/>
+            </a:avLst>
+          </a:prstGeom>
+          <a:solidFill>
+            <a:schemeClr val="tx1">
+              <a:lumMod val="25000"/>
+              <a:lumOff val="75000"/>
+            </a:schemeClr>
+          </a:solidFill>
+          <a:ln w="12700">
+            <a:noFill/>
+            <a:prstDash val="solid"/>
+            <a:round/>
+            <a:headEnd/>
+            <a:tailEnd/>
+          </a:ln>
+        </p:spPr>
+        <p:txBody>
+          <a:bodyPr lIns="0" tIns="0" rIns="0" bIns="0" anchor="b" anchorCtr="1"/>
+          <a:lstStyle/>
+          <a:p>
+            <a:pPr algn="ctr" defTabSz="914377" eaLnBrk="1" fontAlgn="auto" hangingPunct="1">
+              <a:spcBef>
+                <a:spcPts val="0"/>
+              </a:spcBef>
+              <a:spcAft>
+                <a:spcPts val="0"/>
+              </a:spcAft>
+              <a:defRPr/>
+            </a:pPr>
+            <a:r>
+              <a:rPr lang="en-US" sz="1200" dirty="0">
+                <a:solidFill>
+                  <a:prstClr val="black"/>
+                </a:solidFill>
+                <a:latin typeface="Arial"/>
+              </a:rPr>
+              <a:t>IBM Cloud Pak</a:t>
+            </a:r>
+            <a:r>
+              <a:rPr lang="en-US" sz="1200" dirty="0"/>
+              <a:t>®</a:t>
+            </a:r>
+            <a:r>
+              <a:rPr lang="en-US" sz="1200" dirty="0">
+                <a:solidFill>
+                  <a:prstClr val="black"/>
+                </a:solidFill>
+                <a:latin typeface="Arial"/>
+              </a:rPr>
+              <a:t> for Automation</a:t>
+            </a:r>
+            <a:endParaRPr lang="en-US" sz="1200" dirty="0">
+              <a:solidFill>
+                <a:prstClr val="black"/>
+              </a:solidFill>
+              <a:latin typeface="Arial"/>
+              <a:cs typeface="+mn-cs"/>
+            </a:endParaRPr>
+          </a:p>
+        </p:txBody>
+      </p:sp>
+      <p:sp>
+        <p:nvSpPr>
+          <p:cNvPr id="33" name="AutoShape 4">
+            <a:extLst>
+              <a:ext uri="{FF2B5EF4-FFF2-40B4-BE49-F238E27FC236}">
+                <a16:creationId xmlns:a16="http://schemas.microsoft.com/office/drawing/2014/main" id="{FE7DCDAD-00CD-B345-9299-DB512EC58E45}"/>
+              </a:ext>
+            </a:extLst>
+          </p:cNvPr>
+          <p:cNvSpPr>
+            <a:spLocks noChangeArrowheads="1"/>
+          </p:cNvSpPr>
+          <p:nvPr/>
+        </p:nvSpPr>
+        <p:spPr bwMode="auto">
+          <a:xfrm>
+            <a:off x="7027489" y="1952964"/>
+            <a:ext cx="1899893" cy="2750408"/>
+          </a:xfrm>
+          <a:prstGeom prst="roundRect">
+            <a:avLst>
+              <a:gd name="adj" fmla="val 7117"/>
+            </a:avLst>
+          </a:prstGeom>
+          <a:noFill/>
+          <a:ln w="12700">
+            <a:solidFill>
+              <a:schemeClr val="tx2">
+                <a:lumMod val="50000"/>
+              </a:schemeClr>
+            </a:solidFill>
+            <a:prstDash val="dash"/>
+            <a:round/>
+            <a:headEnd/>
+            <a:tailEnd/>
+          </a:ln>
+        </p:spPr>
+        <p:txBody>
+          <a:bodyPr lIns="0" tIns="0" rIns="0" bIns="0" anchor="b" anchorCtr="1"/>
+          <a:lstStyle/>
+          <a:p>
+            <a:pPr algn="ctr" defTabSz="914377" eaLnBrk="1" fontAlgn="auto" hangingPunct="1">
+              <a:spcBef>
+                <a:spcPts val="0"/>
+              </a:spcBef>
+              <a:spcAft>
+                <a:spcPts val="0"/>
+              </a:spcAft>
+              <a:defRPr/>
+            </a:pPr>
+            <a:r>
+              <a:rPr lang="en-US" sz="1200" dirty="0">
+                <a:solidFill>
+                  <a:prstClr val="black"/>
+                </a:solidFill>
+                <a:latin typeface="Arial"/>
+                <a:cs typeface="+mn-cs"/>
+              </a:rPr>
+              <a:t>Business Automation Workflow - Dev</a:t>
+            </a:r>
+          </a:p>
+        </p:txBody>
+      </p:sp>
+      <p:sp>
+        <p:nvSpPr>
+          <p:cNvPr id="34" name="Rounded Rectangle 33">
+            <a:extLst>
+              <a:ext uri="{FF2B5EF4-FFF2-40B4-BE49-F238E27FC236}">
+                <a16:creationId xmlns:a16="http://schemas.microsoft.com/office/drawing/2014/main" id="{95EE4E64-394E-7148-860D-328634CA8257}"/>
+              </a:ext>
+            </a:extLst>
+          </p:cNvPr>
+          <p:cNvSpPr/>
+          <p:nvPr/>
+        </p:nvSpPr>
+        <p:spPr>
+          <a:xfrm>
+            <a:off x="7064848" y="3355375"/>
+            <a:ext cx="1814171" cy="385810"/>
+          </a:xfrm>
+          <a:prstGeom prst="roundRect">
+            <a:avLst>
+              <a:gd name="adj" fmla="val 7576"/>
+            </a:avLst>
+          </a:prstGeom>
+          <a:solidFill>
+            <a:schemeClr val="tx2">
+              <a:lumMod val="75000"/>
+            </a:schemeClr>
+          </a:solidFill>
+          <a:ln>
+            <a:noFill/>
+          </a:ln>
+          <a:effectLst>
+            <a:outerShdw blurRad="50800" dist="38100" dir="5400000" algn="t" rotWithShape="0">
+              <a:prstClr val="black">
+                <a:alpha val="40000"/>
+              </a:prstClr>
+            </a:outerShdw>
+          </a:effectLst>
+        </p:spPr>
+        <p:style>
+          <a:lnRef idx="2">
+            <a:schemeClr val="accent1">
+              <a:shade val="50000"/>
+            </a:schemeClr>
+          </a:lnRef>
+          <a:fillRef idx="1">
+            <a:schemeClr val="accent1"/>
+          </a:fillRef>
+          <a:effectRef idx="0">
+            <a:schemeClr val="accent1"/>
+          </a:effectRef>
+          <a:fontRef idx="minor">
+            <a:schemeClr val="lt1"/>
+          </a:fontRef>
+        </p:style>
+        <p:txBody>
+          <a:bodyPr rtlCol="0" anchor="ctr"/>
+          <a:lstStyle/>
+          <a:p>
+            <a:pPr algn="ctr" defTabSz="914377" eaLnBrk="1" fontAlgn="auto" hangingPunct="1">
+              <a:spcBef>
+                <a:spcPts val="0"/>
+              </a:spcBef>
+              <a:spcAft>
+                <a:spcPts val="0"/>
+              </a:spcAft>
+            </a:pPr>
+            <a:r>
+              <a:rPr lang="en-US" sz="900" b="1" dirty="0">
+                <a:solidFill>
+                  <a:prstClr val="white"/>
+                </a:solidFill>
+                <a:latin typeface="Arial"/>
+              </a:rPr>
+              <a:t>Process Designer</a:t>
+            </a:r>
+          </a:p>
+        </p:txBody>
+      </p:sp>
+      <p:sp>
+        <p:nvSpPr>
+          <p:cNvPr id="35" name="Rounded Rectangle 34">
+            <a:extLst>
+              <a:ext uri="{FF2B5EF4-FFF2-40B4-BE49-F238E27FC236}">
+                <a16:creationId xmlns:a16="http://schemas.microsoft.com/office/drawing/2014/main" id="{213A41FE-6EFD-8E47-B10F-FA0FFEC6125E}"/>
+              </a:ext>
+            </a:extLst>
+          </p:cNvPr>
+          <p:cNvSpPr/>
+          <p:nvPr/>
+        </p:nvSpPr>
+        <p:spPr>
+          <a:xfrm>
+            <a:off x="7064848" y="3860908"/>
+            <a:ext cx="1814171" cy="385810"/>
+          </a:xfrm>
+          <a:prstGeom prst="roundRect">
+            <a:avLst>
+              <a:gd name="adj" fmla="val 7576"/>
+            </a:avLst>
+          </a:prstGeom>
+          <a:solidFill>
+            <a:schemeClr val="tx2">
+              <a:lumMod val="75000"/>
+            </a:schemeClr>
+          </a:solidFill>
+          <a:ln>
+            <a:noFill/>
+          </a:ln>
+          <a:effectLst>
+            <a:outerShdw blurRad="50800" dist="38100" dir="5400000" algn="t" rotWithShape="0">
+              <a:prstClr val="black">
+                <a:alpha val="40000"/>
+              </a:prstClr>
+            </a:outerShdw>
+          </a:effectLst>
+        </p:spPr>
+        <p:style>
+          <a:lnRef idx="2">
+            <a:schemeClr val="accent1">
+              <a:shade val="50000"/>
+            </a:schemeClr>
+          </a:lnRef>
+          <a:fillRef idx="1">
+            <a:schemeClr val="accent1"/>
+          </a:fillRef>
+          <a:effectRef idx="0">
+            <a:schemeClr val="accent1"/>
+          </a:effectRef>
+          <a:fontRef idx="minor">
+            <a:schemeClr val="lt1"/>
+          </a:fontRef>
+        </p:style>
+        <p:txBody>
+          <a:bodyPr rtlCol="0" anchor="ctr"/>
+          <a:lstStyle/>
+          <a:p>
+            <a:pPr algn="ctr" defTabSz="914377" eaLnBrk="1" fontAlgn="auto" hangingPunct="1">
+              <a:spcBef>
+                <a:spcPts val="0"/>
+              </a:spcBef>
+              <a:spcAft>
+                <a:spcPts val="0"/>
+              </a:spcAft>
+            </a:pPr>
+            <a:r>
+              <a:rPr lang="en-US" sz="900" b="1" dirty="0">
+                <a:solidFill>
+                  <a:prstClr val="white"/>
+                </a:solidFill>
+                <a:latin typeface="Arial"/>
+              </a:rPr>
+              <a:t>Workflow Center</a:t>
+            </a:r>
+          </a:p>
+        </p:txBody>
+      </p:sp>
+      <p:sp>
+        <p:nvSpPr>
+          <p:cNvPr id="37" name="Rounded Rectangle 36">
+            <a:extLst>
+              <a:ext uri="{FF2B5EF4-FFF2-40B4-BE49-F238E27FC236}">
+                <a16:creationId xmlns:a16="http://schemas.microsoft.com/office/drawing/2014/main" id="{CC204309-B57C-FD48-9980-482A7BF09888}"/>
+              </a:ext>
+            </a:extLst>
+          </p:cNvPr>
+          <p:cNvSpPr/>
+          <p:nvPr/>
+        </p:nvSpPr>
+        <p:spPr>
+          <a:xfrm>
+            <a:off x="9160506" y="3355280"/>
+            <a:ext cx="1814171" cy="385810"/>
+          </a:xfrm>
+          <a:prstGeom prst="roundRect">
+            <a:avLst>
+              <a:gd name="adj" fmla="val 7576"/>
+            </a:avLst>
+          </a:prstGeom>
+          <a:solidFill>
+            <a:schemeClr val="tx2">
+              <a:lumMod val="75000"/>
+            </a:schemeClr>
+          </a:solidFill>
+          <a:ln>
+            <a:noFill/>
+          </a:ln>
+          <a:effectLst>
+            <a:outerShdw blurRad="50800" dist="38100" dir="5400000" algn="t" rotWithShape="0">
+              <a:prstClr val="black">
+                <a:alpha val="40000"/>
+              </a:prstClr>
+            </a:outerShdw>
+          </a:effectLst>
+        </p:spPr>
+        <p:style>
+          <a:lnRef idx="2">
+            <a:schemeClr val="accent1">
+              <a:shade val="50000"/>
+            </a:schemeClr>
+          </a:lnRef>
+          <a:fillRef idx="1">
+            <a:schemeClr val="accent1"/>
+          </a:fillRef>
+          <a:effectRef idx="0">
+            <a:schemeClr val="accent1"/>
+          </a:effectRef>
+          <a:fontRef idx="minor">
+            <a:schemeClr val="lt1"/>
+          </a:fontRef>
+        </p:style>
+        <p:txBody>
+          <a:bodyPr rtlCol="0" anchor="ctr"/>
+          <a:lstStyle/>
+          <a:p>
+            <a:pPr algn="ctr" defTabSz="914377" eaLnBrk="1" fontAlgn="auto" hangingPunct="1">
+              <a:spcBef>
+                <a:spcPts val="0"/>
+              </a:spcBef>
+              <a:spcAft>
+                <a:spcPts val="0"/>
+              </a:spcAft>
+            </a:pPr>
+            <a:r>
+              <a:rPr lang="en-US" sz="900" b="1" dirty="0">
+                <a:solidFill>
+                  <a:prstClr val="white"/>
+                </a:solidFill>
+                <a:latin typeface="Arial"/>
+              </a:rPr>
+              <a:t>Process Portal</a:t>
+            </a:r>
+          </a:p>
+        </p:txBody>
+      </p:sp>
+      <p:sp>
+        <p:nvSpPr>
+          <p:cNvPr id="38" name="Rounded Rectangle 37">
+            <a:extLst>
+              <a:ext uri="{FF2B5EF4-FFF2-40B4-BE49-F238E27FC236}">
+                <a16:creationId xmlns:a16="http://schemas.microsoft.com/office/drawing/2014/main" id="{B8880B7F-C5B0-B54A-AA58-272F7D65C5F5}"/>
+              </a:ext>
+            </a:extLst>
+          </p:cNvPr>
+          <p:cNvSpPr/>
+          <p:nvPr/>
+        </p:nvSpPr>
+        <p:spPr>
+          <a:xfrm>
+            <a:off x="9487061" y="2076151"/>
+            <a:ext cx="1161059" cy="660401"/>
+          </a:xfrm>
+          <a:prstGeom prst="roundRect">
+            <a:avLst>
+              <a:gd name="adj" fmla="val 7576"/>
+            </a:avLst>
+          </a:prstGeom>
+          <a:solidFill>
+            <a:srgbClr val="92D050"/>
+          </a:solidFill>
+          <a:ln>
+            <a:noFill/>
+          </a:ln>
+          <a:effectLst>
+            <a:outerShdw blurRad="50800" dist="38100" dir="5400000" algn="t" rotWithShape="0">
+              <a:prstClr val="black">
+                <a:alpha val="40000"/>
+              </a:prstClr>
+            </a:outerShdw>
+          </a:effectLst>
+        </p:spPr>
+        <p:style>
+          <a:lnRef idx="2">
+            <a:schemeClr val="accent1">
+              <a:shade val="50000"/>
+            </a:schemeClr>
+          </a:lnRef>
+          <a:fillRef idx="1">
+            <a:schemeClr val="accent1"/>
+          </a:fillRef>
+          <a:effectRef idx="0">
+            <a:schemeClr val="accent1"/>
+          </a:effectRef>
+          <a:fontRef idx="minor">
+            <a:schemeClr val="lt1"/>
+          </a:fontRef>
+        </p:style>
+        <p:txBody>
+          <a:bodyPr rtlCol="0" anchor="ctr"/>
+          <a:lstStyle/>
+          <a:p>
+            <a:pPr algn="ctr" defTabSz="914377" eaLnBrk="1" fontAlgn="auto" hangingPunct="1">
+              <a:spcBef>
+                <a:spcPts val="0"/>
+              </a:spcBef>
+              <a:spcAft>
+                <a:spcPts val="0"/>
+              </a:spcAft>
+            </a:pPr>
+            <a:r>
+              <a:rPr lang="en-US" sz="900" b="1">
+                <a:solidFill>
+                  <a:srgbClr val="244311"/>
+                </a:solidFill>
+              </a:rPr>
+              <a:t>Accounts Payable Process </a:t>
+            </a:r>
+            <a:r>
+              <a:rPr lang="en-US" sz="900" b="1" dirty="0">
+                <a:solidFill>
+                  <a:srgbClr val="244311"/>
+                </a:solidFill>
+                <a:latin typeface="Arial"/>
+              </a:rPr>
+              <a:t>App</a:t>
+            </a:r>
+          </a:p>
+        </p:txBody>
+      </p:sp>
+    </p:spTree>
+    <p:extLst>
+      <p:ext uri="{BB962C8B-B14F-4D97-AF65-F5344CB8AC3E}">
+        <p14:creationId xmlns:p14="http://schemas.microsoft.com/office/powerpoint/2010/main" val="669526388"/>
+      </p:ext>
+    </p:extLst>
+  </p:cSld>
+  <p:clrMapOvr>
+    <a:masterClrMapping/>
+  </p:clrMapOvr>
+</p:sld>
+</file>
+
+<file path=ppt/slides/slide4.xml><?xml version="1.0" encoding="utf-8"?>
+<p:sld xmlns:a="http://schemas.openxmlformats.org/drawingml/2006/main" xmlns:r="http://schemas.openxmlformats.org/officeDocument/2006/relationships" xmlns:p="http://schemas.openxmlformats.org/presentationml/2006/main">
+  <p:cSld>
+    <p:spTree>
+      <p:nvGrpSpPr>
+        <p:cNvPr id="1" name=""/>
+        <p:cNvGrpSpPr/>
+        <p:nvPr/>
+      </p:nvGrpSpPr>
+      <p:grpSpPr>
+        <a:xfrm>
+          <a:off x="0" y="0"/>
+          <a:ext cx="0" cy="0"/>
+          <a:chOff x="0" y="0"/>
+          <a:chExt cx="0" cy="0"/>
+        </a:xfrm>
+      </p:grpSpPr>
+      <p:sp>
+        <p:nvSpPr>
           <p:cNvPr id="19" name="Rounded Rectangle 18">
             <a:extLst>
               <a:ext uri="{FF2B5EF4-FFF2-40B4-BE49-F238E27FC236}">
@@ -7658,7 +9605,7 @@
                 </a:solidFill>
               </a:rPr>
               <a:pPr/>
-              <a:t>3</a:t>
+              <a:t>4</a:t>
             </a:fld>
             <a:endParaRPr lang="en-US">
               <a:solidFill>
@@ -10488,7 +12435,7 @@
 </p:sld>
 </file>
 
-<file path=ppt/slides/slide4.xml><?xml version="1.0" encoding="utf-8"?>
+<file path=ppt/slides/slide5.xml><?xml version="1.0" encoding="utf-8"?>
 <p:sld xmlns:a="http://schemas.openxmlformats.org/drawingml/2006/main" xmlns:r="http://schemas.openxmlformats.org/officeDocument/2006/relationships" xmlns:p="http://schemas.openxmlformats.org/presentationml/2006/main">
   <p:cSld>
     <p:spTree>
@@ -11488,7 +13435,7 @@
                 </a:solidFill>
               </a:rPr>
               <a:pPr/>
-              <a:t>4</a:t>
+              <a:t>5</a:t>
             </a:fld>
             <a:endParaRPr lang="en-US">
               <a:solidFill>
@@ -12341,127 +14288,6 @@
 </p:sld>
 </file>
 
-<file path=ppt/slides/slide5.xml><?xml version="1.0" encoding="utf-8"?>
-<p:sld xmlns:a="http://schemas.openxmlformats.org/drawingml/2006/main" xmlns:r="http://schemas.openxmlformats.org/officeDocument/2006/relationships" xmlns:p="http://schemas.openxmlformats.org/presentationml/2006/main">
-  <p:cSld>
-    <p:spTree>
-      <p:nvGrpSpPr>
-        <p:cNvPr id="1" name=""/>
-        <p:cNvGrpSpPr/>
-        <p:nvPr/>
-      </p:nvGrpSpPr>
-      <p:grpSpPr>
-        <a:xfrm>
-          <a:off x="0" y="0"/>
-          <a:ext cx="0" cy="0"/>
-          <a:chOff x="0" y="0"/>
-          <a:chExt cx="0" cy="0"/>
-        </a:xfrm>
-      </p:grpSpPr>
-      <p:sp>
-        <p:nvSpPr>
-          <p:cNvPr id="2" name="Slide Number Placeholder 1">
-            <a:extLst>
-              <a:ext uri="{FF2B5EF4-FFF2-40B4-BE49-F238E27FC236}">
-                <a16:creationId xmlns:a16="http://schemas.microsoft.com/office/drawing/2014/main" id="{B26EFD7A-54C0-2342-913C-772AA467A7CE}"/>
-              </a:ext>
-            </a:extLst>
-          </p:cNvPr>
-          <p:cNvSpPr>
-            <a:spLocks noGrp="1"/>
-          </p:cNvSpPr>
-          <p:nvPr>
-            <p:ph type="sldNum" sz="quarter" idx="12"/>
-          </p:nvPr>
-        </p:nvSpPr>
-        <p:spPr/>
-        <p:txBody>
-          <a:bodyPr/>
-          <a:lstStyle/>
-          <a:p>
-            <a:fld id="{E9549862-13E2-C34D-815E-8545BD36FC59}" type="slidenum">
-              <a:rPr lang="en-US" smtClean="0">
-                <a:solidFill>
-                  <a:srgbClr val="6D7777"/>
-                </a:solidFill>
-              </a:rPr>
-              <a:pPr/>
-              <a:t>5</a:t>
-            </a:fld>
-            <a:endParaRPr lang="en-US">
-              <a:solidFill>
-                <a:srgbClr val="6D7777"/>
-              </a:solidFill>
-            </a:endParaRPr>
-          </a:p>
-        </p:txBody>
-      </p:sp>
-      <p:sp>
-        <p:nvSpPr>
-          <p:cNvPr id="3" name="Title 2">
-            <a:extLst>
-              <a:ext uri="{FF2B5EF4-FFF2-40B4-BE49-F238E27FC236}">
-                <a16:creationId xmlns:a16="http://schemas.microsoft.com/office/drawing/2014/main" id="{AB877B22-01CF-4E42-93A6-DFAB54B54A39}"/>
-              </a:ext>
-            </a:extLst>
-          </p:cNvPr>
-          <p:cNvSpPr>
-            <a:spLocks noGrp="1"/>
-          </p:cNvSpPr>
-          <p:nvPr>
-            <p:ph type="ctrTitle"/>
-          </p:nvPr>
-        </p:nvSpPr>
-        <p:spPr/>
-        <p:txBody>
-          <a:bodyPr/>
-          <a:lstStyle/>
-          <a:p>
-            <a:r>
-              <a:rPr lang="en-US" dirty="0"/>
-              <a:t>Older Versions</a:t>
-            </a:r>
-          </a:p>
-        </p:txBody>
-      </p:sp>
-      <p:sp>
-        <p:nvSpPr>
-          <p:cNvPr id="4" name="Subtitle 3">
-            <a:extLst>
-              <a:ext uri="{FF2B5EF4-FFF2-40B4-BE49-F238E27FC236}">
-                <a16:creationId xmlns:a16="http://schemas.microsoft.com/office/drawing/2014/main" id="{6ADCDA09-464A-A547-8B2D-6FAAD0C85EE3}"/>
-              </a:ext>
-            </a:extLst>
-          </p:cNvPr>
-          <p:cNvSpPr>
-            <a:spLocks noGrp="1"/>
-          </p:cNvSpPr>
-          <p:nvPr>
-            <p:ph type="subTitle" idx="1"/>
-          </p:nvPr>
-        </p:nvSpPr>
-        <p:spPr/>
-        <p:txBody>
-          <a:bodyPr/>
-          <a:lstStyle/>
-          <a:p>
-            <a:endParaRPr lang="en-US"/>
-          </a:p>
-        </p:txBody>
-      </p:sp>
-    </p:spTree>
-    <p:extLst>
-      <p:ext uri="{BB962C8B-B14F-4D97-AF65-F5344CB8AC3E}">
-        <p14:creationId xmlns:p14="http://schemas.microsoft.com/office/powerpoint/2010/main" val="3485633649"/>
-      </p:ext>
-    </p:extLst>
-  </p:cSld>
-  <p:clrMapOvr>
-    <a:masterClrMapping/>
-  </p:clrMapOvr>
-</p:sld>
-</file>
-
 <file path=ppt/slides/slide6.xml><?xml version="1.0" encoding="utf-8"?>
 <p:sld xmlns:a="http://schemas.openxmlformats.org/drawingml/2006/main" xmlns:r="http://schemas.openxmlformats.org/officeDocument/2006/relationships" xmlns:p="http://schemas.openxmlformats.org/presentationml/2006/main">
   <p:cSld>
@@ -12481,6 +14307,127 @@
       </p:grpSpPr>
       <p:sp>
         <p:nvSpPr>
+          <p:cNvPr id="2" name="Slide Number Placeholder 1">
+            <a:extLst>
+              <a:ext uri="{FF2B5EF4-FFF2-40B4-BE49-F238E27FC236}">
+                <a16:creationId xmlns:a16="http://schemas.microsoft.com/office/drawing/2014/main" id="{B26EFD7A-54C0-2342-913C-772AA467A7CE}"/>
+              </a:ext>
+            </a:extLst>
+          </p:cNvPr>
+          <p:cNvSpPr>
+            <a:spLocks noGrp="1"/>
+          </p:cNvSpPr>
+          <p:nvPr>
+            <p:ph type="sldNum" sz="quarter" idx="12"/>
+          </p:nvPr>
+        </p:nvSpPr>
+        <p:spPr/>
+        <p:txBody>
+          <a:bodyPr/>
+          <a:lstStyle/>
+          <a:p>
+            <a:fld id="{E9549862-13E2-C34D-815E-8545BD36FC59}" type="slidenum">
+              <a:rPr lang="en-US" smtClean="0">
+                <a:solidFill>
+                  <a:srgbClr val="6D7777"/>
+                </a:solidFill>
+              </a:rPr>
+              <a:pPr/>
+              <a:t>6</a:t>
+            </a:fld>
+            <a:endParaRPr lang="en-US">
+              <a:solidFill>
+                <a:srgbClr val="6D7777"/>
+              </a:solidFill>
+            </a:endParaRPr>
+          </a:p>
+        </p:txBody>
+      </p:sp>
+      <p:sp>
+        <p:nvSpPr>
+          <p:cNvPr id="3" name="Title 2">
+            <a:extLst>
+              <a:ext uri="{FF2B5EF4-FFF2-40B4-BE49-F238E27FC236}">
+                <a16:creationId xmlns:a16="http://schemas.microsoft.com/office/drawing/2014/main" id="{AB877B22-01CF-4E42-93A6-DFAB54B54A39}"/>
+              </a:ext>
+            </a:extLst>
+          </p:cNvPr>
+          <p:cNvSpPr>
+            <a:spLocks noGrp="1"/>
+          </p:cNvSpPr>
+          <p:nvPr>
+            <p:ph type="ctrTitle"/>
+          </p:nvPr>
+        </p:nvSpPr>
+        <p:spPr/>
+        <p:txBody>
+          <a:bodyPr/>
+          <a:lstStyle/>
+          <a:p>
+            <a:r>
+              <a:rPr lang="en-US" dirty="0"/>
+              <a:t>Older Versions</a:t>
+            </a:r>
+          </a:p>
+        </p:txBody>
+      </p:sp>
+      <p:sp>
+        <p:nvSpPr>
+          <p:cNvPr id="4" name="Subtitle 3">
+            <a:extLst>
+              <a:ext uri="{FF2B5EF4-FFF2-40B4-BE49-F238E27FC236}">
+                <a16:creationId xmlns:a16="http://schemas.microsoft.com/office/drawing/2014/main" id="{6ADCDA09-464A-A547-8B2D-6FAAD0C85EE3}"/>
+              </a:ext>
+            </a:extLst>
+          </p:cNvPr>
+          <p:cNvSpPr>
+            <a:spLocks noGrp="1"/>
+          </p:cNvSpPr>
+          <p:nvPr>
+            <p:ph type="subTitle" idx="1"/>
+          </p:nvPr>
+        </p:nvSpPr>
+        <p:spPr/>
+        <p:txBody>
+          <a:bodyPr/>
+          <a:lstStyle/>
+          <a:p>
+            <a:endParaRPr lang="en-US"/>
+          </a:p>
+        </p:txBody>
+      </p:sp>
+    </p:spTree>
+    <p:extLst>
+      <p:ext uri="{BB962C8B-B14F-4D97-AF65-F5344CB8AC3E}">
+        <p14:creationId xmlns:p14="http://schemas.microsoft.com/office/powerpoint/2010/main" val="3485633649"/>
+      </p:ext>
+    </p:extLst>
+  </p:cSld>
+  <p:clrMapOvr>
+    <a:masterClrMapping/>
+  </p:clrMapOvr>
+</p:sld>
+</file>
+
+<file path=ppt/slides/slide7.xml><?xml version="1.0" encoding="utf-8"?>
+<p:sld xmlns:a="http://schemas.openxmlformats.org/drawingml/2006/main" xmlns:r="http://schemas.openxmlformats.org/officeDocument/2006/relationships" xmlns:p="http://schemas.openxmlformats.org/presentationml/2006/main">
+  <p:cSld>
+    <p:spTree>
+      <p:nvGrpSpPr>
+        <p:cNvPr id="1" name=""/>
+        <p:cNvGrpSpPr/>
+        <p:nvPr/>
+      </p:nvGrpSpPr>
+      <p:grpSpPr>
+        <a:xfrm>
+          <a:off x="0" y="0"/>
+          <a:ext cx="0" cy="0"/>
+          <a:chOff x="0" y="0"/>
+          <a:chExt cx="0" cy="0"/>
+        </a:xfrm>
+      </p:grpSpPr>
+      <p:sp>
+        <p:nvSpPr>
           <p:cNvPr id="2" name="Title 1">
             <a:extLst>
               <a:ext uri="{FF2B5EF4-FFF2-40B4-BE49-F238E27FC236}">
@@ -12536,7 +14483,7 @@
                 </a:solidFill>
               </a:rPr>
               <a:pPr/>
-              <a:t>6</a:t>
+              <a:t>7</a:t>
             </a:fld>
             <a:endParaRPr lang="en-US">
               <a:solidFill>

</xml_diff>

<commit_message>
added diagram for HR Onboarding App
</commit_message>
<xml_diff>
--- a/docs/DBA-diagrams.pptx
+++ b/docs/DBA-diagrams.pptx
@@ -6,16 +6,17 @@
     <p:sldMasterId id="2147484308" r:id="rId2"/>
   </p:sldMasterIdLst>
   <p:notesMasterIdLst>
-    <p:notesMasterId r:id="rId10"/>
+    <p:notesMasterId r:id="rId11"/>
   </p:notesMasterIdLst>
   <p:sldIdLst>
     <p:sldId id="2666" r:id="rId3"/>
     <p:sldId id="2668" r:id="rId4"/>
     <p:sldId id="2672" r:id="rId5"/>
-    <p:sldId id="2670" r:id="rId6"/>
-    <p:sldId id="2671" r:id="rId7"/>
-    <p:sldId id="2669" r:id="rId8"/>
-    <p:sldId id="2667" r:id="rId9"/>
+    <p:sldId id="2673" r:id="rId6"/>
+    <p:sldId id="2670" r:id="rId7"/>
+    <p:sldId id="2671" r:id="rId8"/>
+    <p:sldId id="2669" r:id="rId9"/>
+    <p:sldId id="2667" r:id="rId10"/>
   </p:sldIdLst>
   <p:sldSz cx="12192000" cy="6858000"/>
   <p:notesSz cx="7086600" cy="9372600"/>
@@ -278,7 +279,7 @@
               <a:pPr>
                 <a:defRPr/>
               </a:pPr>
-              <a:t>2/9/21</a:t>
+              <a:t>4/18/21</a:t>
             </a:fld>
             <a:endParaRPr lang="en-US"/>
           </a:p>
@@ -5573,7 +5574,7 @@
         <p:fade/>
       </p:transition>
     </mc:Choice>
-    <mc:Fallback xmlns="" xmlns:mv="urn:schemas-microsoft-com:mac:vml">
+    <mc:Fallback xmlns:mv="urn:schemas-microsoft-com:mac:vml" xmlns="">
       <mp:transition xmlns:mp="http://schemas.microsoft.com/office/mac/powerpoint/2008/main" spd="med"/>
     </mc:Fallback>
   </mc:AlternateContent>
@@ -9483,6 +9484,2245 @@
       </p:grpSpPr>
       <p:sp>
         <p:nvSpPr>
+          <p:cNvPr id="2" name="Title 1">
+            <a:extLst>
+              <a:ext uri="{FF2B5EF4-FFF2-40B4-BE49-F238E27FC236}">
+                <a16:creationId xmlns:a16="http://schemas.microsoft.com/office/drawing/2014/main" id="{FDBCBD4C-6130-8A4D-A20A-D3DACE4FED88}"/>
+              </a:ext>
+            </a:extLst>
+          </p:cNvPr>
+          <p:cNvSpPr>
+            <a:spLocks noGrp="1"/>
+          </p:cNvSpPr>
+          <p:nvPr>
+            <p:ph type="title"/>
+          </p:nvPr>
+        </p:nvSpPr>
+        <p:spPr/>
+        <p:txBody>
+          <a:bodyPr/>
+          <a:lstStyle/>
+          <a:p>
+            <a:r>
+              <a:rPr lang="en-US" dirty="0"/>
+              <a:t>HR Onboarding Application use case</a:t>
+            </a:r>
+            <a:endParaRPr dirty="0"/>
+          </a:p>
+        </p:txBody>
+      </p:sp>
+      <p:sp>
+        <p:nvSpPr>
+          <p:cNvPr id="4" name="Slide Number Placeholder 3">
+            <a:extLst>
+              <a:ext uri="{FF2B5EF4-FFF2-40B4-BE49-F238E27FC236}">
+                <a16:creationId xmlns:a16="http://schemas.microsoft.com/office/drawing/2014/main" id="{FAA30688-F00F-9F40-888A-A703869BEDDC}"/>
+              </a:ext>
+            </a:extLst>
+          </p:cNvPr>
+          <p:cNvSpPr>
+            <a:spLocks noGrp="1"/>
+          </p:cNvSpPr>
+          <p:nvPr>
+            <p:ph type="sldNum" sz="quarter" idx="12"/>
+          </p:nvPr>
+        </p:nvSpPr>
+        <p:spPr/>
+        <p:txBody>
+          <a:bodyPr/>
+          <a:lstStyle/>
+          <a:p>
+            <a:fld id="{E9549862-13E2-C34D-815E-8545BD36FC59}" type="slidenum">
+              <a:rPr lang="en-US" smtClean="0">
+                <a:solidFill>
+                  <a:srgbClr val="6D7777"/>
+                </a:solidFill>
+              </a:rPr>
+              <a:pPr/>
+              <a:t>4</a:t>
+            </a:fld>
+            <a:endParaRPr lang="en-US">
+              <a:solidFill>
+                <a:srgbClr val="6D7777"/>
+              </a:solidFill>
+            </a:endParaRPr>
+          </a:p>
+        </p:txBody>
+      </p:sp>
+      <p:sp>
+        <p:nvSpPr>
+          <p:cNvPr id="5" name="AutoShape 4">
+            <a:extLst>
+              <a:ext uri="{FF2B5EF4-FFF2-40B4-BE49-F238E27FC236}">
+                <a16:creationId xmlns:a16="http://schemas.microsoft.com/office/drawing/2014/main" id="{2FB15809-788F-3843-94BF-D56578181163}"/>
+              </a:ext>
+            </a:extLst>
+          </p:cNvPr>
+          <p:cNvSpPr>
+            <a:spLocks noChangeArrowheads="1"/>
+          </p:cNvSpPr>
+          <p:nvPr/>
+        </p:nvSpPr>
+        <p:spPr bwMode="auto">
+          <a:xfrm>
+            <a:off x="891007" y="1866508"/>
+            <a:ext cx="6020711" cy="3519110"/>
+          </a:xfrm>
+          <a:prstGeom prst="roundRect">
+            <a:avLst>
+              <a:gd name="adj" fmla="val 2714"/>
+            </a:avLst>
+          </a:prstGeom>
+          <a:noFill/>
+          <a:ln w="19050">
+            <a:solidFill>
+              <a:srgbClr val="FF0000"/>
+            </a:solidFill>
+            <a:prstDash val="solid"/>
+            <a:round/>
+            <a:headEnd/>
+            <a:tailEnd/>
+          </a:ln>
+        </p:spPr>
+        <p:txBody>
+          <a:bodyPr lIns="0" tIns="0" rIns="0" bIns="0" anchor="b" anchorCtr="1"/>
+          <a:lstStyle/>
+          <a:p>
+            <a:pPr algn="ctr" defTabSz="914377" eaLnBrk="1" fontAlgn="auto" hangingPunct="1">
+              <a:spcBef>
+                <a:spcPts val="0"/>
+              </a:spcBef>
+              <a:spcAft>
+                <a:spcPts val="0"/>
+              </a:spcAft>
+              <a:defRPr/>
+            </a:pPr>
+            <a:r>
+              <a:rPr lang="en-US" sz="1200" dirty="0">
+                <a:solidFill>
+                  <a:prstClr val="black"/>
+                </a:solidFill>
+                <a:latin typeface="Arial"/>
+              </a:rPr>
+              <a:t>OpenShift Container Platform</a:t>
+            </a:r>
+            <a:endParaRPr lang="en-US" sz="1200" dirty="0">
+              <a:solidFill>
+                <a:prstClr val="black"/>
+              </a:solidFill>
+              <a:latin typeface="Arial"/>
+              <a:cs typeface="+mn-cs"/>
+            </a:endParaRPr>
+          </a:p>
+        </p:txBody>
+      </p:sp>
+      <p:sp>
+        <p:nvSpPr>
+          <p:cNvPr id="6" name="AutoShape 4">
+            <a:extLst>
+              <a:ext uri="{FF2B5EF4-FFF2-40B4-BE49-F238E27FC236}">
+                <a16:creationId xmlns:a16="http://schemas.microsoft.com/office/drawing/2014/main" id="{2B9DFC2C-F306-0E4A-A4BD-C81788E28E3F}"/>
+              </a:ext>
+            </a:extLst>
+          </p:cNvPr>
+          <p:cNvSpPr>
+            <a:spLocks noChangeArrowheads="1"/>
+          </p:cNvSpPr>
+          <p:nvPr/>
+        </p:nvSpPr>
+        <p:spPr bwMode="auto">
+          <a:xfrm>
+            <a:off x="891007" y="5432860"/>
+            <a:ext cx="10215639" cy="347646"/>
+          </a:xfrm>
+          <a:prstGeom prst="roundRect">
+            <a:avLst>
+              <a:gd name="adj" fmla="val 7117"/>
+            </a:avLst>
+          </a:prstGeom>
+          <a:noFill/>
+          <a:ln w="12700">
+            <a:solidFill>
+              <a:schemeClr val="bg1">
+                <a:lumMod val="10000"/>
+              </a:schemeClr>
+            </a:solidFill>
+            <a:prstDash val="solid"/>
+            <a:round/>
+            <a:headEnd/>
+            <a:tailEnd/>
+          </a:ln>
+        </p:spPr>
+        <p:txBody>
+          <a:bodyPr lIns="0" tIns="0" rIns="0" bIns="0" anchor="b" anchorCtr="1"/>
+          <a:lstStyle/>
+          <a:p>
+            <a:pPr algn="ctr" defTabSz="914377" eaLnBrk="1" fontAlgn="auto" hangingPunct="1">
+              <a:spcBef>
+                <a:spcPts val="0"/>
+              </a:spcBef>
+              <a:spcAft>
+                <a:spcPts val="0"/>
+              </a:spcAft>
+              <a:defRPr/>
+            </a:pPr>
+            <a:r>
+              <a:rPr lang="en-US" sz="1200" dirty="0">
+                <a:solidFill>
+                  <a:prstClr val="black"/>
+                </a:solidFill>
+                <a:latin typeface="Arial"/>
+              </a:rPr>
+              <a:t>On-premise or Cloud Providers (IBM, AWS, GCP, Azure...)</a:t>
+            </a:r>
+            <a:endParaRPr lang="en-US" sz="1200" dirty="0">
+              <a:solidFill>
+                <a:prstClr val="black"/>
+              </a:solidFill>
+              <a:latin typeface="Arial"/>
+              <a:cs typeface="+mn-cs"/>
+            </a:endParaRPr>
+          </a:p>
+        </p:txBody>
+      </p:sp>
+      <p:sp>
+        <p:nvSpPr>
+          <p:cNvPr id="9" name="Rounded Rectangle 8">
+            <a:extLst>
+              <a:ext uri="{FF2B5EF4-FFF2-40B4-BE49-F238E27FC236}">
+                <a16:creationId xmlns:a16="http://schemas.microsoft.com/office/drawing/2014/main" id="{D6AEE529-3EDC-D24A-895D-1A327D19E6CC}"/>
+              </a:ext>
+            </a:extLst>
+          </p:cNvPr>
+          <p:cNvSpPr/>
+          <p:nvPr/>
+        </p:nvSpPr>
+        <p:spPr>
+          <a:xfrm>
+            <a:off x="7391403" y="2076151"/>
+            <a:ext cx="1161059" cy="660401"/>
+          </a:xfrm>
+          <a:prstGeom prst="roundRect">
+            <a:avLst>
+              <a:gd name="adj" fmla="val 7576"/>
+            </a:avLst>
+          </a:prstGeom>
+          <a:solidFill>
+            <a:srgbClr val="92D050"/>
+          </a:solidFill>
+          <a:ln>
+            <a:noFill/>
+          </a:ln>
+          <a:effectLst>
+            <a:outerShdw blurRad="50800" dist="38100" dir="5400000" algn="t" rotWithShape="0">
+              <a:prstClr val="black">
+                <a:alpha val="40000"/>
+              </a:prstClr>
+            </a:outerShdw>
+          </a:effectLst>
+        </p:spPr>
+        <p:style>
+          <a:lnRef idx="2">
+            <a:schemeClr val="accent1">
+              <a:shade val="50000"/>
+            </a:schemeClr>
+          </a:lnRef>
+          <a:fillRef idx="1">
+            <a:schemeClr val="accent1"/>
+          </a:fillRef>
+          <a:effectRef idx="0">
+            <a:schemeClr val="accent1"/>
+          </a:effectRef>
+          <a:fontRef idx="minor">
+            <a:schemeClr val="lt1"/>
+          </a:fontRef>
+        </p:style>
+        <p:txBody>
+          <a:bodyPr rtlCol="0" anchor="ctr"/>
+          <a:lstStyle/>
+          <a:p>
+            <a:pPr algn="ctr" defTabSz="914377" eaLnBrk="1" fontAlgn="auto" hangingPunct="1">
+              <a:spcBef>
+                <a:spcPts val="0"/>
+              </a:spcBef>
+              <a:spcAft>
+                <a:spcPts val="0"/>
+              </a:spcAft>
+            </a:pPr>
+            <a:r>
+              <a:rPr lang="en-US" sz="900" b="1" dirty="0">
+                <a:solidFill>
+                  <a:srgbClr val="244311"/>
+                </a:solidFill>
+                <a:latin typeface="Arial"/>
+              </a:rPr>
+              <a:t>HR Onboarding Application Services Process App</a:t>
+            </a:r>
+          </a:p>
+        </p:txBody>
+      </p:sp>
+      <p:sp>
+        <p:nvSpPr>
+          <p:cNvPr id="11" name="AutoShape 4">
+            <a:extLst>
+              <a:ext uri="{FF2B5EF4-FFF2-40B4-BE49-F238E27FC236}">
+                <a16:creationId xmlns:a16="http://schemas.microsoft.com/office/drawing/2014/main" id="{CC1AD571-B5DB-A746-9798-81C794C0603C}"/>
+              </a:ext>
+            </a:extLst>
+          </p:cNvPr>
+          <p:cNvSpPr>
+            <a:spLocks noChangeArrowheads="1"/>
+          </p:cNvSpPr>
+          <p:nvPr/>
+        </p:nvSpPr>
+        <p:spPr bwMode="auto">
+          <a:xfrm>
+            <a:off x="940042" y="3498901"/>
+            <a:ext cx="2919689" cy="1204471"/>
+          </a:xfrm>
+          <a:prstGeom prst="roundRect">
+            <a:avLst>
+              <a:gd name="adj" fmla="val 7117"/>
+            </a:avLst>
+          </a:prstGeom>
+          <a:noFill/>
+          <a:ln w="12700">
+            <a:solidFill>
+              <a:schemeClr val="tx2">
+                <a:lumMod val="50000"/>
+              </a:schemeClr>
+            </a:solidFill>
+            <a:prstDash val="dash"/>
+            <a:round/>
+            <a:headEnd/>
+            <a:tailEnd/>
+          </a:ln>
+        </p:spPr>
+        <p:txBody>
+          <a:bodyPr lIns="0" tIns="0" rIns="0" bIns="0" anchor="b" anchorCtr="1"/>
+          <a:lstStyle/>
+          <a:p>
+            <a:pPr algn="ctr" defTabSz="914377" eaLnBrk="1" fontAlgn="auto" hangingPunct="1">
+              <a:spcBef>
+                <a:spcPts val="0"/>
+              </a:spcBef>
+              <a:spcAft>
+                <a:spcPts val="0"/>
+              </a:spcAft>
+              <a:defRPr/>
+            </a:pPr>
+            <a:r>
+              <a:rPr lang="en-US" sz="1200" dirty="0">
+                <a:solidFill>
+                  <a:prstClr val="black"/>
+                </a:solidFill>
+                <a:latin typeface="Arial"/>
+                <a:cs typeface="+mn-cs"/>
+              </a:rPr>
+              <a:t>Operational Decision Manager - Dev</a:t>
+            </a:r>
+          </a:p>
+        </p:txBody>
+      </p:sp>
+      <p:sp>
+        <p:nvSpPr>
+          <p:cNvPr id="12" name="AutoShape 4">
+            <a:extLst>
+              <a:ext uri="{FF2B5EF4-FFF2-40B4-BE49-F238E27FC236}">
+                <a16:creationId xmlns:a16="http://schemas.microsoft.com/office/drawing/2014/main" id="{2846B9AC-58A8-7945-9399-1FB1814F7808}"/>
+              </a:ext>
+            </a:extLst>
+          </p:cNvPr>
+          <p:cNvSpPr>
+            <a:spLocks noChangeArrowheads="1"/>
+          </p:cNvSpPr>
+          <p:nvPr/>
+        </p:nvSpPr>
+        <p:spPr bwMode="auto">
+          <a:xfrm>
+            <a:off x="6960753" y="1866508"/>
+            <a:ext cx="4145893" cy="3519109"/>
+          </a:xfrm>
+          <a:prstGeom prst="roundRect">
+            <a:avLst>
+              <a:gd name="adj" fmla="val 2714"/>
+            </a:avLst>
+          </a:prstGeom>
+          <a:noFill/>
+          <a:ln w="19050">
+            <a:solidFill>
+              <a:srgbClr val="1B44A7"/>
+            </a:solidFill>
+            <a:prstDash val="solid"/>
+            <a:round/>
+            <a:headEnd/>
+            <a:tailEnd/>
+          </a:ln>
+        </p:spPr>
+        <p:txBody>
+          <a:bodyPr lIns="0" tIns="0" rIns="0" bIns="0" anchor="b" anchorCtr="1"/>
+          <a:lstStyle/>
+          <a:p>
+            <a:pPr algn="ctr" defTabSz="914377" eaLnBrk="1" fontAlgn="auto" hangingPunct="1">
+              <a:spcBef>
+                <a:spcPts val="0"/>
+              </a:spcBef>
+              <a:spcAft>
+                <a:spcPts val="0"/>
+              </a:spcAft>
+              <a:defRPr/>
+            </a:pPr>
+            <a:r>
+              <a:rPr lang="en-US" sz="1200" dirty="0">
+                <a:solidFill>
+                  <a:prstClr val="black"/>
+                </a:solidFill>
+                <a:latin typeface="Arial"/>
+              </a:rPr>
+              <a:t>VM</a:t>
+            </a:r>
+            <a:endParaRPr lang="en-US" sz="1200" dirty="0">
+              <a:solidFill>
+                <a:prstClr val="black"/>
+              </a:solidFill>
+              <a:latin typeface="Arial"/>
+              <a:cs typeface="+mn-cs"/>
+            </a:endParaRPr>
+          </a:p>
+        </p:txBody>
+      </p:sp>
+      <p:sp>
+        <p:nvSpPr>
+          <p:cNvPr id="13" name="AutoShape 4">
+            <a:extLst>
+              <a:ext uri="{FF2B5EF4-FFF2-40B4-BE49-F238E27FC236}">
+                <a16:creationId xmlns:a16="http://schemas.microsoft.com/office/drawing/2014/main" id="{2D290673-5AFB-3149-BBB9-FAD6AD0EA6E9}"/>
+              </a:ext>
+            </a:extLst>
+          </p:cNvPr>
+          <p:cNvSpPr>
+            <a:spLocks noChangeArrowheads="1"/>
+          </p:cNvSpPr>
+          <p:nvPr/>
+        </p:nvSpPr>
+        <p:spPr bwMode="auto">
+          <a:xfrm>
+            <a:off x="9122378" y="1952964"/>
+            <a:ext cx="1899893" cy="2750408"/>
+          </a:xfrm>
+          <a:prstGeom prst="roundRect">
+            <a:avLst>
+              <a:gd name="adj" fmla="val 7117"/>
+            </a:avLst>
+          </a:prstGeom>
+          <a:noFill/>
+          <a:ln w="12700">
+            <a:solidFill>
+              <a:schemeClr val="tx2">
+                <a:lumMod val="50000"/>
+              </a:schemeClr>
+            </a:solidFill>
+            <a:prstDash val="dash"/>
+            <a:round/>
+            <a:headEnd/>
+            <a:tailEnd/>
+          </a:ln>
+        </p:spPr>
+        <p:txBody>
+          <a:bodyPr lIns="0" tIns="0" rIns="0" bIns="0" anchor="b" anchorCtr="1"/>
+          <a:lstStyle/>
+          <a:p>
+            <a:pPr algn="ctr" defTabSz="914377" eaLnBrk="1" fontAlgn="auto" hangingPunct="1">
+              <a:spcBef>
+                <a:spcPts val="0"/>
+              </a:spcBef>
+              <a:spcAft>
+                <a:spcPts val="0"/>
+              </a:spcAft>
+              <a:defRPr/>
+            </a:pPr>
+            <a:r>
+              <a:rPr lang="en-US" sz="1200" dirty="0">
+                <a:solidFill>
+                  <a:prstClr val="black"/>
+                </a:solidFill>
+                <a:latin typeface="Arial"/>
+                <a:cs typeface="+mn-cs"/>
+              </a:rPr>
+              <a:t>Business Automation Workflow - Prod</a:t>
+            </a:r>
+          </a:p>
+        </p:txBody>
+      </p:sp>
+      <p:sp>
+        <p:nvSpPr>
+          <p:cNvPr id="15" name="Rounded Rectangle 14">
+            <a:extLst>
+              <a:ext uri="{FF2B5EF4-FFF2-40B4-BE49-F238E27FC236}">
+                <a16:creationId xmlns:a16="http://schemas.microsoft.com/office/drawing/2014/main" id="{6B007D79-16AB-164F-A735-FB42570A5B70}"/>
+              </a:ext>
+            </a:extLst>
+          </p:cNvPr>
+          <p:cNvSpPr/>
+          <p:nvPr/>
+        </p:nvSpPr>
+        <p:spPr>
+          <a:xfrm>
+            <a:off x="9165238" y="3855768"/>
+            <a:ext cx="1814171" cy="385810"/>
+          </a:xfrm>
+          <a:prstGeom prst="roundRect">
+            <a:avLst>
+              <a:gd name="adj" fmla="val 7576"/>
+            </a:avLst>
+          </a:prstGeom>
+          <a:solidFill>
+            <a:schemeClr val="tx2">
+              <a:lumMod val="75000"/>
+            </a:schemeClr>
+          </a:solidFill>
+          <a:ln>
+            <a:noFill/>
+          </a:ln>
+          <a:effectLst>
+            <a:outerShdw blurRad="50800" dist="38100" dir="5400000" algn="t" rotWithShape="0">
+              <a:prstClr val="black">
+                <a:alpha val="40000"/>
+              </a:prstClr>
+            </a:outerShdw>
+          </a:effectLst>
+        </p:spPr>
+        <p:style>
+          <a:lnRef idx="2">
+            <a:schemeClr val="accent1">
+              <a:shade val="50000"/>
+            </a:schemeClr>
+          </a:lnRef>
+          <a:fillRef idx="1">
+            <a:schemeClr val="accent1"/>
+          </a:fillRef>
+          <a:effectRef idx="0">
+            <a:schemeClr val="accent1"/>
+          </a:effectRef>
+          <a:fontRef idx="minor">
+            <a:schemeClr val="lt1"/>
+          </a:fontRef>
+        </p:style>
+        <p:txBody>
+          <a:bodyPr rtlCol="0" anchor="ctr"/>
+          <a:lstStyle/>
+          <a:p>
+            <a:pPr algn="ctr" defTabSz="914377" eaLnBrk="1" fontAlgn="auto" hangingPunct="1">
+              <a:spcBef>
+                <a:spcPts val="0"/>
+              </a:spcBef>
+              <a:spcAft>
+                <a:spcPts val="0"/>
+              </a:spcAft>
+            </a:pPr>
+            <a:r>
+              <a:rPr lang="en-US" sz="900" b="1" dirty="0">
+                <a:solidFill>
+                  <a:prstClr val="white"/>
+                </a:solidFill>
+                <a:latin typeface="Arial"/>
+              </a:rPr>
+              <a:t>Workflow Server</a:t>
+            </a:r>
+          </a:p>
+        </p:txBody>
+      </p:sp>
+      <p:sp>
+        <p:nvSpPr>
+          <p:cNvPr id="17" name="Rounded Rectangle 16">
+            <a:extLst>
+              <a:ext uri="{FF2B5EF4-FFF2-40B4-BE49-F238E27FC236}">
+                <a16:creationId xmlns:a16="http://schemas.microsoft.com/office/drawing/2014/main" id="{01038804-C1A1-F547-9999-EB2368EEF20D}"/>
+              </a:ext>
+            </a:extLst>
+          </p:cNvPr>
+          <p:cNvSpPr/>
+          <p:nvPr/>
+        </p:nvSpPr>
+        <p:spPr>
+          <a:xfrm>
+            <a:off x="7064848" y="2856275"/>
+            <a:ext cx="1814171" cy="385810"/>
+          </a:xfrm>
+          <a:prstGeom prst="roundRect">
+            <a:avLst>
+              <a:gd name="adj" fmla="val 7576"/>
+            </a:avLst>
+          </a:prstGeom>
+          <a:solidFill>
+            <a:schemeClr val="tx2">
+              <a:lumMod val="75000"/>
+            </a:schemeClr>
+          </a:solidFill>
+          <a:ln>
+            <a:noFill/>
+          </a:ln>
+          <a:effectLst>
+            <a:outerShdw blurRad="50800" dist="38100" dir="5400000" algn="t" rotWithShape="0">
+              <a:prstClr val="black">
+                <a:alpha val="40000"/>
+              </a:prstClr>
+            </a:outerShdw>
+          </a:effectLst>
+        </p:spPr>
+        <p:style>
+          <a:lnRef idx="2">
+            <a:schemeClr val="accent1">
+              <a:shade val="50000"/>
+            </a:schemeClr>
+          </a:lnRef>
+          <a:fillRef idx="1">
+            <a:schemeClr val="accent1"/>
+          </a:fillRef>
+          <a:effectRef idx="0">
+            <a:schemeClr val="accent1"/>
+          </a:effectRef>
+          <a:fontRef idx="minor">
+            <a:schemeClr val="lt1"/>
+          </a:fontRef>
+        </p:style>
+        <p:txBody>
+          <a:bodyPr rtlCol="0" anchor="ctr"/>
+          <a:lstStyle/>
+          <a:p>
+            <a:pPr algn="ctr" defTabSz="914377" eaLnBrk="1" fontAlgn="auto" hangingPunct="1">
+              <a:spcBef>
+                <a:spcPts val="0"/>
+              </a:spcBef>
+              <a:spcAft>
+                <a:spcPts val="0"/>
+              </a:spcAft>
+            </a:pPr>
+            <a:r>
+              <a:rPr lang="en-US" sz="900" b="1" dirty="0">
+                <a:solidFill>
+                  <a:prstClr val="white"/>
+                </a:solidFill>
+                <a:latin typeface="Arial"/>
+              </a:rPr>
+              <a:t>Process Portal</a:t>
+            </a:r>
+          </a:p>
+        </p:txBody>
+      </p:sp>
+      <p:sp>
+        <p:nvSpPr>
+          <p:cNvPr id="24" name="Rounded Rectangle 23">
+            <a:extLst>
+              <a:ext uri="{FF2B5EF4-FFF2-40B4-BE49-F238E27FC236}">
+                <a16:creationId xmlns:a16="http://schemas.microsoft.com/office/drawing/2014/main" id="{B2FD7BDC-91B3-C14F-B20F-60269FFCECD5}"/>
+              </a:ext>
+            </a:extLst>
+          </p:cNvPr>
+          <p:cNvSpPr/>
+          <p:nvPr/>
+        </p:nvSpPr>
+        <p:spPr>
+          <a:xfrm>
+            <a:off x="2512078" y="4024854"/>
+            <a:ext cx="1232150" cy="385810"/>
+          </a:xfrm>
+          <a:prstGeom prst="roundRect">
+            <a:avLst>
+              <a:gd name="adj" fmla="val 7576"/>
+            </a:avLst>
+          </a:prstGeom>
+          <a:solidFill>
+            <a:schemeClr val="tx2">
+              <a:lumMod val="75000"/>
+            </a:schemeClr>
+          </a:solidFill>
+          <a:ln>
+            <a:noFill/>
+          </a:ln>
+          <a:effectLst>
+            <a:outerShdw blurRad="50800" dist="38100" dir="5400000" algn="t" rotWithShape="0">
+              <a:prstClr val="black">
+                <a:alpha val="40000"/>
+              </a:prstClr>
+            </a:outerShdw>
+          </a:effectLst>
+        </p:spPr>
+        <p:style>
+          <a:lnRef idx="2">
+            <a:schemeClr val="accent1">
+              <a:shade val="50000"/>
+            </a:schemeClr>
+          </a:lnRef>
+          <a:fillRef idx="1">
+            <a:schemeClr val="accent1"/>
+          </a:fillRef>
+          <a:effectRef idx="0">
+            <a:schemeClr val="accent1"/>
+          </a:effectRef>
+          <a:fontRef idx="minor">
+            <a:schemeClr val="lt1"/>
+          </a:fontRef>
+        </p:style>
+        <p:txBody>
+          <a:bodyPr rtlCol="0" anchor="ctr"/>
+          <a:lstStyle/>
+          <a:p>
+            <a:pPr algn="ctr" defTabSz="914377" eaLnBrk="1" fontAlgn="auto" hangingPunct="1">
+              <a:spcBef>
+                <a:spcPts val="0"/>
+              </a:spcBef>
+              <a:spcAft>
+                <a:spcPts val="0"/>
+              </a:spcAft>
+            </a:pPr>
+            <a:r>
+              <a:rPr lang="en-US" sz="900" b="1" dirty="0">
+                <a:solidFill>
+                  <a:prstClr val="white"/>
+                </a:solidFill>
+                <a:latin typeface="Arial"/>
+              </a:rPr>
+              <a:t>Decision Server</a:t>
+            </a:r>
+          </a:p>
+        </p:txBody>
+      </p:sp>
+      <p:sp>
+        <p:nvSpPr>
+          <p:cNvPr id="25" name="Rounded Rectangle 24">
+            <a:extLst>
+              <a:ext uri="{FF2B5EF4-FFF2-40B4-BE49-F238E27FC236}">
+                <a16:creationId xmlns:a16="http://schemas.microsoft.com/office/drawing/2014/main" id="{E86B680B-0D7C-314E-86C5-22F8255EE24D}"/>
+              </a:ext>
+            </a:extLst>
+          </p:cNvPr>
+          <p:cNvSpPr/>
+          <p:nvPr/>
+        </p:nvSpPr>
+        <p:spPr>
+          <a:xfrm>
+            <a:off x="2512078" y="3581171"/>
+            <a:ext cx="1232150" cy="385810"/>
+          </a:xfrm>
+          <a:prstGeom prst="roundRect">
+            <a:avLst>
+              <a:gd name="adj" fmla="val 7576"/>
+            </a:avLst>
+          </a:prstGeom>
+          <a:solidFill>
+            <a:schemeClr val="tx2">
+              <a:lumMod val="75000"/>
+            </a:schemeClr>
+          </a:solidFill>
+          <a:ln>
+            <a:noFill/>
+          </a:ln>
+          <a:effectLst>
+            <a:outerShdw blurRad="50800" dist="38100" dir="5400000" algn="t" rotWithShape="0">
+              <a:prstClr val="black">
+                <a:alpha val="40000"/>
+              </a:prstClr>
+            </a:outerShdw>
+          </a:effectLst>
+        </p:spPr>
+        <p:style>
+          <a:lnRef idx="2">
+            <a:schemeClr val="accent1">
+              <a:shade val="50000"/>
+            </a:schemeClr>
+          </a:lnRef>
+          <a:fillRef idx="1">
+            <a:schemeClr val="accent1"/>
+          </a:fillRef>
+          <a:effectRef idx="0">
+            <a:schemeClr val="accent1"/>
+          </a:effectRef>
+          <a:fontRef idx="minor">
+            <a:schemeClr val="lt1"/>
+          </a:fontRef>
+        </p:style>
+        <p:txBody>
+          <a:bodyPr rtlCol="0" anchor="ctr"/>
+          <a:lstStyle/>
+          <a:p>
+            <a:pPr algn="ctr" defTabSz="914377" eaLnBrk="1" fontAlgn="auto" hangingPunct="1">
+              <a:spcBef>
+                <a:spcPts val="0"/>
+              </a:spcBef>
+              <a:spcAft>
+                <a:spcPts val="0"/>
+              </a:spcAft>
+            </a:pPr>
+            <a:r>
+              <a:rPr lang="en-US" sz="900" b="1" dirty="0">
+                <a:solidFill>
+                  <a:prstClr val="white"/>
+                </a:solidFill>
+                <a:latin typeface="Arial"/>
+              </a:rPr>
+              <a:t>Decision Center</a:t>
+            </a:r>
+          </a:p>
+        </p:txBody>
+      </p:sp>
+      <p:sp>
+        <p:nvSpPr>
+          <p:cNvPr id="26" name="Rounded Rectangle 25">
+            <a:extLst>
+              <a:ext uri="{FF2B5EF4-FFF2-40B4-BE49-F238E27FC236}">
+                <a16:creationId xmlns:a16="http://schemas.microsoft.com/office/drawing/2014/main" id="{4AFD2967-3142-5C43-BF86-9F28F59D8F99}"/>
+              </a:ext>
+            </a:extLst>
+          </p:cNvPr>
+          <p:cNvSpPr/>
+          <p:nvPr/>
+        </p:nvSpPr>
+        <p:spPr>
+          <a:xfrm>
+            <a:off x="1130343" y="3585504"/>
+            <a:ext cx="1161059" cy="660401"/>
+          </a:xfrm>
+          <a:prstGeom prst="roundRect">
+            <a:avLst>
+              <a:gd name="adj" fmla="val 7576"/>
+            </a:avLst>
+          </a:prstGeom>
+          <a:solidFill>
+            <a:srgbClr val="92D050"/>
+          </a:solidFill>
+          <a:ln>
+            <a:noFill/>
+          </a:ln>
+          <a:effectLst>
+            <a:outerShdw blurRad="50800" dist="38100" dir="5400000" algn="t" rotWithShape="0">
+              <a:prstClr val="black">
+                <a:alpha val="40000"/>
+              </a:prstClr>
+            </a:outerShdw>
+          </a:effectLst>
+        </p:spPr>
+        <p:style>
+          <a:lnRef idx="2">
+            <a:schemeClr val="accent1">
+              <a:shade val="50000"/>
+            </a:schemeClr>
+          </a:lnRef>
+          <a:fillRef idx="1">
+            <a:schemeClr val="accent1"/>
+          </a:fillRef>
+          <a:effectRef idx="0">
+            <a:schemeClr val="accent1"/>
+          </a:effectRef>
+          <a:fontRef idx="minor">
+            <a:schemeClr val="lt1"/>
+          </a:fontRef>
+        </p:style>
+        <p:txBody>
+          <a:bodyPr rtlCol="0" anchor="ctr"/>
+          <a:lstStyle/>
+          <a:p>
+            <a:pPr algn="ctr" defTabSz="914377" eaLnBrk="1" fontAlgn="auto" hangingPunct="1">
+              <a:spcBef>
+                <a:spcPts val="0"/>
+              </a:spcBef>
+              <a:spcAft>
+                <a:spcPts val="0"/>
+              </a:spcAft>
+            </a:pPr>
+            <a:r>
+              <a:rPr lang="en-US" sz="900" b="1" dirty="0">
+                <a:solidFill>
+                  <a:srgbClr val="244311"/>
+                </a:solidFill>
+              </a:rPr>
+              <a:t>Calculate Candidate Salary Range Project</a:t>
+            </a:r>
+            <a:endParaRPr lang="en-US" sz="900" b="1" dirty="0">
+              <a:solidFill>
+                <a:srgbClr val="244311"/>
+              </a:solidFill>
+              <a:latin typeface="Arial"/>
+            </a:endParaRPr>
+          </a:p>
+        </p:txBody>
+      </p:sp>
+      <p:sp>
+        <p:nvSpPr>
+          <p:cNvPr id="27" name="AutoShape 4">
+            <a:extLst>
+              <a:ext uri="{FF2B5EF4-FFF2-40B4-BE49-F238E27FC236}">
+                <a16:creationId xmlns:a16="http://schemas.microsoft.com/office/drawing/2014/main" id="{F74E4F81-9735-4142-B0D6-CBE3A7B2EC59}"/>
+              </a:ext>
+            </a:extLst>
+          </p:cNvPr>
+          <p:cNvSpPr>
+            <a:spLocks noChangeArrowheads="1"/>
+          </p:cNvSpPr>
+          <p:nvPr/>
+        </p:nvSpPr>
+        <p:spPr bwMode="auto">
+          <a:xfrm>
+            <a:off x="940042" y="2207832"/>
+            <a:ext cx="2919689" cy="1204471"/>
+          </a:xfrm>
+          <a:prstGeom prst="roundRect">
+            <a:avLst>
+              <a:gd name="adj" fmla="val 7117"/>
+            </a:avLst>
+          </a:prstGeom>
+          <a:noFill/>
+          <a:ln w="12700">
+            <a:solidFill>
+              <a:schemeClr val="tx2">
+                <a:lumMod val="50000"/>
+              </a:schemeClr>
+            </a:solidFill>
+            <a:prstDash val="dash"/>
+            <a:round/>
+            <a:headEnd/>
+            <a:tailEnd/>
+          </a:ln>
+        </p:spPr>
+        <p:txBody>
+          <a:bodyPr lIns="0" tIns="0" rIns="0" bIns="0" anchor="b" anchorCtr="1"/>
+          <a:lstStyle/>
+          <a:p>
+            <a:pPr algn="ctr" defTabSz="914377" eaLnBrk="1" fontAlgn="auto" hangingPunct="1">
+              <a:spcBef>
+                <a:spcPts val="0"/>
+              </a:spcBef>
+              <a:spcAft>
+                <a:spcPts val="0"/>
+              </a:spcAft>
+              <a:defRPr/>
+            </a:pPr>
+            <a:r>
+              <a:rPr lang="en-US" sz="1200" dirty="0">
+                <a:solidFill>
+                  <a:prstClr val="black"/>
+                </a:solidFill>
+                <a:latin typeface="Arial"/>
+                <a:cs typeface="+mn-cs"/>
+              </a:rPr>
+              <a:t>Operational Decision Manager - Prod</a:t>
+            </a:r>
+          </a:p>
+        </p:txBody>
+      </p:sp>
+      <p:sp>
+        <p:nvSpPr>
+          <p:cNvPr id="28" name="Rounded Rectangle 27">
+            <a:extLst>
+              <a:ext uri="{FF2B5EF4-FFF2-40B4-BE49-F238E27FC236}">
+                <a16:creationId xmlns:a16="http://schemas.microsoft.com/office/drawing/2014/main" id="{E64BC727-8975-3743-B1AC-52F8347A3FA1}"/>
+              </a:ext>
+            </a:extLst>
+          </p:cNvPr>
+          <p:cNvSpPr/>
+          <p:nvPr/>
+        </p:nvSpPr>
+        <p:spPr>
+          <a:xfrm>
+            <a:off x="2512078" y="2431730"/>
+            <a:ext cx="1232150" cy="385810"/>
+          </a:xfrm>
+          <a:prstGeom prst="roundRect">
+            <a:avLst>
+              <a:gd name="adj" fmla="val 7576"/>
+            </a:avLst>
+          </a:prstGeom>
+          <a:solidFill>
+            <a:schemeClr val="tx2">
+              <a:lumMod val="75000"/>
+            </a:schemeClr>
+          </a:solidFill>
+          <a:ln>
+            <a:noFill/>
+          </a:ln>
+          <a:effectLst>
+            <a:outerShdw blurRad="50800" dist="38100" dir="5400000" algn="t" rotWithShape="0">
+              <a:prstClr val="black">
+                <a:alpha val="40000"/>
+              </a:prstClr>
+            </a:outerShdw>
+          </a:effectLst>
+        </p:spPr>
+        <p:style>
+          <a:lnRef idx="2">
+            <a:schemeClr val="accent1">
+              <a:shade val="50000"/>
+            </a:schemeClr>
+          </a:lnRef>
+          <a:fillRef idx="1">
+            <a:schemeClr val="accent1"/>
+          </a:fillRef>
+          <a:effectRef idx="0">
+            <a:schemeClr val="accent1"/>
+          </a:effectRef>
+          <a:fontRef idx="minor">
+            <a:schemeClr val="lt1"/>
+          </a:fontRef>
+        </p:style>
+        <p:txBody>
+          <a:bodyPr rtlCol="0" anchor="ctr"/>
+          <a:lstStyle/>
+          <a:p>
+            <a:pPr algn="ctr" defTabSz="914377" eaLnBrk="1" fontAlgn="auto" hangingPunct="1">
+              <a:spcBef>
+                <a:spcPts val="0"/>
+              </a:spcBef>
+              <a:spcAft>
+                <a:spcPts val="0"/>
+              </a:spcAft>
+            </a:pPr>
+            <a:r>
+              <a:rPr lang="en-US" sz="900" b="1" dirty="0">
+                <a:solidFill>
+                  <a:prstClr val="white"/>
+                </a:solidFill>
+                <a:latin typeface="Arial"/>
+              </a:rPr>
+              <a:t>Decision Server</a:t>
+            </a:r>
+          </a:p>
+        </p:txBody>
+      </p:sp>
+      <p:sp>
+        <p:nvSpPr>
+          <p:cNvPr id="30" name="Rounded Rectangle 29">
+            <a:extLst>
+              <a:ext uri="{FF2B5EF4-FFF2-40B4-BE49-F238E27FC236}">
+                <a16:creationId xmlns:a16="http://schemas.microsoft.com/office/drawing/2014/main" id="{47C9DEA0-7E0B-5749-BAD8-3601D571C7A7}"/>
+              </a:ext>
+            </a:extLst>
+          </p:cNvPr>
+          <p:cNvSpPr/>
+          <p:nvPr/>
+        </p:nvSpPr>
+        <p:spPr>
+          <a:xfrm>
+            <a:off x="1130343" y="2294435"/>
+            <a:ext cx="1161059" cy="660401"/>
+          </a:xfrm>
+          <a:prstGeom prst="roundRect">
+            <a:avLst>
+              <a:gd name="adj" fmla="val 7576"/>
+            </a:avLst>
+          </a:prstGeom>
+          <a:solidFill>
+            <a:srgbClr val="92D050"/>
+          </a:solidFill>
+          <a:ln>
+            <a:noFill/>
+          </a:ln>
+          <a:effectLst>
+            <a:outerShdw blurRad="50800" dist="38100" dir="5400000" algn="t" rotWithShape="0">
+              <a:prstClr val="black">
+                <a:alpha val="40000"/>
+              </a:prstClr>
+            </a:outerShdw>
+          </a:effectLst>
+        </p:spPr>
+        <p:style>
+          <a:lnRef idx="2">
+            <a:schemeClr val="accent1">
+              <a:shade val="50000"/>
+            </a:schemeClr>
+          </a:lnRef>
+          <a:fillRef idx="1">
+            <a:schemeClr val="accent1"/>
+          </a:fillRef>
+          <a:effectRef idx="0">
+            <a:schemeClr val="accent1"/>
+          </a:effectRef>
+          <a:fontRef idx="minor">
+            <a:schemeClr val="lt1"/>
+          </a:fontRef>
+        </p:style>
+        <p:txBody>
+          <a:bodyPr rtlCol="0" anchor="ctr"/>
+          <a:lstStyle/>
+          <a:p>
+            <a:pPr algn="ctr" defTabSz="914377" eaLnBrk="1" fontAlgn="auto" hangingPunct="1">
+              <a:spcBef>
+                <a:spcPts val="0"/>
+              </a:spcBef>
+              <a:spcAft>
+                <a:spcPts val="0"/>
+              </a:spcAft>
+            </a:pPr>
+            <a:r>
+              <a:rPr lang="en-US" sz="900" b="1" dirty="0">
+                <a:solidFill>
+                  <a:srgbClr val="244311"/>
+                </a:solidFill>
+                <a:latin typeface="Arial"/>
+              </a:rPr>
+              <a:t>Calculate Candidate Salary Range Decision Service</a:t>
+            </a:r>
+          </a:p>
+        </p:txBody>
+      </p:sp>
+      <p:sp>
+        <p:nvSpPr>
+          <p:cNvPr id="8" name="AutoShape 4">
+            <a:extLst>
+              <a:ext uri="{FF2B5EF4-FFF2-40B4-BE49-F238E27FC236}">
+                <a16:creationId xmlns:a16="http://schemas.microsoft.com/office/drawing/2014/main" id="{59890A0C-8D27-7C44-9F8E-3AA14483DD17}"/>
+              </a:ext>
+            </a:extLst>
+          </p:cNvPr>
+          <p:cNvSpPr>
+            <a:spLocks noChangeArrowheads="1"/>
+          </p:cNvSpPr>
+          <p:nvPr/>
+        </p:nvSpPr>
+        <p:spPr bwMode="auto">
+          <a:xfrm>
+            <a:off x="940042" y="4754208"/>
+            <a:ext cx="10082229" cy="347646"/>
+          </a:xfrm>
+          <a:prstGeom prst="roundRect">
+            <a:avLst>
+              <a:gd name="adj" fmla="val 7117"/>
+            </a:avLst>
+          </a:prstGeom>
+          <a:solidFill>
+            <a:schemeClr val="tx1">
+              <a:lumMod val="25000"/>
+              <a:lumOff val="75000"/>
+            </a:schemeClr>
+          </a:solidFill>
+          <a:ln w="12700">
+            <a:noFill/>
+            <a:prstDash val="solid"/>
+            <a:round/>
+            <a:headEnd/>
+            <a:tailEnd/>
+          </a:ln>
+        </p:spPr>
+        <p:txBody>
+          <a:bodyPr lIns="0" tIns="0" rIns="0" bIns="0" anchor="b" anchorCtr="1"/>
+          <a:lstStyle/>
+          <a:p>
+            <a:pPr algn="ctr" defTabSz="914377" eaLnBrk="1" fontAlgn="auto" hangingPunct="1">
+              <a:spcBef>
+                <a:spcPts val="0"/>
+              </a:spcBef>
+              <a:spcAft>
+                <a:spcPts val="0"/>
+              </a:spcAft>
+              <a:defRPr/>
+            </a:pPr>
+            <a:r>
+              <a:rPr lang="en-US" sz="1200" dirty="0">
+                <a:solidFill>
+                  <a:prstClr val="black"/>
+                </a:solidFill>
+                <a:latin typeface="Arial"/>
+              </a:rPr>
+              <a:t>IBM Cloud Pak</a:t>
+            </a:r>
+            <a:r>
+              <a:rPr lang="en-US" sz="1200" dirty="0"/>
+              <a:t>®</a:t>
+            </a:r>
+            <a:r>
+              <a:rPr lang="en-US" sz="1200" dirty="0">
+                <a:solidFill>
+                  <a:prstClr val="black"/>
+                </a:solidFill>
+                <a:latin typeface="Arial"/>
+              </a:rPr>
+              <a:t> for Automation</a:t>
+            </a:r>
+            <a:endParaRPr lang="en-US" sz="1200" dirty="0">
+              <a:solidFill>
+                <a:prstClr val="black"/>
+              </a:solidFill>
+              <a:latin typeface="Arial"/>
+              <a:cs typeface="+mn-cs"/>
+            </a:endParaRPr>
+          </a:p>
+        </p:txBody>
+      </p:sp>
+      <p:sp>
+        <p:nvSpPr>
+          <p:cNvPr id="33" name="AutoShape 4">
+            <a:extLst>
+              <a:ext uri="{FF2B5EF4-FFF2-40B4-BE49-F238E27FC236}">
+                <a16:creationId xmlns:a16="http://schemas.microsoft.com/office/drawing/2014/main" id="{FE7DCDAD-00CD-B345-9299-DB512EC58E45}"/>
+              </a:ext>
+            </a:extLst>
+          </p:cNvPr>
+          <p:cNvSpPr>
+            <a:spLocks noChangeArrowheads="1"/>
+          </p:cNvSpPr>
+          <p:nvPr/>
+        </p:nvSpPr>
+        <p:spPr bwMode="auto">
+          <a:xfrm>
+            <a:off x="7027489" y="1952964"/>
+            <a:ext cx="1899893" cy="2750408"/>
+          </a:xfrm>
+          <a:prstGeom prst="roundRect">
+            <a:avLst>
+              <a:gd name="adj" fmla="val 7117"/>
+            </a:avLst>
+          </a:prstGeom>
+          <a:noFill/>
+          <a:ln w="12700">
+            <a:solidFill>
+              <a:schemeClr val="tx2">
+                <a:lumMod val="50000"/>
+              </a:schemeClr>
+            </a:solidFill>
+            <a:prstDash val="dash"/>
+            <a:round/>
+            <a:headEnd/>
+            <a:tailEnd/>
+          </a:ln>
+        </p:spPr>
+        <p:txBody>
+          <a:bodyPr lIns="0" tIns="0" rIns="0" bIns="0" anchor="b" anchorCtr="1"/>
+          <a:lstStyle/>
+          <a:p>
+            <a:pPr algn="ctr" defTabSz="914377" eaLnBrk="1" fontAlgn="auto" hangingPunct="1">
+              <a:spcBef>
+                <a:spcPts val="0"/>
+              </a:spcBef>
+              <a:spcAft>
+                <a:spcPts val="0"/>
+              </a:spcAft>
+              <a:defRPr/>
+            </a:pPr>
+            <a:r>
+              <a:rPr lang="en-US" sz="1200" dirty="0">
+                <a:solidFill>
+                  <a:prstClr val="black"/>
+                </a:solidFill>
+                <a:latin typeface="Arial"/>
+                <a:cs typeface="+mn-cs"/>
+              </a:rPr>
+              <a:t>Business Automation Workflow - Dev</a:t>
+            </a:r>
+          </a:p>
+        </p:txBody>
+      </p:sp>
+      <p:sp>
+        <p:nvSpPr>
+          <p:cNvPr id="34" name="Rounded Rectangle 33">
+            <a:extLst>
+              <a:ext uri="{FF2B5EF4-FFF2-40B4-BE49-F238E27FC236}">
+                <a16:creationId xmlns:a16="http://schemas.microsoft.com/office/drawing/2014/main" id="{95EE4E64-394E-7148-860D-328634CA8257}"/>
+              </a:ext>
+            </a:extLst>
+          </p:cNvPr>
+          <p:cNvSpPr/>
+          <p:nvPr/>
+        </p:nvSpPr>
+        <p:spPr>
+          <a:xfrm>
+            <a:off x="7064848" y="3355375"/>
+            <a:ext cx="1814171" cy="385810"/>
+          </a:xfrm>
+          <a:prstGeom prst="roundRect">
+            <a:avLst>
+              <a:gd name="adj" fmla="val 7576"/>
+            </a:avLst>
+          </a:prstGeom>
+          <a:solidFill>
+            <a:schemeClr val="tx2">
+              <a:lumMod val="75000"/>
+            </a:schemeClr>
+          </a:solidFill>
+          <a:ln>
+            <a:noFill/>
+          </a:ln>
+          <a:effectLst>
+            <a:outerShdw blurRad="50800" dist="38100" dir="5400000" algn="t" rotWithShape="0">
+              <a:prstClr val="black">
+                <a:alpha val="40000"/>
+              </a:prstClr>
+            </a:outerShdw>
+          </a:effectLst>
+        </p:spPr>
+        <p:style>
+          <a:lnRef idx="2">
+            <a:schemeClr val="accent1">
+              <a:shade val="50000"/>
+            </a:schemeClr>
+          </a:lnRef>
+          <a:fillRef idx="1">
+            <a:schemeClr val="accent1"/>
+          </a:fillRef>
+          <a:effectRef idx="0">
+            <a:schemeClr val="accent1"/>
+          </a:effectRef>
+          <a:fontRef idx="minor">
+            <a:schemeClr val="lt1"/>
+          </a:fontRef>
+        </p:style>
+        <p:txBody>
+          <a:bodyPr rtlCol="0" anchor="ctr"/>
+          <a:lstStyle/>
+          <a:p>
+            <a:pPr algn="ctr" defTabSz="914377" eaLnBrk="1" fontAlgn="auto" hangingPunct="1">
+              <a:spcBef>
+                <a:spcPts val="0"/>
+              </a:spcBef>
+              <a:spcAft>
+                <a:spcPts val="0"/>
+              </a:spcAft>
+            </a:pPr>
+            <a:r>
+              <a:rPr lang="en-US" sz="900" b="1" dirty="0">
+                <a:solidFill>
+                  <a:prstClr val="white"/>
+                </a:solidFill>
+                <a:latin typeface="Arial"/>
+              </a:rPr>
+              <a:t>Process Designer</a:t>
+            </a:r>
+          </a:p>
+        </p:txBody>
+      </p:sp>
+      <p:sp>
+        <p:nvSpPr>
+          <p:cNvPr id="35" name="Rounded Rectangle 34">
+            <a:extLst>
+              <a:ext uri="{FF2B5EF4-FFF2-40B4-BE49-F238E27FC236}">
+                <a16:creationId xmlns:a16="http://schemas.microsoft.com/office/drawing/2014/main" id="{213A41FE-6EFD-8E47-B10F-FA0FFEC6125E}"/>
+              </a:ext>
+            </a:extLst>
+          </p:cNvPr>
+          <p:cNvSpPr/>
+          <p:nvPr/>
+        </p:nvSpPr>
+        <p:spPr>
+          <a:xfrm>
+            <a:off x="7064848" y="3860908"/>
+            <a:ext cx="1814171" cy="385810"/>
+          </a:xfrm>
+          <a:prstGeom prst="roundRect">
+            <a:avLst>
+              <a:gd name="adj" fmla="val 7576"/>
+            </a:avLst>
+          </a:prstGeom>
+          <a:solidFill>
+            <a:schemeClr val="tx2">
+              <a:lumMod val="75000"/>
+            </a:schemeClr>
+          </a:solidFill>
+          <a:ln>
+            <a:noFill/>
+          </a:ln>
+          <a:effectLst>
+            <a:outerShdw blurRad="50800" dist="38100" dir="5400000" algn="t" rotWithShape="0">
+              <a:prstClr val="black">
+                <a:alpha val="40000"/>
+              </a:prstClr>
+            </a:outerShdw>
+          </a:effectLst>
+        </p:spPr>
+        <p:style>
+          <a:lnRef idx="2">
+            <a:schemeClr val="accent1">
+              <a:shade val="50000"/>
+            </a:schemeClr>
+          </a:lnRef>
+          <a:fillRef idx="1">
+            <a:schemeClr val="accent1"/>
+          </a:fillRef>
+          <a:effectRef idx="0">
+            <a:schemeClr val="accent1"/>
+          </a:effectRef>
+          <a:fontRef idx="minor">
+            <a:schemeClr val="lt1"/>
+          </a:fontRef>
+        </p:style>
+        <p:txBody>
+          <a:bodyPr rtlCol="0" anchor="ctr"/>
+          <a:lstStyle/>
+          <a:p>
+            <a:pPr algn="ctr" defTabSz="914377" eaLnBrk="1" fontAlgn="auto" hangingPunct="1">
+              <a:spcBef>
+                <a:spcPts val="0"/>
+              </a:spcBef>
+              <a:spcAft>
+                <a:spcPts val="0"/>
+              </a:spcAft>
+            </a:pPr>
+            <a:r>
+              <a:rPr lang="en-US" sz="900" b="1" dirty="0">
+                <a:solidFill>
+                  <a:prstClr val="white"/>
+                </a:solidFill>
+                <a:latin typeface="Arial"/>
+              </a:rPr>
+              <a:t>Workflow Center</a:t>
+            </a:r>
+          </a:p>
+        </p:txBody>
+      </p:sp>
+      <p:sp>
+        <p:nvSpPr>
+          <p:cNvPr id="37" name="Rounded Rectangle 36">
+            <a:extLst>
+              <a:ext uri="{FF2B5EF4-FFF2-40B4-BE49-F238E27FC236}">
+                <a16:creationId xmlns:a16="http://schemas.microsoft.com/office/drawing/2014/main" id="{CC204309-B57C-FD48-9980-482A7BF09888}"/>
+              </a:ext>
+            </a:extLst>
+          </p:cNvPr>
+          <p:cNvSpPr/>
+          <p:nvPr/>
+        </p:nvSpPr>
+        <p:spPr>
+          <a:xfrm>
+            <a:off x="9160506" y="3355280"/>
+            <a:ext cx="1814171" cy="385810"/>
+          </a:xfrm>
+          <a:prstGeom prst="roundRect">
+            <a:avLst>
+              <a:gd name="adj" fmla="val 7576"/>
+            </a:avLst>
+          </a:prstGeom>
+          <a:solidFill>
+            <a:schemeClr val="tx2">
+              <a:lumMod val="75000"/>
+            </a:schemeClr>
+          </a:solidFill>
+          <a:ln>
+            <a:noFill/>
+          </a:ln>
+          <a:effectLst>
+            <a:outerShdw blurRad="50800" dist="38100" dir="5400000" algn="t" rotWithShape="0">
+              <a:prstClr val="black">
+                <a:alpha val="40000"/>
+              </a:prstClr>
+            </a:outerShdw>
+          </a:effectLst>
+        </p:spPr>
+        <p:style>
+          <a:lnRef idx="2">
+            <a:schemeClr val="accent1">
+              <a:shade val="50000"/>
+            </a:schemeClr>
+          </a:lnRef>
+          <a:fillRef idx="1">
+            <a:schemeClr val="accent1"/>
+          </a:fillRef>
+          <a:effectRef idx="0">
+            <a:schemeClr val="accent1"/>
+          </a:effectRef>
+          <a:fontRef idx="minor">
+            <a:schemeClr val="lt1"/>
+          </a:fontRef>
+        </p:style>
+        <p:txBody>
+          <a:bodyPr rtlCol="0" anchor="ctr"/>
+          <a:lstStyle/>
+          <a:p>
+            <a:pPr algn="ctr" defTabSz="914377" eaLnBrk="1" fontAlgn="auto" hangingPunct="1">
+              <a:spcBef>
+                <a:spcPts val="0"/>
+              </a:spcBef>
+              <a:spcAft>
+                <a:spcPts val="0"/>
+              </a:spcAft>
+            </a:pPr>
+            <a:r>
+              <a:rPr lang="en-US" sz="900" b="1" dirty="0">
+                <a:solidFill>
+                  <a:prstClr val="white"/>
+                </a:solidFill>
+                <a:latin typeface="Arial"/>
+              </a:rPr>
+              <a:t>Process Portal</a:t>
+            </a:r>
+          </a:p>
+        </p:txBody>
+      </p:sp>
+      <p:sp>
+        <p:nvSpPr>
+          <p:cNvPr id="38" name="Rounded Rectangle 37">
+            <a:extLst>
+              <a:ext uri="{FF2B5EF4-FFF2-40B4-BE49-F238E27FC236}">
+                <a16:creationId xmlns:a16="http://schemas.microsoft.com/office/drawing/2014/main" id="{B8880B7F-C5B0-B54A-AA58-272F7D65C5F5}"/>
+              </a:ext>
+            </a:extLst>
+          </p:cNvPr>
+          <p:cNvSpPr/>
+          <p:nvPr/>
+        </p:nvSpPr>
+        <p:spPr>
+          <a:xfrm>
+            <a:off x="9487061" y="2076151"/>
+            <a:ext cx="1161059" cy="660401"/>
+          </a:xfrm>
+          <a:prstGeom prst="roundRect">
+            <a:avLst>
+              <a:gd name="adj" fmla="val 7576"/>
+            </a:avLst>
+          </a:prstGeom>
+          <a:solidFill>
+            <a:srgbClr val="92D050"/>
+          </a:solidFill>
+          <a:ln>
+            <a:noFill/>
+          </a:ln>
+          <a:effectLst>
+            <a:outerShdw blurRad="50800" dist="38100" dir="5400000" algn="t" rotWithShape="0">
+              <a:prstClr val="black">
+                <a:alpha val="40000"/>
+              </a:prstClr>
+            </a:outerShdw>
+          </a:effectLst>
+        </p:spPr>
+        <p:style>
+          <a:lnRef idx="2">
+            <a:schemeClr val="accent1">
+              <a:shade val="50000"/>
+            </a:schemeClr>
+          </a:lnRef>
+          <a:fillRef idx="1">
+            <a:schemeClr val="accent1"/>
+          </a:fillRef>
+          <a:effectRef idx="0">
+            <a:schemeClr val="accent1"/>
+          </a:effectRef>
+          <a:fontRef idx="minor">
+            <a:schemeClr val="lt1"/>
+          </a:fontRef>
+        </p:style>
+        <p:txBody>
+          <a:bodyPr rtlCol="0" anchor="ctr"/>
+          <a:lstStyle/>
+          <a:p>
+            <a:pPr algn="ctr" defTabSz="914377" eaLnBrk="1" fontAlgn="auto" hangingPunct="1">
+              <a:spcBef>
+                <a:spcPts val="0"/>
+              </a:spcBef>
+              <a:spcAft>
+                <a:spcPts val="0"/>
+              </a:spcAft>
+            </a:pPr>
+            <a:r>
+              <a:rPr lang="en-US" sz="900" b="1" dirty="0">
+                <a:solidFill>
+                  <a:srgbClr val="244311"/>
+                </a:solidFill>
+              </a:rPr>
+              <a:t>HR Onboarding Application Services Process App</a:t>
+            </a:r>
+          </a:p>
+        </p:txBody>
+      </p:sp>
+      <p:sp>
+        <p:nvSpPr>
+          <p:cNvPr id="29" name="AutoShape 4">
+            <a:extLst>
+              <a:ext uri="{FF2B5EF4-FFF2-40B4-BE49-F238E27FC236}">
+                <a16:creationId xmlns:a16="http://schemas.microsoft.com/office/drawing/2014/main" id="{00495259-4CA0-B840-B4EA-67110E1B1B89}"/>
+              </a:ext>
+            </a:extLst>
+          </p:cNvPr>
+          <p:cNvSpPr>
+            <a:spLocks noChangeArrowheads="1"/>
+          </p:cNvSpPr>
+          <p:nvPr/>
+        </p:nvSpPr>
+        <p:spPr bwMode="auto">
+          <a:xfrm>
+            <a:off x="3964904" y="2207831"/>
+            <a:ext cx="2867589" cy="1204471"/>
+          </a:xfrm>
+          <a:prstGeom prst="roundRect">
+            <a:avLst>
+              <a:gd name="adj" fmla="val 7117"/>
+            </a:avLst>
+          </a:prstGeom>
+          <a:noFill/>
+          <a:ln w="12700">
+            <a:solidFill>
+              <a:schemeClr val="tx2">
+                <a:lumMod val="50000"/>
+              </a:schemeClr>
+            </a:solidFill>
+            <a:prstDash val="dash"/>
+            <a:round/>
+            <a:headEnd/>
+            <a:tailEnd/>
+          </a:ln>
+        </p:spPr>
+        <p:txBody>
+          <a:bodyPr lIns="0" tIns="0" rIns="0" bIns="0" anchor="b" anchorCtr="1"/>
+          <a:lstStyle/>
+          <a:p>
+            <a:pPr algn="ctr" defTabSz="914377" eaLnBrk="1" fontAlgn="auto" hangingPunct="1">
+              <a:spcBef>
+                <a:spcPts val="0"/>
+              </a:spcBef>
+              <a:spcAft>
+                <a:spcPts val="0"/>
+              </a:spcAft>
+              <a:defRPr/>
+            </a:pPr>
+            <a:r>
+              <a:rPr lang="en-US" sz="1200" dirty="0">
+                <a:solidFill>
+                  <a:prstClr val="black"/>
+                </a:solidFill>
+                <a:latin typeface="Arial"/>
+                <a:cs typeface="+mn-cs"/>
+              </a:rPr>
+              <a:t>Business Automation Studio</a:t>
+            </a:r>
+          </a:p>
+        </p:txBody>
+      </p:sp>
+      <p:sp>
+        <p:nvSpPr>
+          <p:cNvPr id="36" name="AutoShape 4">
+            <a:extLst>
+              <a:ext uri="{FF2B5EF4-FFF2-40B4-BE49-F238E27FC236}">
+                <a16:creationId xmlns:a16="http://schemas.microsoft.com/office/drawing/2014/main" id="{69AABDF7-0675-DA45-AAD8-186A59C293B6}"/>
+              </a:ext>
+            </a:extLst>
+          </p:cNvPr>
+          <p:cNvSpPr>
+            <a:spLocks noChangeArrowheads="1"/>
+          </p:cNvSpPr>
+          <p:nvPr/>
+        </p:nvSpPr>
+        <p:spPr bwMode="auto">
+          <a:xfrm>
+            <a:off x="3964903" y="3502256"/>
+            <a:ext cx="2867589" cy="1204471"/>
+          </a:xfrm>
+          <a:prstGeom prst="roundRect">
+            <a:avLst>
+              <a:gd name="adj" fmla="val 7117"/>
+            </a:avLst>
+          </a:prstGeom>
+          <a:noFill/>
+          <a:ln w="12700">
+            <a:solidFill>
+              <a:schemeClr val="tx2">
+                <a:lumMod val="50000"/>
+              </a:schemeClr>
+            </a:solidFill>
+            <a:prstDash val="dash"/>
+            <a:round/>
+            <a:headEnd/>
+            <a:tailEnd/>
+          </a:ln>
+        </p:spPr>
+        <p:txBody>
+          <a:bodyPr lIns="0" tIns="0" rIns="0" bIns="0" anchor="b" anchorCtr="1"/>
+          <a:lstStyle/>
+          <a:p>
+            <a:pPr algn="ctr" defTabSz="914377" eaLnBrk="1" fontAlgn="auto" hangingPunct="1">
+              <a:spcBef>
+                <a:spcPts val="0"/>
+              </a:spcBef>
+              <a:spcAft>
+                <a:spcPts val="0"/>
+              </a:spcAft>
+              <a:defRPr/>
+            </a:pPr>
+            <a:r>
+              <a:rPr lang="en-US" sz="1200" dirty="0">
+                <a:solidFill>
+                  <a:prstClr val="black"/>
+                </a:solidFill>
+                <a:latin typeface="Arial"/>
+                <a:cs typeface="+mn-cs"/>
+              </a:rPr>
+              <a:t>Business Automation Navigator</a:t>
+            </a:r>
+          </a:p>
+        </p:txBody>
+      </p:sp>
+      <p:sp>
+        <p:nvSpPr>
+          <p:cNvPr id="39" name="Rounded Rectangle 38">
+            <a:extLst>
+              <a:ext uri="{FF2B5EF4-FFF2-40B4-BE49-F238E27FC236}">
+                <a16:creationId xmlns:a16="http://schemas.microsoft.com/office/drawing/2014/main" id="{4CCBF363-8AED-8145-8219-B8427FE351B6}"/>
+              </a:ext>
+            </a:extLst>
+          </p:cNvPr>
+          <p:cNvSpPr/>
+          <p:nvPr/>
+        </p:nvSpPr>
+        <p:spPr>
+          <a:xfrm>
+            <a:off x="5441882" y="2282277"/>
+            <a:ext cx="1308233" cy="385810"/>
+          </a:xfrm>
+          <a:prstGeom prst="roundRect">
+            <a:avLst>
+              <a:gd name="adj" fmla="val 7576"/>
+            </a:avLst>
+          </a:prstGeom>
+          <a:solidFill>
+            <a:schemeClr val="tx2">
+              <a:lumMod val="75000"/>
+            </a:schemeClr>
+          </a:solidFill>
+          <a:ln>
+            <a:noFill/>
+          </a:ln>
+          <a:effectLst>
+            <a:outerShdw blurRad="50800" dist="38100" dir="5400000" algn="t" rotWithShape="0">
+              <a:prstClr val="black">
+                <a:alpha val="40000"/>
+              </a:prstClr>
+            </a:outerShdw>
+          </a:effectLst>
+        </p:spPr>
+        <p:style>
+          <a:lnRef idx="2">
+            <a:schemeClr val="accent1">
+              <a:shade val="50000"/>
+            </a:schemeClr>
+          </a:lnRef>
+          <a:fillRef idx="1">
+            <a:schemeClr val="accent1"/>
+          </a:fillRef>
+          <a:effectRef idx="0">
+            <a:schemeClr val="accent1"/>
+          </a:effectRef>
+          <a:fontRef idx="minor">
+            <a:schemeClr val="lt1"/>
+          </a:fontRef>
+        </p:style>
+        <p:txBody>
+          <a:bodyPr rtlCol="0" anchor="ctr"/>
+          <a:lstStyle/>
+          <a:p>
+            <a:pPr algn="ctr" defTabSz="914377" eaLnBrk="1" fontAlgn="auto" hangingPunct="1">
+              <a:spcBef>
+                <a:spcPts val="0"/>
+              </a:spcBef>
+              <a:spcAft>
+                <a:spcPts val="0"/>
+              </a:spcAft>
+            </a:pPr>
+            <a:r>
+              <a:rPr lang="en-US" sz="900" b="1" dirty="0">
+                <a:solidFill>
+                  <a:prstClr val="white"/>
+                </a:solidFill>
+                <a:latin typeface="Arial"/>
+              </a:rPr>
+              <a:t>Studio</a:t>
+            </a:r>
+          </a:p>
+        </p:txBody>
+      </p:sp>
+      <p:sp>
+        <p:nvSpPr>
+          <p:cNvPr id="40" name="Rounded Rectangle 39">
+            <a:extLst>
+              <a:ext uri="{FF2B5EF4-FFF2-40B4-BE49-F238E27FC236}">
+                <a16:creationId xmlns:a16="http://schemas.microsoft.com/office/drawing/2014/main" id="{DACC17EF-FC59-4746-A24D-E022DC141962}"/>
+              </a:ext>
+            </a:extLst>
+          </p:cNvPr>
+          <p:cNvSpPr/>
+          <p:nvPr/>
+        </p:nvSpPr>
+        <p:spPr>
+          <a:xfrm>
+            <a:off x="5441883" y="2771408"/>
+            <a:ext cx="1308233" cy="385810"/>
+          </a:xfrm>
+          <a:prstGeom prst="roundRect">
+            <a:avLst>
+              <a:gd name="adj" fmla="val 7576"/>
+            </a:avLst>
+          </a:prstGeom>
+          <a:solidFill>
+            <a:schemeClr val="tx2">
+              <a:lumMod val="75000"/>
+            </a:schemeClr>
+          </a:solidFill>
+          <a:ln>
+            <a:noFill/>
+          </a:ln>
+          <a:effectLst>
+            <a:outerShdw blurRad="50800" dist="38100" dir="5400000" algn="t" rotWithShape="0">
+              <a:prstClr val="black">
+                <a:alpha val="40000"/>
+              </a:prstClr>
+            </a:outerShdw>
+          </a:effectLst>
+        </p:spPr>
+        <p:style>
+          <a:lnRef idx="2">
+            <a:schemeClr val="accent1">
+              <a:shade val="50000"/>
+            </a:schemeClr>
+          </a:lnRef>
+          <a:fillRef idx="1">
+            <a:schemeClr val="accent1"/>
+          </a:fillRef>
+          <a:effectRef idx="0">
+            <a:schemeClr val="accent1"/>
+          </a:effectRef>
+          <a:fontRef idx="minor">
+            <a:schemeClr val="lt1"/>
+          </a:fontRef>
+        </p:style>
+        <p:txBody>
+          <a:bodyPr rtlCol="0" anchor="ctr"/>
+          <a:lstStyle/>
+          <a:p>
+            <a:pPr algn="ctr" defTabSz="914377" eaLnBrk="1" fontAlgn="auto" hangingPunct="1">
+              <a:spcBef>
+                <a:spcPts val="0"/>
+              </a:spcBef>
+              <a:spcAft>
+                <a:spcPts val="0"/>
+              </a:spcAft>
+            </a:pPr>
+            <a:r>
+              <a:rPr lang="en-US" sz="900" b="1">
+                <a:solidFill>
+                  <a:prstClr val="white"/>
+                </a:solidFill>
+                <a:latin typeface="Arial"/>
+              </a:rPr>
+              <a:t>Playback Application Engine</a:t>
+            </a:r>
+            <a:endParaRPr lang="en-US" sz="900" b="1" dirty="0">
+              <a:solidFill>
+                <a:prstClr val="white"/>
+              </a:solidFill>
+              <a:latin typeface="Arial"/>
+            </a:endParaRPr>
+          </a:p>
+        </p:txBody>
+      </p:sp>
+      <p:sp>
+        <p:nvSpPr>
+          <p:cNvPr id="41" name="Rounded Rectangle 40">
+            <a:extLst>
+              <a:ext uri="{FF2B5EF4-FFF2-40B4-BE49-F238E27FC236}">
+                <a16:creationId xmlns:a16="http://schemas.microsoft.com/office/drawing/2014/main" id="{5B9F03D2-E07D-7A48-B4BB-DC538946EBF1}"/>
+              </a:ext>
+            </a:extLst>
+          </p:cNvPr>
+          <p:cNvSpPr/>
+          <p:nvPr/>
+        </p:nvSpPr>
+        <p:spPr>
+          <a:xfrm>
+            <a:off x="4050032" y="2771408"/>
+            <a:ext cx="1249366" cy="385810"/>
+          </a:xfrm>
+          <a:prstGeom prst="roundRect">
+            <a:avLst>
+              <a:gd name="adj" fmla="val 7576"/>
+            </a:avLst>
+          </a:prstGeom>
+          <a:solidFill>
+            <a:srgbClr val="92D050"/>
+          </a:solidFill>
+          <a:ln>
+            <a:noFill/>
+          </a:ln>
+          <a:effectLst>
+            <a:outerShdw blurRad="50800" dist="38100" dir="5400000" algn="t" rotWithShape="0">
+              <a:prstClr val="black">
+                <a:alpha val="40000"/>
+              </a:prstClr>
+            </a:outerShdw>
+          </a:effectLst>
+        </p:spPr>
+        <p:style>
+          <a:lnRef idx="2">
+            <a:schemeClr val="accent1">
+              <a:shade val="50000"/>
+            </a:schemeClr>
+          </a:lnRef>
+          <a:fillRef idx="1">
+            <a:schemeClr val="accent1"/>
+          </a:fillRef>
+          <a:effectRef idx="0">
+            <a:schemeClr val="accent1"/>
+          </a:effectRef>
+          <a:fontRef idx="minor">
+            <a:schemeClr val="lt1"/>
+          </a:fontRef>
+        </p:style>
+        <p:txBody>
+          <a:bodyPr rtlCol="0" anchor="ctr"/>
+          <a:lstStyle/>
+          <a:p>
+            <a:pPr algn="ctr" defTabSz="914377" eaLnBrk="1" fontAlgn="auto" hangingPunct="1">
+              <a:spcBef>
+                <a:spcPts val="0"/>
+              </a:spcBef>
+              <a:spcAft>
+                <a:spcPts val="0"/>
+              </a:spcAft>
+            </a:pPr>
+            <a:r>
+              <a:rPr lang="en-US" sz="900" b="1" dirty="0">
+                <a:solidFill>
+                  <a:srgbClr val="244311"/>
+                </a:solidFill>
+                <a:latin typeface="Arial"/>
+              </a:rPr>
+              <a:t>Onboarding App template</a:t>
+            </a:r>
+          </a:p>
+        </p:txBody>
+      </p:sp>
+      <p:sp>
+        <p:nvSpPr>
+          <p:cNvPr id="42" name="Rounded Rectangle 41">
+            <a:extLst>
+              <a:ext uri="{FF2B5EF4-FFF2-40B4-BE49-F238E27FC236}">
+                <a16:creationId xmlns:a16="http://schemas.microsoft.com/office/drawing/2014/main" id="{00A2EC81-D2DA-A249-877E-1AC2D172FF6C}"/>
+              </a:ext>
+            </a:extLst>
+          </p:cNvPr>
+          <p:cNvSpPr/>
+          <p:nvPr/>
+        </p:nvSpPr>
+        <p:spPr>
+          <a:xfrm>
+            <a:off x="4050032" y="2282277"/>
+            <a:ext cx="1249366" cy="385810"/>
+          </a:xfrm>
+          <a:prstGeom prst="roundRect">
+            <a:avLst>
+              <a:gd name="adj" fmla="val 7576"/>
+            </a:avLst>
+          </a:prstGeom>
+          <a:solidFill>
+            <a:srgbClr val="92D050"/>
+          </a:solidFill>
+          <a:ln>
+            <a:noFill/>
+          </a:ln>
+          <a:effectLst>
+            <a:outerShdw blurRad="50800" dist="38100" dir="5400000" algn="t" rotWithShape="0">
+              <a:prstClr val="black">
+                <a:alpha val="40000"/>
+              </a:prstClr>
+            </a:outerShdw>
+          </a:effectLst>
+        </p:spPr>
+        <p:style>
+          <a:lnRef idx="2">
+            <a:schemeClr val="accent1">
+              <a:shade val="50000"/>
+            </a:schemeClr>
+          </a:lnRef>
+          <a:fillRef idx="1">
+            <a:schemeClr val="accent1"/>
+          </a:fillRef>
+          <a:effectRef idx="0">
+            <a:schemeClr val="accent1"/>
+          </a:effectRef>
+          <a:fontRef idx="minor">
+            <a:schemeClr val="lt1"/>
+          </a:fontRef>
+        </p:style>
+        <p:txBody>
+          <a:bodyPr rtlCol="0" anchor="ctr"/>
+          <a:lstStyle/>
+          <a:p>
+            <a:pPr algn="ctr" defTabSz="914377" eaLnBrk="1" fontAlgn="auto" hangingPunct="1">
+              <a:spcBef>
+                <a:spcPts val="0"/>
+              </a:spcBef>
+              <a:spcAft>
+                <a:spcPts val="0"/>
+              </a:spcAft>
+            </a:pPr>
+            <a:r>
+              <a:rPr lang="en-US" sz="900" b="1" dirty="0">
+                <a:solidFill>
+                  <a:srgbClr val="244311"/>
+                </a:solidFill>
+                <a:latin typeface="Arial"/>
+              </a:rPr>
+              <a:t>HR Onboarding App</a:t>
+            </a:r>
+          </a:p>
+        </p:txBody>
+      </p:sp>
+      <p:sp>
+        <p:nvSpPr>
+          <p:cNvPr id="43" name="Rounded Rectangle 42">
+            <a:extLst>
+              <a:ext uri="{FF2B5EF4-FFF2-40B4-BE49-F238E27FC236}">
+                <a16:creationId xmlns:a16="http://schemas.microsoft.com/office/drawing/2014/main" id="{A056F40D-9ED9-E542-8C24-06BFB6A7B6B6}"/>
+              </a:ext>
+            </a:extLst>
+          </p:cNvPr>
+          <p:cNvSpPr/>
+          <p:nvPr/>
+        </p:nvSpPr>
+        <p:spPr>
+          <a:xfrm>
+            <a:off x="5441881" y="4037392"/>
+            <a:ext cx="1308233" cy="385810"/>
+          </a:xfrm>
+          <a:prstGeom prst="roundRect">
+            <a:avLst>
+              <a:gd name="adj" fmla="val 7576"/>
+            </a:avLst>
+          </a:prstGeom>
+          <a:solidFill>
+            <a:schemeClr val="tx2">
+              <a:lumMod val="75000"/>
+            </a:schemeClr>
+          </a:solidFill>
+          <a:ln>
+            <a:noFill/>
+          </a:ln>
+          <a:effectLst>
+            <a:outerShdw blurRad="50800" dist="38100" dir="5400000" algn="t" rotWithShape="0">
+              <a:prstClr val="black">
+                <a:alpha val="40000"/>
+              </a:prstClr>
+            </a:outerShdw>
+          </a:effectLst>
+        </p:spPr>
+        <p:style>
+          <a:lnRef idx="2">
+            <a:schemeClr val="accent1">
+              <a:shade val="50000"/>
+            </a:schemeClr>
+          </a:lnRef>
+          <a:fillRef idx="1">
+            <a:schemeClr val="accent1"/>
+          </a:fillRef>
+          <a:effectRef idx="0">
+            <a:schemeClr val="accent1"/>
+          </a:effectRef>
+          <a:fontRef idx="minor">
+            <a:schemeClr val="lt1"/>
+          </a:fontRef>
+        </p:style>
+        <p:txBody>
+          <a:bodyPr rtlCol="0" anchor="ctr"/>
+          <a:lstStyle/>
+          <a:p>
+            <a:pPr algn="ctr" defTabSz="914377" eaLnBrk="1" fontAlgn="auto" hangingPunct="1">
+              <a:spcBef>
+                <a:spcPts val="0"/>
+              </a:spcBef>
+              <a:spcAft>
+                <a:spcPts val="0"/>
+              </a:spcAft>
+            </a:pPr>
+            <a:r>
+              <a:rPr lang="en-US" sz="900" b="1" dirty="0">
+                <a:solidFill>
+                  <a:prstClr val="white"/>
+                </a:solidFill>
+                <a:latin typeface="Arial"/>
+              </a:rPr>
+              <a:t>Application Engine</a:t>
+            </a:r>
+          </a:p>
+        </p:txBody>
+      </p:sp>
+      <p:sp>
+        <p:nvSpPr>
+          <p:cNvPr id="44" name="Rounded Rectangle 43">
+            <a:extLst>
+              <a:ext uri="{FF2B5EF4-FFF2-40B4-BE49-F238E27FC236}">
+                <a16:creationId xmlns:a16="http://schemas.microsoft.com/office/drawing/2014/main" id="{C3501C41-AA88-0D40-9161-6A7C52F4F0D6}"/>
+              </a:ext>
+            </a:extLst>
+          </p:cNvPr>
+          <p:cNvSpPr/>
+          <p:nvPr/>
+        </p:nvSpPr>
+        <p:spPr>
+          <a:xfrm>
+            <a:off x="5431767" y="3557220"/>
+            <a:ext cx="1308233" cy="385810"/>
+          </a:xfrm>
+          <a:prstGeom prst="roundRect">
+            <a:avLst>
+              <a:gd name="adj" fmla="val 7576"/>
+            </a:avLst>
+          </a:prstGeom>
+          <a:solidFill>
+            <a:schemeClr val="tx2">
+              <a:lumMod val="75000"/>
+            </a:schemeClr>
+          </a:solidFill>
+          <a:ln>
+            <a:noFill/>
+          </a:ln>
+          <a:effectLst>
+            <a:outerShdw blurRad="50800" dist="38100" dir="5400000" algn="t" rotWithShape="0">
+              <a:prstClr val="black">
+                <a:alpha val="40000"/>
+              </a:prstClr>
+            </a:outerShdw>
+          </a:effectLst>
+        </p:spPr>
+        <p:style>
+          <a:lnRef idx="2">
+            <a:schemeClr val="accent1">
+              <a:shade val="50000"/>
+            </a:schemeClr>
+          </a:lnRef>
+          <a:fillRef idx="1">
+            <a:schemeClr val="accent1"/>
+          </a:fillRef>
+          <a:effectRef idx="0">
+            <a:schemeClr val="accent1"/>
+          </a:effectRef>
+          <a:fontRef idx="minor">
+            <a:schemeClr val="lt1"/>
+          </a:fontRef>
+        </p:style>
+        <p:txBody>
+          <a:bodyPr rtlCol="0" anchor="ctr"/>
+          <a:lstStyle/>
+          <a:p>
+            <a:pPr algn="ctr" defTabSz="914377" eaLnBrk="1" fontAlgn="auto" hangingPunct="1">
+              <a:spcBef>
+                <a:spcPts val="0"/>
+              </a:spcBef>
+              <a:spcAft>
+                <a:spcPts val="0"/>
+              </a:spcAft>
+            </a:pPr>
+            <a:r>
+              <a:rPr lang="en-US" sz="900" b="1" dirty="0">
+                <a:solidFill>
+                  <a:prstClr val="white"/>
+                </a:solidFill>
+                <a:latin typeface="Arial"/>
+              </a:rPr>
+              <a:t>Navigator</a:t>
+            </a:r>
+          </a:p>
+        </p:txBody>
+      </p:sp>
+      <p:sp>
+        <p:nvSpPr>
+          <p:cNvPr id="45" name="Rounded Rectangle 44">
+            <a:extLst>
+              <a:ext uri="{FF2B5EF4-FFF2-40B4-BE49-F238E27FC236}">
+                <a16:creationId xmlns:a16="http://schemas.microsoft.com/office/drawing/2014/main" id="{243C03C6-3F94-D24A-B276-65BC4CC37648}"/>
+              </a:ext>
+            </a:extLst>
+          </p:cNvPr>
+          <p:cNvSpPr/>
+          <p:nvPr/>
+        </p:nvSpPr>
+        <p:spPr>
+          <a:xfrm>
+            <a:off x="4050032" y="3813572"/>
+            <a:ext cx="1249366" cy="385810"/>
+          </a:xfrm>
+          <a:prstGeom prst="roundRect">
+            <a:avLst>
+              <a:gd name="adj" fmla="val 7576"/>
+            </a:avLst>
+          </a:prstGeom>
+          <a:solidFill>
+            <a:srgbClr val="92D050"/>
+          </a:solidFill>
+          <a:ln>
+            <a:noFill/>
+          </a:ln>
+          <a:effectLst>
+            <a:outerShdw blurRad="50800" dist="38100" dir="5400000" algn="t" rotWithShape="0">
+              <a:prstClr val="black">
+                <a:alpha val="40000"/>
+              </a:prstClr>
+            </a:outerShdw>
+          </a:effectLst>
+        </p:spPr>
+        <p:style>
+          <a:lnRef idx="2">
+            <a:schemeClr val="accent1">
+              <a:shade val="50000"/>
+            </a:schemeClr>
+          </a:lnRef>
+          <a:fillRef idx="1">
+            <a:schemeClr val="accent1"/>
+          </a:fillRef>
+          <a:effectRef idx="0">
+            <a:schemeClr val="accent1"/>
+          </a:effectRef>
+          <a:fontRef idx="minor">
+            <a:schemeClr val="lt1"/>
+          </a:fontRef>
+        </p:style>
+        <p:txBody>
+          <a:bodyPr rtlCol="0" anchor="ctr"/>
+          <a:lstStyle/>
+          <a:p>
+            <a:pPr algn="ctr" defTabSz="914377" eaLnBrk="1" fontAlgn="auto" hangingPunct="1">
+              <a:spcBef>
+                <a:spcPts val="0"/>
+              </a:spcBef>
+              <a:spcAft>
+                <a:spcPts val="0"/>
+              </a:spcAft>
+            </a:pPr>
+            <a:r>
+              <a:rPr lang="en-US" sz="900" b="1" dirty="0">
+                <a:solidFill>
+                  <a:srgbClr val="244311"/>
+                </a:solidFill>
+                <a:latin typeface="Arial"/>
+              </a:rPr>
+              <a:t>HR Onboarding App</a:t>
+            </a:r>
+          </a:p>
+        </p:txBody>
+      </p:sp>
+    </p:spTree>
+    <p:extLst>
+      <p:ext uri="{BB962C8B-B14F-4D97-AF65-F5344CB8AC3E}">
+        <p14:creationId xmlns:p14="http://schemas.microsoft.com/office/powerpoint/2010/main" val="1001503785"/>
+      </p:ext>
+    </p:extLst>
+  </p:cSld>
+  <p:clrMapOvr>
+    <a:masterClrMapping/>
+  </p:clrMapOvr>
+</p:sld>
+</file>
+
+<file path=ppt/slides/slide5.xml><?xml version="1.0" encoding="utf-8"?>
+<p:sld xmlns:a="http://schemas.openxmlformats.org/drawingml/2006/main" xmlns:r="http://schemas.openxmlformats.org/officeDocument/2006/relationships" xmlns:p="http://schemas.openxmlformats.org/presentationml/2006/main">
+  <p:cSld>
+    <p:spTree>
+      <p:nvGrpSpPr>
+        <p:cNvPr id="1" name=""/>
+        <p:cNvGrpSpPr/>
+        <p:nvPr/>
+      </p:nvGrpSpPr>
+      <p:grpSpPr>
+        <a:xfrm>
+          <a:off x="0" y="0"/>
+          <a:ext cx="0" cy="0"/>
+          <a:chOff x="0" y="0"/>
+          <a:chExt cx="0" cy="0"/>
+        </a:xfrm>
+      </p:grpSpPr>
+      <p:sp>
+        <p:nvSpPr>
           <p:cNvPr id="19" name="Rounded Rectangle 18">
             <a:extLst>
               <a:ext uri="{FF2B5EF4-FFF2-40B4-BE49-F238E27FC236}">
@@ -9605,7 +11845,7 @@
                 </a:solidFill>
               </a:rPr>
               <a:pPr/>
-              <a:t>4</a:t>
+              <a:t>5</a:t>
             </a:fld>
             <a:endParaRPr lang="en-US">
               <a:solidFill>
@@ -12435,7 +14675,7 @@
 </p:sld>
 </file>
 
-<file path=ppt/slides/slide5.xml><?xml version="1.0" encoding="utf-8"?>
+<file path=ppt/slides/slide6.xml><?xml version="1.0" encoding="utf-8"?>
 <p:sld xmlns:a="http://schemas.openxmlformats.org/drawingml/2006/main" xmlns:r="http://schemas.openxmlformats.org/officeDocument/2006/relationships" xmlns:p="http://schemas.openxmlformats.org/presentationml/2006/main">
   <p:cSld>
     <p:spTree>
@@ -13435,7 +15675,7 @@
                 </a:solidFill>
               </a:rPr>
               <a:pPr/>
-              <a:t>5</a:t>
+              <a:t>6</a:t>
             </a:fld>
             <a:endParaRPr lang="en-US">
               <a:solidFill>
@@ -14288,127 +16528,6 @@
 </p:sld>
 </file>
 
-<file path=ppt/slides/slide6.xml><?xml version="1.0" encoding="utf-8"?>
-<p:sld xmlns:a="http://schemas.openxmlformats.org/drawingml/2006/main" xmlns:r="http://schemas.openxmlformats.org/officeDocument/2006/relationships" xmlns:p="http://schemas.openxmlformats.org/presentationml/2006/main">
-  <p:cSld>
-    <p:spTree>
-      <p:nvGrpSpPr>
-        <p:cNvPr id="1" name=""/>
-        <p:cNvGrpSpPr/>
-        <p:nvPr/>
-      </p:nvGrpSpPr>
-      <p:grpSpPr>
-        <a:xfrm>
-          <a:off x="0" y="0"/>
-          <a:ext cx="0" cy="0"/>
-          <a:chOff x="0" y="0"/>
-          <a:chExt cx="0" cy="0"/>
-        </a:xfrm>
-      </p:grpSpPr>
-      <p:sp>
-        <p:nvSpPr>
-          <p:cNvPr id="2" name="Slide Number Placeholder 1">
-            <a:extLst>
-              <a:ext uri="{FF2B5EF4-FFF2-40B4-BE49-F238E27FC236}">
-                <a16:creationId xmlns:a16="http://schemas.microsoft.com/office/drawing/2014/main" id="{B26EFD7A-54C0-2342-913C-772AA467A7CE}"/>
-              </a:ext>
-            </a:extLst>
-          </p:cNvPr>
-          <p:cNvSpPr>
-            <a:spLocks noGrp="1"/>
-          </p:cNvSpPr>
-          <p:nvPr>
-            <p:ph type="sldNum" sz="quarter" idx="12"/>
-          </p:nvPr>
-        </p:nvSpPr>
-        <p:spPr/>
-        <p:txBody>
-          <a:bodyPr/>
-          <a:lstStyle/>
-          <a:p>
-            <a:fld id="{E9549862-13E2-C34D-815E-8545BD36FC59}" type="slidenum">
-              <a:rPr lang="en-US" smtClean="0">
-                <a:solidFill>
-                  <a:srgbClr val="6D7777"/>
-                </a:solidFill>
-              </a:rPr>
-              <a:pPr/>
-              <a:t>6</a:t>
-            </a:fld>
-            <a:endParaRPr lang="en-US">
-              <a:solidFill>
-                <a:srgbClr val="6D7777"/>
-              </a:solidFill>
-            </a:endParaRPr>
-          </a:p>
-        </p:txBody>
-      </p:sp>
-      <p:sp>
-        <p:nvSpPr>
-          <p:cNvPr id="3" name="Title 2">
-            <a:extLst>
-              <a:ext uri="{FF2B5EF4-FFF2-40B4-BE49-F238E27FC236}">
-                <a16:creationId xmlns:a16="http://schemas.microsoft.com/office/drawing/2014/main" id="{AB877B22-01CF-4E42-93A6-DFAB54B54A39}"/>
-              </a:ext>
-            </a:extLst>
-          </p:cNvPr>
-          <p:cNvSpPr>
-            <a:spLocks noGrp="1"/>
-          </p:cNvSpPr>
-          <p:nvPr>
-            <p:ph type="ctrTitle"/>
-          </p:nvPr>
-        </p:nvSpPr>
-        <p:spPr/>
-        <p:txBody>
-          <a:bodyPr/>
-          <a:lstStyle/>
-          <a:p>
-            <a:r>
-              <a:rPr lang="en-US" dirty="0"/>
-              <a:t>Older Versions</a:t>
-            </a:r>
-          </a:p>
-        </p:txBody>
-      </p:sp>
-      <p:sp>
-        <p:nvSpPr>
-          <p:cNvPr id="4" name="Subtitle 3">
-            <a:extLst>
-              <a:ext uri="{FF2B5EF4-FFF2-40B4-BE49-F238E27FC236}">
-                <a16:creationId xmlns:a16="http://schemas.microsoft.com/office/drawing/2014/main" id="{6ADCDA09-464A-A547-8B2D-6FAAD0C85EE3}"/>
-              </a:ext>
-            </a:extLst>
-          </p:cNvPr>
-          <p:cNvSpPr>
-            <a:spLocks noGrp="1"/>
-          </p:cNvSpPr>
-          <p:nvPr>
-            <p:ph type="subTitle" idx="1"/>
-          </p:nvPr>
-        </p:nvSpPr>
-        <p:spPr/>
-        <p:txBody>
-          <a:bodyPr/>
-          <a:lstStyle/>
-          <a:p>
-            <a:endParaRPr lang="en-US"/>
-          </a:p>
-        </p:txBody>
-      </p:sp>
-    </p:spTree>
-    <p:extLst>
-      <p:ext uri="{BB962C8B-B14F-4D97-AF65-F5344CB8AC3E}">
-        <p14:creationId xmlns:p14="http://schemas.microsoft.com/office/powerpoint/2010/main" val="3485633649"/>
-      </p:ext>
-    </p:extLst>
-  </p:cSld>
-  <p:clrMapOvr>
-    <a:masterClrMapping/>
-  </p:clrMapOvr>
-</p:sld>
-</file>
-
 <file path=ppt/slides/slide7.xml><?xml version="1.0" encoding="utf-8"?>
 <p:sld xmlns:a="http://schemas.openxmlformats.org/drawingml/2006/main" xmlns:r="http://schemas.openxmlformats.org/officeDocument/2006/relationships" xmlns:p="http://schemas.openxmlformats.org/presentationml/2006/main">
   <p:cSld>
@@ -14428,6 +16547,127 @@
       </p:grpSpPr>
       <p:sp>
         <p:nvSpPr>
+          <p:cNvPr id="2" name="Slide Number Placeholder 1">
+            <a:extLst>
+              <a:ext uri="{FF2B5EF4-FFF2-40B4-BE49-F238E27FC236}">
+                <a16:creationId xmlns:a16="http://schemas.microsoft.com/office/drawing/2014/main" id="{B26EFD7A-54C0-2342-913C-772AA467A7CE}"/>
+              </a:ext>
+            </a:extLst>
+          </p:cNvPr>
+          <p:cNvSpPr>
+            <a:spLocks noGrp="1"/>
+          </p:cNvSpPr>
+          <p:nvPr>
+            <p:ph type="sldNum" sz="quarter" idx="12"/>
+          </p:nvPr>
+        </p:nvSpPr>
+        <p:spPr/>
+        <p:txBody>
+          <a:bodyPr/>
+          <a:lstStyle/>
+          <a:p>
+            <a:fld id="{E9549862-13E2-C34D-815E-8545BD36FC59}" type="slidenum">
+              <a:rPr lang="en-US" smtClean="0">
+                <a:solidFill>
+                  <a:srgbClr val="6D7777"/>
+                </a:solidFill>
+              </a:rPr>
+              <a:pPr/>
+              <a:t>7</a:t>
+            </a:fld>
+            <a:endParaRPr lang="en-US">
+              <a:solidFill>
+                <a:srgbClr val="6D7777"/>
+              </a:solidFill>
+            </a:endParaRPr>
+          </a:p>
+        </p:txBody>
+      </p:sp>
+      <p:sp>
+        <p:nvSpPr>
+          <p:cNvPr id="3" name="Title 2">
+            <a:extLst>
+              <a:ext uri="{FF2B5EF4-FFF2-40B4-BE49-F238E27FC236}">
+                <a16:creationId xmlns:a16="http://schemas.microsoft.com/office/drawing/2014/main" id="{AB877B22-01CF-4E42-93A6-DFAB54B54A39}"/>
+              </a:ext>
+            </a:extLst>
+          </p:cNvPr>
+          <p:cNvSpPr>
+            <a:spLocks noGrp="1"/>
+          </p:cNvSpPr>
+          <p:nvPr>
+            <p:ph type="ctrTitle"/>
+          </p:nvPr>
+        </p:nvSpPr>
+        <p:spPr/>
+        <p:txBody>
+          <a:bodyPr/>
+          <a:lstStyle/>
+          <a:p>
+            <a:r>
+              <a:rPr lang="en-US" dirty="0"/>
+              <a:t>Older Versions</a:t>
+            </a:r>
+          </a:p>
+        </p:txBody>
+      </p:sp>
+      <p:sp>
+        <p:nvSpPr>
+          <p:cNvPr id="4" name="Subtitle 3">
+            <a:extLst>
+              <a:ext uri="{FF2B5EF4-FFF2-40B4-BE49-F238E27FC236}">
+                <a16:creationId xmlns:a16="http://schemas.microsoft.com/office/drawing/2014/main" id="{6ADCDA09-464A-A547-8B2D-6FAAD0C85EE3}"/>
+              </a:ext>
+            </a:extLst>
+          </p:cNvPr>
+          <p:cNvSpPr>
+            <a:spLocks noGrp="1"/>
+          </p:cNvSpPr>
+          <p:nvPr>
+            <p:ph type="subTitle" idx="1"/>
+          </p:nvPr>
+        </p:nvSpPr>
+        <p:spPr/>
+        <p:txBody>
+          <a:bodyPr/>
+          <a:lstStyle/>
+          <a:p>
+            <a:endParaRPr lang="en-US"/>
+          </a:p>
+        </p:txBody>
+      </p:sp>
+    </p:spTree>
+    <p:extLst>
+      <p:ext uri="{BB962C8B-B14F-4D97-AF65-F5344CB8AC3E}">
+        <p14:creationId xmlns:p14="http://schemas.microsoft.com/office/powerpoint/2010/main" val="3485633649"/>
+      </p:ext>
+    </p:extLst>
+  </p:cSld>
+  <p:clrMapOvr>
+    <a:masterClrMapping/>
+  </p:clrMapOvr>
+</p:sld>
+</file>
+
+<file path=ppt/slides/slide8.xml><?xml version="1.0" encoding="utf-8"?>
+<p:sld xmlns:a="http://schemas.openxmlformats.org/drawingml/2006/main" xmlns:r="http://schemas.openxmlformats.org/officeDocument/2006/relationships" xmlns:p="http://schemas.openxmlformats.org/presentationml/2006/main">
+  <p:cSld>
+    <p:spTree>
+      <p:nvGrpSpPr>
+        <p:cNvPr id="1" name=""/>
+        <p:cNvGrpSpPr/>
+        <p:nvPr/>
+      </p:nvGrpSpPr>
+      <p:grpSpPr>
+        <a:xfrm>
+          <a:off x="0" y="0"/>
+          <a:ext cx="0" cy="0"/>
+          <a:chOff x="0" y="0"/>
+          <a:chExt cx="0" cy="0"/>
+        </a:xfrm>
+      </p:grpSpPr>
+      <p:sp>
+        <p:nvSpPr>
           <p:cNvPr id="2" name="Title 1">
             <a:extLst>
               <a:ext uri="{FF2B5EF4-FFF2-40B4-BE49-F238E27FC236}">
@@ -14483,7 +16723,7 @@
                 </a:solidFill>
               </a:rPr>
               <a:pPr/>
-              <a:t>7</a:t>
+              <a:t>8</a:t>
             </a:fld>
             <a:endParaRPr lang="en-US">
               <a:solidFill>

</xml_diff>